<commit_message>
add Funktionalitaet der neuen Erweiterung
</commit_message>
<xml_diff>
--- a/presentation.pptx
+++ b/presentation.pptx
@@ -5,10 +5,10 @@
     <p:sldMasterId id="2147483648" r:id="rId1"/>
   </p:sldMasterIdLst>
   <p:notesMasterIdLst>
-    <p:notesMasterId r:id="rId12"/>
+    <p:notesMasterId r:id="rId13"/>
   </p:notesMasterIdLst>
   <p:handoutMasterIdLst>
-    <p:handoutMasterId r:id="rId13"/>
+    <p:handoutMasterId r:id="rId14"/>
   </p:handoutMasterIdLst>
   <p:sldIdLst>
     <p:sldId id="259" r:id="rId2"/>
@@ -21,6 +21,7 @@
     <p:sldId id="266" r:id="rId9"/>
     <p:sldId id="267" r:id="rId10"/>
     <p:sldId id="268" r:id="rId11"/>
+    <p:sldId id="269" r:id="rId12"/>
   </p:sldIdLst>
   <p:sldSz cx="9144000" cy="6858000" type="screen4x3"/>
   <p:notesSz cx="6858000" cy="9144000"/>
@@ -2188,10 +2189,9 @@
               <a:buChar char="•"/>
             </a:pPr>
             <a:r>
-              <a:rPr lang="de-DE" baseline="0" smtClean="0"/>
+              <a:rPr lang="de-DE" baseline="0" dirty="0" smtClean="0"/>
               <a:t>Atom: GUI</a:t>
             </a:r>
-            <a:endParaRPr lang="de-DE" baseline="0" dirty="0" smtClean="0"/>
           </a:p>
           <a:p>
             <a:pPr marL="0" indent="0">
@@ -2229,6 +2229,306 @@
     <p:extLst>
       <p:ext uri="{BB962C8B-B14F-4D97-AF65-F5344CB8AC3E}">
         <p14:creationId xmlns:p14="http://schemas.microsoft.com/office/powerpoint/2010/main" val="195767865"/>
+      </p:ext>
+    </p:extLst>
+  </p:cSld>
+  <p:clrMapOvr>
+    <a:masterClrMapping/>
+  </p:clrMapOvr>
+</p:notes>
+</file>
+
+<file path=ppt/notesSlides/notesSlide7.xml><?xml version="1.0" encoding="utf-8"?>
+<p:notes xmlns:a="http://schemas.openxmlformats.org/drawingml/2006/main" xmlns:r="http://schemas.openxmlformats.org/officeDocument/2006/relationships" xmlns:p="http://schemas.openxmlformats.org/presentationml/2006/main">
+  <p:cSld>
+    <p:spTree>
+      <p:nvGrpSpPr>
+        <p:cNvPr id="1" name=""/>
+        <p:cNvGrpSpPr/>
+        <p:nvPr/>
+      </p:nvGrpSpPr>
+      <p:grpSpPr>
+        <a:xfrm>
+          <a:off x="0" y="0"/>
+          <a:ext cx="0" cy="0"/>
+          <a:chOff x="0" y="0"/>
+          <a:chExt cx="0" cy="0"/>
+        </a:xfrm>
+      </p:grpSpPr>
+      <p:sp>
+        <p:nvSpPr>
+          <p:cNvPr id="2" name="Folienbildplatzhalter 1"/>
+          <p:cNvSpPr>
+            <a:spLocks noGrp="1" noRot="1" noChangeAspect="1"/>
+          </p:cNvSpPr>
+          <p:nvPr>
+            <p:ph type="sldImg"/>
+          </p:nvPr>
+        </p:nvSpPr>
+        <p:spPr/>
+      </p:sp>
+      <p:sp>
+        <p:nvSpPr>
+          <p:cNvPr id="3" name="Notizenplatzhalter 2"/>
+          <p:cNvSpPr>
+            <a:spLocks noGrp="1"/>
+          </p:cNvSpPr>
+          <p:nvPr>
+            <p:ph type="body" idx="1"/>
+          </p:nvPr>
+        </p:nvSpPr>
+        <p:spPr/>
+        <p:txBody>
+          <a:bodyPr/>
+          <a:lstStyle/>
+          <a:p>
+            <a:r>
+              <a:rPr lang="de-DE" dirty="0" smtClean="0"/>
+              <a:t>GUIs:</a:t>
+            </a:r>
+            <a:endParaRPr lang="de-DE" dirty="0"/>
+          </a:p>
+          <a:p>
+            <a:pPr marL="171450" indent="-171450">
+              <a:buFontTx/>
+              <a:buChar char="-"/>
+            </a:pPr>
+            <a:r>
+              <a:rPr lang="de-DE" baseline="0" dirty="0" smtClean="0"/>
+              <a:t>Dialoge mit Textfeldern und eindeutigen Hinweisen</a:t>
+            </a:r>
+          </a:p>
+          <a:p>
+            <a:pPr marL="171450" indent="-171450">
+              <a:buFontTx/>
+              <a:buChar char="-"/>
+            </a:pPr>
+            <a:r>
+              <a:rPr lang="de-DE" dirty="0" smtClean="0"/>
+              <a:t>Bilder:</a:t>
+            </a:r>
+            <a:r>
+              <a:rPr lang="de-DE" baseline="0" dirty="0" smtClean="0"/>
+              <a:t> </a:t>
+            </a:r>
+            <a:r>
+              <a:rPr lang="de-DE" baseline="0" dirty="0" err="1" smtClean="0"/>
+              <a:t>matuc</a:t>
+            </a:r>
+            <a:r>
+              <a:rPr lang="de-DE" baseline="0" dirty="0" smtClean="0"/>
+              <a:t> </a:t>
+            </a:r>
+            <a:r>
+              <a:rPr lang="de-DE" baseline="0" dirty="0" err="1" smtClean="0"/>
+              <a:t>imgdsc</a:t>
+            </a:r>
+            <a:r>
+              <a:rPr lang="de-DE" baseline="0" dirty="0" smtClean="0"/>
+              <a:t> wird aufgerufen, es wird programmatisch entschieden, ob Bildbeschreibungen ausgelagert werden</a:t>
+            </a:r>
+          </a:p>
+          <a:p>
+            <a:pPr marL="171450" indent="-171450">
+              <a:buFontTx/>
+              <a:buChar char="-"/>
+            </a:pPr>
+            <a:r>
+              <a:rPr lang="de-DE" baseline="0" dirty="0" smtClean="0"/>
+              <a:t>Tabellen: verschiedene </a:t>
+            </a:r>
+            <a:r>
+              <a:rPr lang="de-DE" baseline="0" dirty="0" err="1" smtClean="0"/>
+              <a:t>Markdown</a:t>
+            </a:r>
+            <a:r>
+              <a:rPr lang="de-DE" baseline="0" dirty="0" smtClean="0"/>
+              <a:t> Tabellentypen werden angeboten, nicht alle von Live-Preview unterstützt (siehe Ausblick)</a:t>
+            </a:r>
+          </a:p>
+          <a:p>
+            <a:pPr marL="171450" indent="-171450">
+              <a:buFontTx/>
+              <a:buChar char="-"/>
+            </a:pPr>
+            <a:r>
+              <a:rPr lang="de-DE" baseline="0" dirty="0" smtClean="0"/>
+              <a:t>CSV Import von Tabellen möglich</a:t>
+            </a:r>
+          </a:p>
+          <a:p>
+            <a:pPr marL="171450" indent="-171450">
+              <a:buFontTx/>
+              <a:buChar char="-"/>
+            </a:pPr>
+            <a:endParaRPr lang="de-DE" baseline="0" dirty="0" smtClean="0"/>
+          </a:p>
+          <a:p>
+            <a:pPr marL="0" indent="0">
+              <a:buFontTx/>
+              <a:buNone/>
+            </a:pPr>
+            <a:r>
+              <a:rPr lang="de-DE" baseline="0" dirty="0" smtClean="0"/>
+              <a:t>GIT</a:t>
+            </a:r>
+          </a:p>
+          <a:p>
+            <a:pPr marL="171450" indent="-171450">
+              <a:buFontTx/>
+              <a:buChar char="-"/>
+            </a:pPr>
+            <a:r>
+              <a:rPr lang="de-DE" baseline="0" dirty="0" smtClean="0"/>
+              <a:t>In Einstellungen des </a:t>
+            </a:r>
+            <a:r>
+              <a:rPr lang="de-DE" baseline="0" dirty="0" err="1" smtClean="0"/>
+              <a:t>Plugins</a:t>
+            </a:r>
+            <a:r>
+              <a:rPr lang="de-DE" baseline="0" dirty="0" smtClean="0"/>
+              <a:t> kann die Integration deaktiviert werden, ansonsten:</a:t>
+            </a:r>
+          </a:p>
+          <a:p>
+            <a:pPr marL="171450" indent="-171450">
+              <a:buFontTx/>
+              <a:buChar char="-"/>
+            </a:pPr>
+            <a:r>
+              <a:rPr lang="de-DE" baseline="0" dirty="0" smtClean="0"/>
+              <a:t>Beim Speichern wird an das Committen erinnert</a:t>
+            </a:r>
+          </a:p>
+          <a:p>
+            <a:pPr marL="171450" indent="-171450">
+              <a:buFontTx/>
+              <a:buChar char="-"/>
+            </a:pPr>
+            <a:endParaRPr lang="de-DE" baseline="0" dirty="0" smtClean="0"/>
+          </a:p>
+          <a:p>
+            <a:pPr marL="0" indent="0">
+              <a:buFontTx/>
+              <a:buNone/>
+            </a:pPr>
+            <a:r>
+              <a:rPr lang="de-DE" baseline="0" dirty="0" smtClean="0"/>
+              <a:t>Live-Vorschau:</a:t>
+            </a:r>
+          </a:p>
+          <a:p>
+            <a:pPr marL="171450" indent="-171450">
+              <a:buFontTx/>
+              <a:buChar char="-"/>
+            </a:pPr>
+            <a:r>
+              <a:rPr lang="de-DE" baseline="0" dirty="0" smtClean="0"/>
+              <a:t>Man kann sofort sehen was passiert</a:t>
+            </a:r>
+          </a:p>
+          <a:p>
+            <a:pPr marL="171450" indent="-171450">
+              <a:buFontTx/>
+              <a:buChar char="-"/>
+            </a:pPr>
+            <a:r>
+              <a:rPr lang="de-DE" baseline="0" dirty="0" smtClean="0"/>
+              <a:t>Latex </a:t>
+            </a:r>
+            <a:r>
+              <a:rPr lang="de-DE" baseline="0" dirty="0" err="1" smtClean="0"/>
+              <a:t>Formeluntersützung</a:t>
+            </a:r>
+            <a:endParaRPr lang="de-DE" baseline="0" dirty="0" smtClean="0"/>
+          </a:p>
+          <a:p>
+            <a:pPr marL="171450" indent="-171450">
+              <a:buFontTx/>
+              <a:buChar char="-"/>
+            </a:pPr>
+            <a:endParaRPr lang="de-DE" baseline="0" dirty="0" smtClean="0"/>
+          </a:p>
+          <a:p>
+            <a:pPr marL="0" indent="0">
+              <a:buFontTx/>
+              <a:buNone/>
+            </a:pPr>
+            <a:r>
+              <a:rPr lang="de-DE" baseline="0" dirty="0" smtClean="0"/>
+              <a:t>Unterstützung in der Ausführung einzelner Arbeitsschritte</a:t>
+            </a:r>
+          </a:p>
+          <a:p>
+            <a:pPr marL="171450" indent="-171450">
+              <a:buFontTx/>
+              <a:buChar char="-"/>
+            </a:pPr>
+            <a:r>
+              <a:rPr lang="de-DE" baseline="0" dirty="0" smtClean="0"/>
+              <a:t>Commit Abfrage beim Speichern</a:t>
+            </a:r>
+          </a:p>
+          <a:p>
+            <a:pPr marL="171450" indent="-171450">
+              <a:buFontTx/>
+              <a:buChar char="-"/>
+            </a:pPr>
+            <a:r>
+              <a:rPr lang="de-DE" baseline="0" dirty="0" smtClean="0"/>
+              <a:t>beim Speichern wird überprüft mit </a:t>
+            </a:r>
+            <a:r>
+              <a:rPr lang="de-DE" baseline="0" dirty="0" err="1" smtClean="0"/>
+              <a:t>mistkerl</a:t>
+            </a:r>
+            <a:endParaRPr lang="de-DE" baseline="0" dirty="0" smtClean="0"/>
+          </a:p>
+          <a:p>
+            <a:pPr marL="171450" indent="-171450">
+              <a:buFontTx/>
+              <a:buChar char="-"/>
+            </a:pPr>
+            <a:r>
+              <a:rPr lang="de-DE" baseline="0" dirty="0" smtClean="0"/>
+              <a:t>An bestimmten Stellen wird im Hintergrund gespeichert, bevor </a:t>
+            </a:r>
+            <a:r>
+              <a:rPr lang="de-DE" baseline="0" smtClean="0"/>
+              <a:t>die gewünschte Funktion ausgeführt wird</a:t>
+            </a:r>
+            <a:endParaRPr lang="de-DE" baseline="0" dirty="0" smtClean="0"/>
+          </a:p>
+        </p:txBody>
+      </p:sp>
+      <p:sp>
+        <p:nvSpPr>
+          <p:cNvPr id="4" name="Foliennummernplatzhalter 3"/>
+          <p:cNvSpPr>
+            <a:spLocks noGrp="1"/>
+          </p:cNvSpPr>
+          <p:nvPr>
+            <p:ph type="sldNum" sz="quarter" idx="10"/>
+          </p:nvPr>
+        </p:nvSpPr>
+        <p:spPr/>
+        <p:txBody>
+          <a:bodyPr/>
+          <a:lstStyle/>
+          <a:p>
+            <a:fld id="{97667336-ABAD-4032-8A72-A57DA0F2B670}" type="slidenum">
+              <a:rPr lang="de-LU" smtClean="0"/>
+              <a:t>11</a:t>
+            </a:fld>
+            <a:endParaRPr lang="de-LU"/>
+          </a:p>
+        </p:txBody>
+      </p:sp>
+    </p:spTree>
+    <p:extLst>
+      <p:ext uri="{BB962C8B-B14F-4D97-AF65-F5344CB8AC3E}">
+        <p14:creationId xmlns:p14="http://schemas.microsoft.com/office/powerpoint/2010/main" val="1837253011"/>
       </p:ext>
     </p:extLst>
   </p:cSld>
@@ -2589,6 +2889,13 @@
       </p:stSnd>
     </p:sndAc>
   </p:transition>
+  <p:timing>
+    <p:tnLst>
+      <p:par>
+        <p:cTn id="1" dur="indefinite" restart="never" nodeType="tmRoot"/>
+      </p:par>
+    </p:tnLst>
+  </p:timing>
 </p:sldLayout>
 </file>
 
@@ -5439,7 +5746,7 @@
         </p:nvCxnSpPr>
         <p:spPr>
           <a:xfrm>
-            <a:off x="-1" y="838200"/>
+            <a:off x="-1" y="764704"/>
             <a:ext cx="9144000" cy="0"/>
           </a:xfrm>
           <a:prstGeom prst="line">
@@ -5504,7 +5811,7 @@
         </p:nvCxnSpPr>
         <p:spPr>
           <a:xfrm>
-            <a:off x="-2" y="1124744"/>
+            <a:off x="-2" y="1052736"/>
             <a:ext cx="9144001" cy="0"/>
           </a:xfrm>
           <a:prstGeom prst="line">
@@ -6252,7 +6559,7 @@
         </p:nvSpPr>
         <p:spPr>
           <a:xfrm>
-            <a:off x="0" y="836712"/>
+            <a:off x="0" y="764704"/>
             <a:ext cx="9144000" cy="288032"/>
           </a:xfrm>
         </p:spPr>
@@ -6535,10 +6842,583 @@
           </a:p>
         </p:txBody>
       </p:sp>
+      <p:sp>
+        <p:nvSpPr>
+          <p:cNvPr id="14" name="Textfeld 13"/>
+          <p:cNvSpPr txBox="1"/>
+          <p:nvPr/>
+        </p:nvSpPr>
+        <p:spPr>
+          <a:xfrm>
+            <a:off x="399820" y="2564904"/>
+            <a:ext cx="1999137" cy="369332"/>
+          </a:xfrm>
+          <a:prstGeom prst="rect">
+            <a:avLst/>
+          </a:prstGeom>
+          <a:noFill/>
+        </p:spPr>
+        <p:txBody>
+          <a:bodyPr wrap="none" rtlCol="0">
+            <a:spAutoFit/>
+          </a:bodyPr>
+          <a:lstStyle/>
+          <a:p>
+            <a:r>
+              <a:rPr lang="de-DE" dirty="0" smtClean="0"/>
+              <a:t>Vorteile des Editors</a:t>
+            </a:r>
+            <a:endParaRPr lang="de-DE" dirty="0"/>
+          </a:p>
+        </p:txBody>
+      </p:sp>
+      <p:sp>
+        <p:nvSpPr>
+          <p:cNvPr id="16" name="Textfeld 15"/>
+          <p:cNvSpPr txBox="1"/>
+          <p:nvPr/>
+        </p:nvSpPr>
+        <p:spPr>
+          <a:xfrm>
+            <a:off x="76971" y="1106160"/>
+            <a:ext cx="2032351" cy="369332"/>
+          </a:xfrm>
+          <a:prstGeom prst="rect">
+            <a:avLst/>
+          </a:prstGeom>
+          <a:noFill/>
+        </p:spPr>
+        <p:txBody>
+          <a:bodyPr wrap="none" rtlCol="0">
+            <a:spAutoFit/>
+          </a:bodyPr>
+          <a:lstStyle/>
+          <a:p>
+            <a:r>
+              <a:rPr lang="de-DE" b="1" dirty="0" smtClean="0"/>
+              <a:t>Vorteile des Editors</a:t>
+            </a:r>
+            <a:endParaRPr lang="de-DE" b="1" dirty="0"/>
+          </a:p>
+        </p:txBody>
+      </p:sp>
     </p:spTree>
     <p:extLst>
       <p:ext uri="{BB962C8B-B14F-4D97-AF65-F5344CB8AC3E}">
         <p14:creationId xmlns:p14="http://schemas.microsoft.com/office/powerpoint/2010/main" val="986676057"/>
+      </p:ext>
+    </p:extLst>
+  </p:cSld>
+  <p:clrMapOvr>
+    <a:masterClrMapping/>
+  </p:clrMapOvr>
+  <p:transition spd="slow">
+    <p:push dir="u"/>
+  </p:transition>
+  <p:timing>
+    <p:tnLst>
+      <p:par>
+        <p:cTn id="1" dur="indefinite" restart="never" nodeType="tmRoot"/>
+      </p:par>
+    </p:tnLst>
+  </p:timing>
+</p:sld>
+</file>
+
+<file path=ppt/slides/slide11.xml><?xml version="1.0" encoding="utf-8"?>
+<p:sld xmlns:a="http://schemas.openxmlformats.org/drawingml/2006/main" xmlns:r="http://schemas.openxmlformats.org/officeDocument/2006/relationships" xmlns:p="http://schemas.openxmlformats.org/presentationml/2006/main">
+  <p:cSld>
+    <p:spTree>
+      <p:nvGrpSpPr>
+        <p:cNvPr id="1" name=""/>
+        <p:cNvGrpSpPr/>
+        <p:nvPr/>
+      </p:nvGrpSpPr>
+      <p:grpSpPr>
+        <a:xfrm>
+          <a:off x="0" y="0"/>
+          <a:ext cx="0" cy="0"/>
+          <a:chOff x="0" y="0"/>
+          <a:chExt cx="0" cy="0"/>
+        </a:xfrm>
+      </p:grpSpPr>
+      <p:sp>
+        <p:nvSpPr>
+          <p:cNvPr id="3" name="Inhaltsplatzhalter 2"/>
+          <p:cNvSpPr>
+            <a:spLocks noGrp="1"/>
+          </p:cNvSpPr>
+          <p:nvPr>
+            <p:ph sz="quarter" idx="19"/>
+          </p:nvPr>
+        </p:nvSpPr>
+        <p:spPr>
+          <a:xfrm>
+            <a:off x="0" y="764704"/>
+            <a:ext cx="9144000" cy="288032"/>
+          </a:xfrm>
+        </p:spPr>
+        <p:txBody>
+          <a:bodyPr anchor="ctr"/>
+          <a:lstStyle/>
+          <a:p>
+            <a:pPr algn="ctr"/>
+            <a:r>
+              <a:rPr lang="de-DE" sz="1200" b="0" dirty="0"/>
+              <a:t>1. Zielstellung &gt; 2. Bestehende Lösungsansätze &gt; </a:t>
+            </a:r>
+            <a:r>
+              <a:rPr lang="de-DE" sz="1200" b="0" dirty="0">
+                <a:solidFill>
+                  <a:schemeClr val="tx1"/>
+                </a:solidFill>
+              </a:rPr>
+              <a:t>3. Entwicklung einer neuen Erweiterung für ATOM</a:t>
+            </a:r>
+            <a:r>
+              <a:rPr lang="de-DE" sz="1200" b="0" dirty="0"/>
+              <a:t> &gt; 4. Ausblick</a:t>
+            </a:r>
+          </a:p>
+        </p:txBody>
+      </p:sp>
+      <p:sp>
+        <p:nvSpPr>
+          <p:cNvPr id="4" name="Datumsplatzhalter 3"/>
+          <p:cNvSpPr>
+            <a:spLocks noGrp="1"/>
+          </p:cNvSpPr>
+          <p:nvPr>
+            <p:ph type="dt" sz="half" idx="20"/>
+          </p:nvPr>
+        </p:nvSpPr>
+        <p:spPr/>
+        <p:txBody>
+          <a:bodyPr/>
+          <a:lstStyle/>
+          <a:p>
+            <a:fld id="{852F18A7-60EF-DD48-8F37-BE93452F0A67}" type="datetime1">
+              <a:rPr lang="de-DE" smtClean="0"/>
+              <a:t>24.10.16</a:t>
+            </a:fld>
+            <a:endParaRPr lang="de-DE" dirty="0"/>
+          </a:p>
+        </p:txBody>
+      </p:sp>
+      <p:sp>
+        <p:nvSpPr>
+          <p:cNvPr id="6" name="Foliennummernplatzhalter 5"/>
+          <p:cNvSpPr>
+            <a:spLocks noGrp="1"/>
+          </p:cNvSpPr>
+          <p:nvPr>
+            <p:ph type="sldNum" sz="quarter" idx="22"/>
+          </p:nvPr>
+        </p:nvSpPr>
+        <p:spPr/>
+        <p:txBody>
+          <a:bodyPr/>
+          <a:lstStyle/>
+          <a:p>
+            <a:r>
+              <a:rPr lang="de-DE"/>
+              <a:t>Folie </a:t>
+            </a:r>
+            <a:fld id="{20336FBE-96EF-1B43-9998-83765DDB0397}" type="slidenum">
+              <a:rPr lang="de-DE" smtClean="0"/>
+              <a:pPr/>
+              <a:t>11</a:t>
+            </a:fld>
+            <a:r>
+              <a:rPr lang="de-DE"/>
+              <a:t> von XYZ</a:t>
+            </a:r>
+            <a:endParaRPr lang="de-DE" dirty="0"/>
+          </a:p>
+        </p:txBody>
+      </p:sp>
+      <p:sp>
+        <p:nvSpPr>
+          <p:cNvPr id="7" name="Textfeld 6"/>
+          <p:cNvSpPr txBox="1"/>
+          <p:nvPr/>
+        </p:nvSpPr>
+        <p:spPr>
+          <a:xfrm>
+            <a:off x="76971" y="1106160"/>
+            <a:ext cx="3773597" cy="369332"/>
+          </a:xfrm>
+          <a:prstGeom prst="rect">
+            <a:avLst/>
+          </a:prstGeom>
+          <a:noFill/>
+        </p:spPr>
+        <p:txBody>
+          <a:bodyPr wrap="none" rtlCol="0">
+            <a:spAutoFit/>
+          </a:bodyPr>
+          <a:lstStyle/>
+          <a:p>
+            <a:r>
+              <a:rPr lang="de-DE" b="1" dirty="0" smtClean="0"/>
+              <a:t>Funktionalität der neuen Erweiterung</a:t>
+            </a:r>
+            <a:endParaRPr lang="de-DE" b="1" dirty="0"/>
+          </a:p>
+        </p:txBody>
+      </p:sp>
+      <p:sp>
+        <p:nvSpPr>
+          <p:cNvPr id="8" name="Inhaltsplatzhalter 1"/>
+          <p:cNvSpPr txBox="1">
+            <a:spLocks/>
+          </p:cNvSpPr>
+          <p:nvPr/>
+        </p:nvSpPr>
+        <p:spPr>
+          <a:xfrm>
+            <a:off x="655637" y="1556792"/>
+            <a:ext cx="7832725" cy="4608041"/>
+          </a:xfrm>
+          <a:prstGeom prst="rect">
+            <a:avLst/>
+          </a:prstGeom>
+        </p:spPr>
+        <p:txBody>
+          <a:bodyPr lIns="0" tIns="0" rIns="0" bIns="0"/>
+          <a:lstStyle>
+            <a:lvl1pPr marL="0" marR="0" indent="0" algn="l" defTabSz="914368" rtl="0" eaLnBrk="1" fontAlgn="t" latinLnBrk="0" hangingPunct="1">
+              <a:lnSpc>
+                <a:spcPct val="100000"/>
+              </a:lnSpc>
+              <a:spcBef>
+                <a:spcPts val="0"/>
+              </a:spcBef>
+              <a:spcAft>
+                <a:spcPts val="600"/>
+              </a:spcAft>
+              <a:buClrTx/>
+              <a:buSzTx/>
+              <a:buFontTx/>
+              <a:buNone/>
+              <a:tabLst/>
+              <a:defRPr sz="2000" kern="1200" baseline="0">
+                <a:solidFill>
+                  <a:srgbClr val="0B2A51"/>
+                </a:solidFill>
+                <a:latin typeface="Verdana" pitchFamily="34" charset="0"/>
+                <a:ea typeface="+mn-ea"/>
+                <a:cs typeface="+mn-cs"/>
+              </a:defRPr>
+            </a:lvl1pPr>
+            <a:lvl2pPr marL="161925" indent="-161925" algn="l" defTabSz="914368" rtl="0" eaLnBrk="1" fontAlgn="t" latinLnBrk="0" hangingPunct="1">
+              <a:spcBef>
+                <a:spcPts val="300"/>
+              </a:spcBef>
+              <a:spcAft>
+                <a:spcPts val="600"/>
+              </a:spcAft>
+              <a:buClr>
+                <a:schemeClr val="tx1"/>
+              </a:buClr>
+              <a:buSzPct val="120000"/>
+              <a:buFont typeface="LucidaGrande" charset="0"/>
+              <a:buChar char="_"/>
+              <a:tabLst/>
+              <a:defRPr sz="2000" kern="1200" baseline="0">
+                <a:solidFill>
+                  <a:srgbClr val="0B2A51"/>
+                </a:solidFill>
+                <a:latin typeface="Verdana" pitchFamily="34" charset="0"/>
+                <a:ea typeface="+mn-ea"/>
+                <a:cs typeface="+mn-cs"/>
+              </a:defRPr>
+            </a:lvl2pPr>
+            <a:lvl3pPr marL="0" indent="0" algn="l" defTabSz="914368" rtl="0" eaLnBrk="1" fontAlgn="t" latinLnBrk="0" hangingPunct="1">
+              <a:spcBef>
+                <a:spcPts val="0"/>
+              </a:spcBef>
+              <a:spcAft>
+                <a:spcPts val="600"/>
+              </a:spcAft>
+              <a:buSzPct val="100000"/>
+              <a:buFont typeface="Symbol" charset="2"/>
+              <a:buNone/>
+              <a:tabLst/>
+              <a:defRPr sz="1600" kern="1200" baseline="0">
+                <a:solidFill>
+                  <a:srgbClr val="0B2A51"/>
+                </a:solidFill>
+                <a:latin typeface="Verdana" pitchFamily="34" charset="0"/>
+                <a:ea typeface="+mn-ea"/>
+                <a:cs typeface="+mn-cs"/>
+              </a:defRPr>
+            </a:lvl3pPr>
+            <a:lvl4pPr marL="288925" indent="-127000" algn="l" defTabSz="914368" rtl="0" eaLnBrk="1" latinLnBrk="0" hangingPunct="1">
+              <a:spcBef>
+                <a:spcPts val="0"/>
+              </a:spcBef>
+              <a:spcAft>
+                <a:spcPts val="600"/>
+              </a:spcAft>
+              <a:buClr>
+                <a:schemeClr val="tx1"/>
+              </a:buClr>
+              <a:buSzPct val="100000"/>
+              <a:buFont typeface="LucidaGrande" charset="0"/>
+              <a:buChar char="_"/>
+              <a:tabLst/>
+              <a:defRPr sz="1600" kern="1200" baseline="0">
+                <a:solidFill>
+                  <a:srgbClr val="0B2A51"/>
+                </a:solidFill>
+                <a:latin typeface="Verdana" pitchFamily="34" charset="0"/>
+                <a:ea typeface="+mn-ea"/>
+                <a:cs typeface="+mn-cs"/>
+              </a:defRPr>
+            </a:lvl4pPr>
+            <a:lvl5pPr marL="415925" indent="-127000" algn="l" defTabSz="914368" rtl="0" eaLnBrk="1" latinLnBrk="0" hangingPunct="1">
+              <a:spcBef>
+                <a:spcPts val="0"/>
+              </a:spcBef>
+              <a:spcAft>
+                <a:spcPts val="600"/>
+              </a:spcAft>
+              <a:buSzPct val="170000"/>
+              <a:buFont typeface="AppleSymbols" charset="0"/>
+              <a:buChar char="⌞"/>
+              <a:tabLst/>
+              <a:defRPr sz="1600" kern="1200" baseline="0">
+                <a:solidFill>
+                  <a:srgbClr val="0B2A51"/>
+                </a:solidFill>
+                <a:latin typeface="Verdana" pitchFamily="34" charset="0"/>
+                <a:ea typeface="+mn-ea"/>
+                <a:cs typeface="+mn-cs"/>
+              </a:defRPr>
+            </a:lvl5pPr>
+            <a:lvl6pPr marL="2514512" indent="-228592" algn="l" defTabSz="914368" rtl="0" eaLnBrk="1" latinLnBrk="0" hangingPunct="1">
+              <a:spcBef>
+                <a:spcPct val="20000"/>
+              </a:spcBef>
+              <a:buFont typeface="Arial" pitchFamily="34" charset="0"/>
+              <a:buChar char="•"/>
+              <a:defRPr sz="2000" kern="1200">
+                <a:solidFill>
+                  <a:schemeClr val="tx1"/>
+                </a:solidFill>
+                <a:latin typeface="+mn-lt"/>
+                <a:ea typeface="+mn-ea"/>
+                <a:cs typeface="+mn-cs"/>
+              </a:defRPr>
+            </a:lvl6pPr>
+            <a:lvl7pPr marL="2971696" indent="-228592" algn="l" defTabSz="914368" rtl="0" eaLnBrk="1" latinLnBrk="0" hangingPunct="1">
+              <a:spcBef>
+                <a:spcPct val="20000"/>
+              </a:spcBef>
+              <a:buFont typeface="Arial" pitchFamily="34" charset="0"/>
+              <a:buChar char="•"/>
+              <a:defRPr sz="2000" kern="1200">
+                <a:solidFill>
+                  <a:schemeClr val="tx1"/>
+                </a:solidFill>
+                <a:latin typeface="+mn-lt"/>
+                <a:ea typeface="+mn-ea"/>
+                <a:cs typeface="+mn-cs"/>
+              </a:defRPr>
+            </a:lvl7pPr>
+            <a:lvl8pPr marL="3428880" indent="-228592" algn="l" defTabSz="914368" rtl="0" eaLnBrk="1" latinLnBrk="0" hangingPunct="1">
+              <a:spcBef>
+                <a:spcPct val="20000"/>
+              </a:spcBef>
+              <a:buFont typeface="Arial" pitchFamily="34" charset="0"/>
+              <a:buChar char="•"/>
+              <a:defRPr sz="2000" kern="1200">
+                <a:solidFill>
+                  <a:schemeClr val="tx1"/>
+                </a:solidFill>
+                <a:latin typeface="+mn-lt"/>
+                <a:ea typeface="+mn-ea"/>
+                <a:cs typeface="+mn-cs"/>
+              </a:defRPr>
+            </a:lvl8pPr>
+            <a:lvl9pPr marL="3886064" indent="-228592" algn="l" defTabSz="914368" rtl="0" eaLnBrk="1" latinLnBrk="0" hangingPunct="1">
+              <a:spcBef>
+                <a:spcPct val="20000"/>
+              </a:spcBef>
+              <a:buFont typeface="Arial" pitchFamily="34" charset="0"/>
+              <a:buChar char="•"/>
+              <a:defRPr sz="2000" kern="1200">
+                <a:solidFill>
+                  <a:schemeClr val="tx1"/>
+                </a:solidFill>
+                <a:latin typeface="+mn-lt"/>
+                <a:ea typeface="+mn-ea"/>
+                <a:cs typeface="+mn-cs"/>
+              </a:defRPr>
+            </a:lvl9pPr>
+          </a:lstStyle>
+          <a:p>
+            <a:pPr marL="342900" indent="-342900">
+              <a:buFont typeface=".AppleSystemUIFont" charset="-120"/>
+              <a:buChar char="-"/>
+            </a:pPr>
+            <a:r>
+              <a:rPr lang="de-DE" dirty="0"/>
+              <a:t>Live-Vorschau mit </a:t>
+            </a:r>
+            <a:r>
+              <a:rPr lang="de-DE" dirty="0" err="1" smtClean="0"/>
+              <a:t>LaTeX</a:t>
+            </a:r>
+            <a:r>
+              <a:rPr lang="de-DE" dirty="0" smtClean="0"/>
+              <a:t>-Umsetzung</a:t>
+            </a:r>
+          </a:p>
+          <a:p>
+            <a:pPr marL="342900" indent="-342900">
+              <a:buFont typeface=".AppleSystemUIFont" charset="-120"/>
+              <a:buChar char="-"/>
+            </a:pPr>
+            <a:r>
+              <a:rPr lang="de-DE" dirty="0" smtClean="0"/>
+              <a:t>GUIs </a:t>
+            </a:r>
+            <a:r>
+              <a:rPr lang="de-DE" dirty="0"/>
+              <a:t>für</a:t>
+            </a:r>
+          </a:p>
+          <a:p>
+            <a:pPr marL="631825" lvl="3" indent="-342900">
+              <a:buFont typeface="Wingdings" charset="2"/>
+              <a:buChar char="§"/>
+            </a:pPr>
+            <a:r>
+              <a:rPr lang="de-DE" dirty="0" err="1"/>
+              <a:t>Markdown</a:t>
+            </a:r>
+            <a:r>
+              <a:rPr lang="de-DE" dirty="0"/>
+              <a:t>-Syntax</a:t>
+            </a:r>
+          </a:p>
+          <a:p>
+            <a:pPr marL="631825" lvl="3" indent="-342900">
+              <a:buFont typeface="Wingdings" charset="2"/>
+              <a:buChar char="§"/>
+            </a:pPr>
+            <a:r>
+              <a:rPr lang="de-DE" dirty="0"/>
+              <a:t>Anlegen eines neuen </a:t>
+            </a:r>
+            <a:r>
+              <a:rPr lang="de-DE" dirty="0" smtClean="0"/>
+              <a:t>Projekts</a:t>
+            </a:r>
+          </a:p>
+          <a:p>
+            <a:pPr marL="631825" lvl="3" indent="-342900">
+              <a:buFont typeface="Wingdings" charset="2"/>
+              <a:buChar char="§"/>
+            </a:pPr>
+            <a:r>
+              <a:rPr lang="de-DE" dirty="0" smtClean="0"/>
+              <a:t>Bearbeiten der Metadaten</a:t>
+            </a:r>
+            <a:endParaRPr lang="de-DE" dirty="0"/>
+          </a:p>
+          <a:p>
+            <a:pPr marL="631825" lvl="3" indent="-342900">
+              <a:buFont typeface="Wingdings" charset="2"/>
+              <a:buChar char="§"/>
+            </a:pPr>
+            <a:r>
+              <a:rPr lang="de-DE" dirty="0"/>
+              <a:t>Einfügen von Links</a:t>
+            </a:r>
+          </a:p>
+          <a:p>
+            <a:pPr marL="631825" lvl="3" indent="-342900">
+              <a:buFont typeface="Wingdings" charset="2"/>
+              <a:buChar char="§"/>
+            </a:pPr>
+            <a:r>
+              <a:rPr lang="de-DE" dirty="0"/>
+              <a:t>Einfügen von Bildern</a:t>
+            </a:r>
+          </a:p>
+          <a:p>
+            <a:pPr marL="631825" lvl="3" indent="-342900">
+              <a:buFont typeface="Wingdings" charset="2"/>
+              <a:buChar char="§"/>
+            </a:pPr>
+            <a:r>
+              <a:rPr lang="de-DE" dirty="0"/>
+              <a:t>Einfügen von Tabellen</a:t>
+            </a:r>
+          </a:p>
+          <a:p>
+            <a:pPr marL="631825" lvl="3" indent="-342900">
+              <a:buFont typeface="Wingdings" charset="2"/>
+              <a:buChar char="§"/>
+            </a:pPr>
+            <a:r>
+              <a:rPr lang="de-DE" dirty="0" err="1"/>
+              <a:t>git</a:t>
+            </a:r>
+            <a:r>
+              <a:rPr lang="de-DE" dirty="0"/>
+              <a:t> </a:t>
+            </a:r>
+            <a:r>
+              <a:rPr lang="de-DE" dirty="0" err="1"/>
+              <a:t>commit</a:t>
+            </a:r>
+            <a:r>
+              <a:rPr lang="de-DE" dirty="0"/>
+              <a:t> </a:t>
+            </a:r>
+            <a:r>
+              <a:rPr lang="de-DE" dirty="0" smtClean="0"/>
+              <a:t>Nachrichten</a:t>
+            </a:r>
+          </a:p>
+          <a:p>
+            <a:pPr marL="342900" lvl="2" indent="-342900">
+              <a:buFont typeface=".AppleSystemUIFont" charset="-120"/>
+              <a:buChar char="-"/>
+            </a:pPr>
+            <a:r>
+              <a:rPr lang="de-DE" sz="2000" dirty="0" err="1"/>
+              <a:t>g</a:t>
+            </a:r>
+            <a:r>
+              <a:rPr lang="de-DE" sz="2000" dirty="0" err="1" smtClean="0"/>
+              <a:t>it</a:t>
+            </a:r>
+            <a:r>
+              <a:rPr lang="de-DE" sz="2000" dirty="0" smtClean="0"/>
+              <a:t>-Integration</a:t>
+            </a:r>
+          </a:p>
+          <a:p>
+            <a:pPr marL="342900" indent="-342900">
+              <a:buFont typeface=".AppleSystemUIFont" charset="-120"/>
+              <a:buChar char="-"/>
+            </a:pPr>
+            <a:r>
+              <a:rPr lang="de-DE" dirty="0" smtClean="0"/>
+              <a:t>Unterstützung in der Ausführung einzelner Arbeitsschritte</a:t>
+            </a:r>
+          </a:p>
+        </p:txBody>
+      </p:sp>
+    </p:spTree>
+    <p:extLst>
+      <p:ext uri="{BB962C8B-B14F-4D97-AF65-F5344CB8AC3E}">
+        <p14:creationId xmlns:p14="http://schemas.microsoft.com/office/powerpoint/2010/main" val="1782800565"/>
       </p:ext>
     </p:extLst>
   </p:cSld>
@@ -6710,7 +7590,7 @@
         </p:nvSpPr>
         <p:spPr>
           <a:xfrm>
-            <a:off x="0" y="836712"/>
+            <a:off x="0" y="764704"/>
             <a:ext cx="9144000" cy="288032"/>
           </a:xfrm>
           <a:prstGeom prst="rect">
@@ -7282,7 +8162,7 @@
         </p:nvSpPr>
         <p:spPr>
           <a:xfrm>
-            <a:off x="0" y="836712"/>
+            <a:off x="0" y="764704"/>
             <a:ext cx="9144000" cy="288032"/>
           </a:xfrm>
         </p:spPr>
@@ -7735,7 +8615,7 @@
         </p:nvSpPr>
         <p:spPr>
           <a:xfrm>
-            <a:off x="0" y="836712"/>
+            <a:off x="0" y="764704"/>
             <a:ext cx="9144000" cy="288032"/>
           </a:xfrm>
         </p:spPr>
@@ -7990,7 +8870,7 @@
         </p:nvSpPr>
         <p:spPr>
           <a:xfrm>
-            <a:off x="0" y="836712"/>
+            <a:off x="0" y="764704"/>
             <a:ext cx="9144000" cy="288032"/>
           </a:xfrm>
         </p:spPr>
@@ -8275,7 +9155,7 @@
         </p:nvSpPr>
         <p:spPr>
           <a:xfrm>
-            <a:off x="0" y="836712"/>
+            <a:off x="0" y="764704"/>
             <a:ext cx="9144000" cy="288032"/>
           </a:xfrm>
         </p:spPr>

</xml_diff>

<commit_message>
add Struktur im Code und Wiederverwendbarkeit
</commit_message>
<xml_diff>
--- a/presentation.pptx
+++ b/presentation.pptx
@@ -5,10 +5,10 @@
     <p:sldMasterId id="2147483648" r:id="rId1"/>
   </p:sldMasterIdLst>
   <p:notesMasterIdLst>
-    <p:notesMasterId r:id="rId13"/>
+    <p:notesMasterId r:id="rId17"/>
   </p:notesMasterIdLst>
   <p:handoutMasterIdLst>
-    <p:handoutMasterId r:id="rId14"/>
+    <p:handoutMasterId r:id="rId18"/>
   </p:handoutMasterIdLst>
   <p:sldIdLst>
     <p:sldId id="259" r:id="rId2"/>
@@ -22,6 +22,10 @@
     <p:sldId id="267" r:id="rId10"/>
     <p:sldId id="268" r:id="rId11"/>
     <p:sldId id="269" r:id="rId12"/>
+    <p:sldId id="270" r:id="rId13"/>
+    <p:sldId id="271" r:id="rId14"/>
+    <p:sldId id="272" r:id="rId15"/>
+    <p:sldId id="273" r:id="rId16"/>
   </p:sldIdLst>
   <p:sldSz cx="9144000" cy="6858000" type="screen4x3"/>
   <p:notesSz cx="6858000" cy="9144000"/>
@@ -904,6 +908,224 @@
 </p:notes>
 </file>
 
+<file path=ppt/notesSlides/notesSlide10.xml><?xml version="1.0" encoding="utf-8"?>
+<p:notes xmlns:a="http://schemas.openxmlformats.org/drawingml/2006/main" xmlns:r="http://schemas.openxmlformats.org/officeDocument/2006/relationships" xmlns:p="http://schemas.openxmlformats.org/presentationml/2006/main">
+  <p:cSld>
+    <p:spTree>
+      <p:nvGrpSpPr>
+        <p:cNvPr id="1" name=""/>
+        <p:cNvGrpSpPr/>
+        <p:nvPr/>
+      </p:nvGrpSpPr>
+      <p:grpSpPr>
+        <a:xfrm>
+          <a:off x="0" y="0"/>
+          <a:ext cx="0" cy="0"/>
+          <a:chOff x="0" y="0"/>
+          <a:chExt cx="0" cy="0"/>
+        </a:xfrm>
+      </p:grpSpPr>
+      <p:sp>
+        <p:nvSpPr>
+          <p:cNvPr id="2" name="Folienbildplatzhalter 1"/>
+          <p:cNvSpPr>
+            <a:spLocks noGrp="1" noRot="1" noChangeAspect="1"/>
+          </p:cNvSpPr>
+          <p:nvPr>
+            <p:ph type="sldImg"/>
+          </p:nvPr>
+        </p:nvSpPr>
+        <p:spPr/>
+      </p:sp>
+      <p:sp>
+        <p:nvSpPr>
+          <p:cNvPr id="3" name="Notizenplatzhalter 2"/>
+          <p:cNvSpPr>
+            <a:spLocks noGrp="1"/>
+          </p:cNvSpPr>
+          <p:nvPr>
+            <p:ph type="body" idx="1"/>
+          </p:nvPr>
+        </p:nvSpPr>
+        <p:spPr/>
+        <p:txBody>
+          <a:bodyPr/>
+          <a:lstStyle/>
+          <a:p>
+            <a:endParaRPr lang="de-DE" baseline="0" dirty="0" smtClean="0"/>
+          </a:p>
+        </p:txBody>
+      </p:sp>
+      <p:sp>
+        <p:nvSpPr>
+          <p:cNvPr id="4" name="Foliennummernplatzhalter 3"/>
+          <p:cNvSpPr>
+            <a:spLocks noGrp="1"/>
+          </p:cNvSpPr>
+          <p:nvPr>
+            <p:ph type="sldNum" sz="quarter" idx="10"/>
+          </p:nvPr>
+        </p:nvSpPr>
+        <p:spPr/>
+        <p:txBody>
+          <a:bodyPr/>
+          <a:lstStyle/>
+          <a:p>
+            <a:fld id="{97667336-ABAD-4032-8A72-A57DA0F2B670}" type="slidenum">
+              <a:rPr lang="de-LU" smtClean="0"/>
+              <a:t>14</a:t>
+            </a:fld>
+            <a:endParaRPr lang="de-LU"/>
+          </a:p>
+        </p:txBody>
+      </p:sp>
+    </p:spTree>
+    <p:extLst>
+      <p:ext uri="{BB962C8B-B14F-4D97-AF65-F5344CB8AC3E}">
+        <p14:creationId xmlns:p14="http://schemas.microsoft.com/office/powerpoint/2010/main" val="1169706215"/>
+      </p:ext>
+    </p:extLst>
+  </p:cSld>
+  <p:clrMapOvr>
+    <a:masterClrMapping/>
+  </p:clrMapOvr>
+</p:notes>
+</file>
+
+<file path=ppt/notesSlides/notesSlide11.xml><?xml version="1.0" encoding="utf-8"?>
+<p:notes xmlns:a="http://schemas.openxmlformats.org/drawingml/2006/main" xmlns:r="http://schemas.openxmlformats.org/officeDocument/2006/relationships" xmlns:p="http://schemas.openxmlformats.org/presentationml/2006/main">
+  <p:cSld>
+    <p:spTree>
+      <p:nvGrpSpPr>
+        <p:cNvPr id="1" name=""/>
+        <p:cNvGrpSpPr/>
+        <p:nvPr/>
+      </p:nvGrpSpPr>
+      <p:grpSpPr>
+        <a:xfrm>
+          <a:off x="0" y="0"/>
+          <a:ext cx="0" cy="0"/>
+          <a:chOff x="0" y="0"/>
+          <a:chExt cx="0" cy="0"/>
+        </a:xfrm>
+      </p:grpSpPr>
+      <p:sp>
+        <p:nvSpPr>
+          <p:cNvPr id="2" name="Folienbildplatzhalter 1"/>
+          <p:cNvSpPr>
+            <a:spLocks noGrp="1" noRot="1" noChangeAspect="1"/>
+          </p:cNvSpPr>
+          <p:nvPr>
+            <p:ph type="sldImg"/>
+          </p:nvPr>
+        </p:nvSpPr>
+        <p:spPr/>
+      </p:sp>
+      <p:sp>
+        <p:nvSpPr>
+          <p:cNvPr id="3" name="Notizenplatzhalter 2"/>
+          <p:cNvSpPr>
+            <a:spLocks noGrp="1"/>
+          </p:cNvSpPr>
+          <p:nvPr>
+            <p:ph type="body" idx="1"/>
+          </p:nvPr>
+        </p:nvSpPr>
+        <p:spPr/>
+        <p:txBody>
+          <a:bodyPr/>
+          <a:lstStyle/>
+          <a:p>
+            <a:r>
+              <a:rPr lang="de-DE" dirty="0" err="1" smtClean="0"/>
+              <a:t>DialogView</a:t>
+            </a:r>
+            <a:r>
+              <a:rPr lang="de-DE" dirty="0" smtClean="0"/>
+              <a:t>: Wrapper für neue Dialoge</a:t>
+            </a:r>
+            <a:endParaRPr lang="de-DE" baseline="0" dirty="0" smtClean="0"/>
+          </a:p>
+          <a:p>
+            <a:r>
+              <a:rPr lang="de-DE" baseline="0" dirty="0" smtClean="0"/>
+              <a:t>Oberflächenelemente können mit einfachen Funktionen aus </a:t>
+            </a:r>
+            <a:r>
+              <a:rPr lang="de-DE" baseline="0" dirty="0" err="1" smtClean="0"/>
+              <a:t>ViewManager</a:t>
+            </a:r>
+            <a:r>
+              <a:rPr lang="de-DE" baseline="0" dirty="0" smtClean="0"/>
+              <a:t> eingefügt und angepasst werden</a:t>
+            </a:r>
+          </a:p>
+          <a:p>
+            <a:r>
+              <a:rPr lang="de-DE" baseline="0" dirty="0" smtClean="0"/>
+              <a:t>Sprachunterstützung: Bisher Deutsch und Englisch</a:t>
+            </a:r>
+          </a:p>
+          <a:p>
+            <a:r>
+              <a:rPr lang="de-DE" baseline="0" dirty="0" smtClean="0"/>
+              <a:t>Keine Textelemente wurden „</a:t>
+            </a:r>
+            <a:r>
+              <a:rPr lang="de-DE" baseline="0" dirty="0" err="1" smtClean="0"/>
+              <a:t>hardgecoded</a:t>
+            </a:r>
+            <a:r>
+              <a:rPr lang="de-DE" baseline="0" dirty="0" smtClean="0"/>
+              <a:t>“, d.h. es handelt sich um Variablen in </a:t>
+            </a:r>
+            <a:r>
+              <a:rPr lang="de-DE" baseline="0" smtClean="0"/>
+              <a:t>den Dialogen und Hinweisen, </a:t>
+            </a:r>
+            <a:r>
+              <a:rPr lang="de-DE" baseline="0" dirty="0" smtClean="0"/>
+              <a:t>nicht um feste Strings</a:t>
+            </a:r>
+          </a:p>
+        </p:txBody>
+      </p:sp>
+      <p:sp>
+        <p:nvSpPr>
+          <p:cNvPr id="4" name="Foliennummernplatzhalter 3"/>
+          <p:cNvSpPr>
+            <a:spLocks noGrp="1"/>
+          </p:cNvSpPr>
+          <p:nvPr>
+            <p:ph type="sldNum" sz="quarter" idx="10"/>
+          </p:nvPr>
+        </p:nvSpPr>
+        <p:spPr/>
+        <p:txBody>
+          <a:bodyPr/>
+          <a:lstStyle/>
+          <a:p>
+            <a:fld id="{97667336-ABAD-4032-8A72-A57DA0F2B670}" type="slidenum">
+              <a:rPr lang="de-LU" smtClean="0"/>
+              <a:t>15</a:t>
+            </a:fld>
+            <a:endParaRPr lang="de-LU"/>
+          </a:p>
+        </p:txBody>
+      </p:sp>
+    </p:spTree>
+    <p:extLst>
+      <p:ext uri="{BB962C8B-B14F-4D97-AF65-F5344CB8AC3E}">
+        <p14:creationId xmlns:p14="http://schemas.microsoft.com/office/powerpoint/2010/main" val="1031904754"/>
+      </p:ext>
+    </p:extLst>
+  </p:cSld>
+  <p:clrMapOvr>
+    <a:masterClrMapping/>
+  </p:clrMapOvr>
+</p:notes>
+</file>
+
 <file path=ppt/notesSlides/notesSlide2.xml><?xml version="1.0" encoding="utf-8"?>
 <p:notes xmlns:a="http://schemas.openxmlformats.org/drawingml/2006/main" xmlns:r="http://schemas.openxmlformats.org/officeDocument/2006/relationships" xmlns:p="http://schemas.openxmlformats.org/presentationml/2006/main">
   <p:cSld>
@@ -2200,6 +2422,40 @@
             </a:pPr>
             <a:endParaRPr lang="de-DE" baseline="0" dirty="0" smtClean="0"/>
           </a:p>
+          <a:p>
+            <a:pPr marL="0" indent="0">
+              <a:buFontTx/>
+              <a:buNone/>
+            </a:pPr>
+            <a:r>
+              <a:rPr lang="de-DE" baseline="0" dirty="0" smtClean="0"/>
+              <a:t>Fantastischer Support:</a:t>
+            </a:r>
+          </a:p>
+          <a:p>
+            <a:pPr marL="171450" indent="-171450">
+              <a:buFontTx/>
+              <a:buChar char="-"/>
+            </a:pPr>
+            <a:r>
+              <a:rPr lang="de-DE" baseline="0" dirty="0" smtClean="0"/>
+              <a:t>Geile Community</a:t>
+            </a:r>
+          </a:p>
+          <a:p>
+            <a:pPr marL="171450" indent="-171450">
+              <a:buFontTx/>
+              <a:buChar char="-"/>
+            </a:pPr>
+            <a:r>
+              <a:rPr lang="de-DE" baseline="0" dirty="0" err="1" smtClean="0"/>
+              <a:t>Rüsch</a:t>
+            </a:r>
+            <a:r>
+              <a:rPr lang="de-DE" baseline="0" dirty="0" smtClean="0"/>
+              <a:t> gute Doku</a:t>
+            </a:r>
+          </a:p>
         </p:txBody>
       </p:sp>
       <p:sp>
@@ -2492,13 +2748,8 @@
             </a:pPr>
             <a:r>
               <a:rPr lang="de-DE" baseline="0" dirty="0" smtClean="0"/>
-              <a:t>An bestimmten Stellen wird im Hintergrund gespeichert, bevor </a:t>
-            </a:r>
-            <a:r>
-              <a:rPr lang="de-DE" baseline="0" smtClean="0"/>
-              <a:t>die gewünschte Funktion ausgeführt wird</a:t>
-            </a:r>
-            <a:endParaRPr lang="de-DE" baseline="0" dirty="0" smtClean="0"/>
+              <a:t>An bestimmten Stellen wird im Hintergrund gespeichert, bevor die gewünschte Funktion ausgeführt wird</a:t>
+            </a:r>
           </a:p>
         </p:txBody>
       </p:sp>
@@ -2529,6 +2780,409 @@
     <p:extLst>
       <p:ext uri="{BB962C8B-B14F-4D97-AF65-F5344CB8AC3E}">
         <p14:creationId xmlns:p14="http://schemas.microsoft.com/office/powerpoint/2010/main" val="1837253011"/>
+      </p:ext>
+    </p:extLst>
+  </p:cSld>
+  <p:clrMapOvr>
+    <a:masterClrMapping/>
+  </p:clrMapOvr>
+</p:notes>
+</file>
+
+<file path=ppt/notesSlides/notesSlide8.xml><?xml version="1.0" encoding="utf-8"?>
+<p:notes xmlns:a="http://schemas.openxmlformats.org/drawingml/2006/main" xmlns:r="http://schemas.openxmlformats.org/officeDocument/2006/relationships" xmlns:p="http://schemas.openxmlformats.org/presentationml/2006/main">
+  <p:cSld>
+    <p:spTree>
+      <p:nvGrpSpPr>
+        <p:cNvPr id="1" name=""/>
+        <p:cNvGrpSpPr/>
+        <p:nvPr/>
+      </p:nvGrpSpPr>
+      <p:grpSpPr>
+        <a:xfrm>
+          <a:off x="0" y="0"/>
+          <a:ext cx="0" cy="0"/>
+          <a:chOff x="0" y="0"/>
+          <a:chExt cx="0" cy="0"/>
+        </a:xfrm>
+      </p:grpSpPr>
+      <p:sp>
+        <p:nvSpPr>
+          <p:cNvPr id="2" name="Folienbildplatzhalter 1"/>
+          <p:cNvSpPr>
+            <a:spLocks noGrp="1" noRot="1" noChangeAspect="1"/>
+          </p:cNvSpPr>
+          <p:nvPr>
+            <p:ph type="sldImg"/>
+          </p:nvPr>
+        </p:nvSpPr>
+        <p:spPr/>
+      </p:sp>
+      <p:sp>
+        <p:nvSpPr>
+          <p:cNvPr id="3" name="Notizenplatzhalter 2"/>
+          <p:cNvSpPr>
+            <a:spLocks noGrp="1"/>
+          </p:cNvSpPr>
+          <p:nvPr>
+            <p:ph type="body" idx="1"/>
+          </p:nvPr>
+        </p:nvSpPr>
+        <p:spPr/>
+        <p:txBody>
+          <a:bodyPr/>
+          <a:lstStyle/>
+          <a:p>
+            <a:pPr marL="0" indent="0">
+              <a:buFontTx/>
+              <a:buNone/>
+            </a:pPr>
+            <a:r>
+              <a:rPr lang="de-DE" baseline="0" dirty="0" smtClean="0"/>
+              <a:t>GIT</a:t>
+            </a:r>
+          </a:p>
+          <a:p>
+            <a:pPr marL="171450" indent="-171450">
+              <a:buFontTx/>
+              <a:buChar char="-"/>
+            </a:pPr>
+            <a:r>
+              <a:rPr lang="de-DE" baseline="0" dirty="0" smtClean="0"/>
+              <a:t>In Einstellungen des </a:t>
+            </a:r>
+            <a:r>
+              <a:rPr lang="de-DE" baseline="0" dirty="0" err="1" smtClean="0"/>
+              <a:t>Plugins</a:t>
+            </a:r>
+            <a:r>
+              <a:rPr lang="de-DE" baseline="0" dirty="0" smtClean="0"/>
+              <a:t> kann die Integration deaktiviert werden, ansonsten:</a:t>
+            </a:r>
+          </a:p>
+          <a:p>
+            <a:pPr marL="171450" indent="-171450">
+              <a:buFontTx/>
+              <a:buChar char="-"/>
+            </a:pPr>
+            <a:r>
+              <a:rPr lang="de-DE" baseline="0" dirty="0" smtClean="0"/>
+              <a:t>Beim Speichern wird an das Committen erinnert</a:t>
+            </a:r>
+          </a:p>
+          <a:p>
+            <a:pPr marL="171450" indent="-171450">
+              <a:buFontTx/>
+              <a:buChar char="-"/>
+            </a:pPr>
+            <a:endParaRPr lang="de-DE" baseline="0" dirty="0" smtClean="0"/>
+          </a:p>
+          <a:p>
+            <a:pPr marL="0" indent="0">
+              <a:buFontTx/>
+              <a:buNone/>
+            </a:pPr>
+            <a:r>
+              <a:rPr lang="de-DE" baseline="0" dirty="0" smtClean="0"/>
+              <a:t>Live-Vorschau:</a:t>
+            </a:r>
+          </a:p>
+          <a:p>
+            <a:pPr marL="171450" indent="-171450">
+              <a:buFontTx/>
+              <a:buChar char="-"/>
+            </a:pPr>
+            <a:r>
+              <a:rPr lang="de-DE" baseline="0" dirty="0" smtClean="0"/>
+              <a:t>Man kann sofort sehen was passiert</a:t>
+            </a:r>
+          </a:p>
+          <a:p>
+            <a:pPr marL="171450" indent="-171450">
+              <a:buFontTx/>
+              <a:buChar char="-"/>
+            </a:pPr>
+            <a:r>
+              <a:rPr lang="de-DE" baseline="0" dirty="0" smtClean="0"/>
+              <a:t>Latex </a:t>
+            </a:r>
+            <a:r>
+              <a:rPr lang="de-DE" baseline="0" dirty="0" err="1" smtClean="0"/>
+              <a:t>Formeluntersützung</a:t>
+            </a:r>
+            <a:endParaRPr lang="de-DE" baseline="0" dirty="0" smtClean="0"/>
+          </a:p>
+          <a:p>
+            <a:pPr marL="171450" indent="-171450">
+              <a:buFontTx/>
+              <a:buChar char="-"/>
+            </a:pPr>
+            <a:endParaRPr lang="de-DE" baseline="0" dirty="0" smtClean="0"/>
+          </a:p>
+          <a:p>
+            <a:pPr marL="171450" indent="-171450">
+              <a:buFontTx/>
+              <a:buChar char="-"/>
+            </a:pPr>
+            <a:endParaRPr lang="de-DE" baseline="0" dirty="0" smtClean="0"/>
+          </a:p>
+          <a:p>
+            <a:pPr marL="0" indent="0">
+              <a:buFontTx/>
+              <a:buNone/>
+            </a:pPr>
+            <a:r>
+              <a:rPr lang="de-DE" baseline="0" dirty="0" smtClean="0"/>
+              <a:t>Shortcuts für erfahrene Benutzer</a:t>
+            </a:r>
+          </a:p>
+          <a:p>
+            <a:pPr marL="171450" indent="-171450">
+              <a:buFontTx/>
+              <a:buChar char="-"/>
+            </a:pPr>
+            <a:r>
+              <a:rPr lang="de-DE" baseline="0" dirty="0" smtClean="0"/>
+              <a:t>Jede Funktion kann über einen Tastaturkurzbefehl aufgerufen werden</a:t>
+            </a:r>
+          </a:p>
+          <a:p>
+            <a:pPr marL="171450" indent="-171450">
+              <a:buFontTx/>
+              <a:buChar char="-"/>
+            </a:pPr>
+            <a:endParaRPr lang="de-DE" baseline="0" dirty="0" smtClean="0"/>
+          </a:p>
+          <a:p>
+            <a:pPr marL="0" indent="0">
+              <a:buFontTx/>
+              <a:buNone/>
+            </a:pPr>
+            <a:r>
+              <a:rPr lang="de-DE" baseline="0" dirty="0" smtClean="0"/>
+              <a:t>Unterstützung in der Ausführung einzelner Arbeitsschritte</a:t>
+            </a:r>
+          </a:p>
+          <a:p>
+            <a:pPr marL="171450" indent="-171450">
+              <a:buFontTx/>
+              <a:buChar char="-"/>
+            </a:pPr>
+            <a:r>
+              <a:rPr lang="de-DE" baseline="0" dirty="0" smtClean="0"/>
+              <a:t>Commit Abfrage beim Speichern</a:t>
+            </a:r>
+          </a:p>
+          <a:p>
+            <a:pPr marL="171450" indent="-171450">
+              <a:buFontTx/>
+              <a:buChar char="-"/>
+            </a:pPr>
+            <a:r>
+              <a:rPr lang="de-DE" baseline="0" dirty="0" smtClean="0"/>
+              <a:t>beim Speichern wird überprüft mit </a:t>
+            </a:r>
+            <a:r>
+              <a:rPr lang="de-DE" baseline="0" dirty="0" err="1" smtClean="0"/>
+              <a:t>mistkerl</a:t>
+            </a:r>
+            <a:endParaRPr lang="de-DE" baseline="0" dirty="0" smtClean="0"/>
+          </a:p>
+          <a:p>
+            <a:pPr marL="171450" indent="-171450">
+              <a:buFontTx/>
+              <a:buChar char="-"/>
+            </a:pPr>
+            <a:r>
+              <a:rPr lang="de-DE" baseline="0" dirty="0" smtClean="0"/>
+              <a:t>An bestimmten Stellen wird im Hintergrund gespeichert, bevor die gewünschte Funktion ausgeführt wird</a:t>
+            </a:r>
+          </a:p>
+        </p:txBody>
+      </p:sp>
+      <p:sp>
+        <p:nvSpPr>
+          <p:cNvPr id="4" name="Foliennummernplatzhalter 3"/>
+          <p:cNvSpPr>
+            <a:spLocks noGrp="1"/>
+          </p:cNvSpPr>
+          <p:nvPr>
+            <p:ph type="sldNum" sz="quarter" idx="10"/>
+          </p:nvPr>
+        </p:nvSpPr>
+        <p:spPr/>
+        <p:txBody>
+          <a:bodyPr/>
+          <a:lstStyle/>
+          <a:p>
+            <a:fld id="{97667336-ABAD-4032-8A72-A57DA0F2B670}" type="slidenum">
+              <a:rPr lang="de-LU" smtClean="0"/>
+              <a:t>12</a:t>
+            </a:fld>
+            <a:endParaRPr lang="de-LU"/>
+          </a:p>
+        </p:txBody>
+      </p:sp>
+    </p:spTree>
+    <p:extLst>
+      <p:ext uri="{BB962C8B-B14F-4D97-AF65-F5344CB8AC3E}">
+        <p14:creationId xmlns:p14="http://schemas.microsoft.com/office/powerpoint/2010/main" val="1772520538"/>
+      </p:ext>
+    </p:extLst>
+  </p:cSld>
+  <p:clrMapOvr>
+    <a:masterClrMapping/>
+  </p:clrMapOvr>
+</p:notes>
+</file>
+
+<file path=ppt/notesSlides/notesSlide9.xml><?xml version="1.0" encoding="utf-8"?>
+<p:notes xmlns:a="http://schemas.openxmlformats.org/drawingml/2006/main" xmlns:r="http://schemas.openxmlformats.org/officeDocument/2006/relationships" xmlns:p="http://schemas.openxmlformats.org/presentationml/2006/main">
+  <p:cSld>
+    <p:spTree>
+      <p:nvGrpSpPr>
+        <p:cNvPr id="1" name=""/>
+        <p:cNvGrpSpPr/>
+        <p:nvPr/>
+      </p:nvGrpSpPr>
+      <p:grpSpPr>
+        <a:xfrm>
+          <a:off x="0" y="0"/>
+          <a:ext cx="0" cy="0"/>
+          <a:chOff x="0" y="0"/>
+          <a:chExt cx="0" cy="0"/>
+        </a:xfrm>
+      </p:grpSpPr>
+      <p:sp>
+        <p:nvSpPr>
+          <p:cNvPr id="2" name="Folienbildplatzhalter 1"/>
+          <p:cNvSpPr>
+            <a:spLocks noGrp="1" noRot="1" noChangeAspect="1"/>
+          </p:cNvSpPr>
+          <p:nvPr>
+            <p:ph type="sldImg"/>
+          </p:nvPr>
+        </p:nvSpPr>
+        <p:spPr/>
+      </p:sp>
+      <p:sp>
+        <p:nvSpPr>
+          <p:cNvPr id="3" name="Notizenplatzhalter 2"/>
+          <p:cNvSpPr>
+            <a:spLocks noGrp="1"/>
+          </p:cNvSpPr>
+          <p:nvPr>
+            <p:ph type="body" idx="1"/>
+          </p:nvPr>
+        </p:nvSpPr>
+        <p:spPr/>
+        <p:txBody>
+          <a:bodyPr/>
+          <a:lstStyle/>
+          <a:p>
+            <a:r>
+              <a:rPr lang="de-DE" dirty="0" smtClean="0"/>
+              <a:t>GUIs:</a:t>
+            </a:r>
+            <a:endParaRPr lang="de-DE" dirty="0"/>
+          </a:p>
+          <a:p>
+            <a:pPr marL="171450" indent="-171450">
+              <a:buFontTx/>
+              <a:buChar char="-"/>
+            </a:pPr>
+            <a:r>
+              <a:rPr lang="de-DE" baseline="0" dirty="0" smtClean="0"/>
+              <a:t>Dialoge mit Textfeldern und eindeutigen Hinweisen</a:t>
+            </a:r>
+          </a:p>
+          <a:p>
+            <a:pPr marL="171450" indent="-171450">
+              <a:buFontTx/>
+              <a:buChar char="-"/>
+            </a:pPr>
+            <a:r>
+              <a:rPr lang="de-DE" dirty="0" smtClean="0"/>
+              <a:t>Bilder:</a:t>
+            </a:r>
+            <a:r>
+              <a:rPr lang="de-DE" baseline="0" dirty="0" smtClean="0"/>
+              <a:t> </a:t>
+            </a:r>
+            <a:r>
+              <a:rPr lang="de-DE" baseline="0" dirty="0" err="1" smtClean="0"/>
+              <a:t>matuc</a:t>
+            </a:r>
+            <a:r>
+              <a:rPr lang="de-DE" baseline="0" dirty="0" smtClean="0"/>
+              <a:t> </a:t>
+            </a:r>
+            <a:r>
+              <a:rPr lang="de-DE" baseline="0" dirty="0" err="1" smtClean="0"/>
+              <a:t>imgdsc</a:t>
+            </a:r>
+            <a:r>
+              <a:rPr lang="de-DE" baseline="0" dirty="0" smtClean="0"/>
+              <a:t> wird aufgerufen, es wird programmatisch entschieden, ob Bildbeschreibungen ausgelagert werden</a:t>
+            </a:r>
+          </a:p>
+          <a:p>
+            <a:pPr marL="171450" indent="-171450">
+              <a:buFontTx/>
+              <a:buChar char="-"/>
+            </a:pPr>
+            <a:r>
+              <a:rPr lang="de-DE" baseline="0" dirty="0" smtClean="0"/>
+              <a:t>Tabellen: verschiedene </a:t>
+            </a:r>
+            <a:r>
+              <a:rPr lang="de-DE" baseline="0" dirty="0" err="1" smtClean="0"/>
+              <a:t>Markdown</a:t>
+            </a:r>
+            <a:r>
+              <a:rPr lang="de-DE" baseline="0" dirty="0" smtClean="0"/>
+              <a:t> Tabellentypen werden angeboten, nicht alle von Live-Preview unterstützt (siehe Ausblick)</a:t>
+            </a:r>
+          </a:p>
+          <a:p>
+            <a:pPr marL="171450" indent="-171450">
+              <a:buFontTx/>
+              <a:buChar char="-"/>
+            </a:pPr>
+            <a:r>
+              <a:rPr lang="de-DE" baseline="0" dirty="0" smtClean="0"/>
+              <a:t>CSV Import von Tabellen möglich</a:t>
+            </a:r>
+          </a:p>
+        </p:txBody>
+      </p:sp>
+      <p:sp>
+        <p:nvSpPr>
+          <p:cNvPr id="4" name="Foliennummernplatzhalter 3"/>
+          <p:cNvSpPr>
+            <a:spLocks noGrp="1"/>
+          </p:cNvSpPr>
+          <p:nvPr>
+            <p:ph type="sldNum" sz="quarter" idx="10"/>
+          </p:nvPr>
+        </p:nvSpPr>
+        <p:spPr/>
+        <p:txBody>
+          <a:bodyPr/>
+          <a:lstStyle/>
+          <a:p>
+            <a:fld id="{97667336-ABAD-4032-8A72-A57DA0F2B670}" type="slidenum">
+              <a:rPr lang="de-LU" smtClean="0"/>
+              <a:t>13</a:t>
+            </a:fld>
+            <a:endParaRPr lang="de-LU"/>
+          </a:p>
+        </p:txBody>
+      </p:sp>
+    </p:spTree>
+    <p:extLst>
+      <p:ext uri="{BB962C8B-B14F-4D97-AF65-F5344CB8AC3E}">
+        <p14:creationId xmlns:p14="http://schemas.microsoft.com/office/powerpoint/2010/main" val="518083529"/>
       </p:ext>
     </p:extLst>
   </p:cSld>
@@ -6710,7 +7364,7 @@
         </p:nvSpPr>
         <p:spPr>
           <a:xfrm>
-            <a:off x="2123728" y="1691516"/>
+            <a:off x="2051720" y="1691516"/>
             <a:ext cx="1510542" cy="369332"/>
           </a:xfrm>
           <a:prstGeom prst="rect">
@@ -6820,7 +7474,7 @@
         </p:nvSpPr>
         <p:spPr>
           <a:xfrm>
-            <a:off x="3634270" y="5517232"/>
+            <a:off x="5344418" y="5257706"/>
             <a:ext cx="2268826" cy="369332"/>
           </a:xfrm>
           <a:prstGeom prst="rect">
@@ -6837,36 +7491,6 @@
             <a:r>
               <a:rPr lang="de-DE" dirty="0" smtClean="0"/>
               <a:t>Package-Einstellungen</a:t>
-            </a:r>
-            <a:endParaRPr lang="de-DE" dirty="0"/>
-          </a:p>
-        </p:txBody>
-      </p:sp>
-      <p:sp>
-        <p:nvSpPr>
-          <p:cNvPr id="14" name="Textfeld 13"/>
-          <p:cNvSpPr txBox="1"/>
-          <p:nvPr/>
-        </p:nvSpPr>
-        <p:spPr>
-          <a:xfrm>
-            <a:off x="399820" y="2564904"/>
-            <a:ext cx="1999137" cy="369332"/>
-          </a:xfrm>
-          <a:prstGeom prst="rect">
-            <a:avLst/>
-          </a:prstGeom>
-          <a:noFill/>
-        </p:spPr>
-        <p:txBody>
-          <a:bodyPr wrap="none" rtlCol="0">
-            <a:spAutoFit/>
-          </a:bodyPr>
-          <a:lstStyle/>
-          <a:p>
-            <a:r>
-              <a:rPr lang="de-DE" dirty="0" smtClean="0"/>
-              <a:t>Vorteile des Editors</a:t>
             </a:r>
             <a:endParaRPr lang="de-DE" dirty="0"/>
           </a:p>
@@ -6899,6 +7523,36 @@
               <a:t>Vorteile des Editors</a:t>
             </a:r>
             <a:endParaRPr lang="de-DE" b="1" dirty="0"/>
+          </a:p>
+        </p:txBody>
+      </p:sp>
+      <p:sp>
+        <p:nvSpPr>
+          <p:cNvPr id="17" name="Textfeld 16"/>
+          <p:cNvSpPr txBox="1"/>
+          <p:nvPr/>
+        </p:nvSpPr>
+        <p:spPr>
+          <a:xfrm>
+            <a:off x="2629017" y="5257706"/>
+            <a:ext cx="934871" cy="369332"/>
+          </a:xfrm>
+          <a:prstGeom prst="rect">
+            <a:avLst/>
+          </a:prstGeom>
+          <a:noFill/>
+        </p:spPr>
+        <p:txBody>
+          <a:bodyPr wrap="none" rtlCol="0">
+            <a:spAutoFit/>
+          </a:bodyPr>
+          <a:lstStyle/>
+          <a:p>
+            <a:r>
+              <a:rPr lang="de-DE" smtClean="0"/>
+              <a:t>Support</a:t>
+            </a:r>
+            <a:endParaRPr lang="de-DE"/>
           </a:p>
         </p:txBody>
       </p:sp>
@@ -6999,7 +7653,7 @@
           <a:p>
             <a:fld id="{852F18A7-60EF-DD48-8F37-BE93452F0A67}" type="datetime1">
               <a:rPr lang="de-DE" smtClean="0"/>
-              <a:t>24.10.16</a:t>
+              <a:t>25.10.16</a:t>
             </a:fld>
             <a:endParaRPr lang="de-DE" dirty="0"/>
           </a:p>
@@ -7046,7 +7700,7 @@
         <p:spPr>
           <a:xfrm>
             <a:off x="76971" y="1106160"/>
-            <a:ext cx="3773597" cy="369332"/>
+            <a:ext cx="4271682" cy="369332"/>
           </a:xfrm>
           <a:prstGeom prst="rect">
             <a:avLst/>
@@ -7061,7 +7715,7 @@
           <a:p>
             <a:r>
               <a:rPr lang="de-DE" b="1" dirty="0" smtClean="0"/>
-              <a:t>Funktionalität der neuen Erweiterung</a:t>
+              <a:t>Eingesetzte Werkzeuge für die Entwicklung</a:t>
             </a:r>
             <a:endParaRPr lang="de-DE" b="1" dirty="0"/>
           </a:p>
@@ -7260,20 +7914,107 @@
           </a:lstStyle>
           <a:p>
             <a:pPr marL="342900" indent="-342900">
+              <a:lnSpc>
+                <a:spcPts val="2600"/>
+              </a:lnSpc>
               <a:buFont typeface=".AppleSystemUIFont" charset="-120"/>
               <a:buChar char="-"/>
             </a:pPr>
             <a:r>
-              <a:rPr lang="de-DE" dirty="0"/>
-              <a:t>Live-Vorschau mit </a:t>
+              <a:rPr lang="de-DE" dirty="0" smtClean="0"/>
+              <a:t>Entwicklung des Atom-Packages in Atom</a:t>
+            </a:r>
+          </a:p>
+          <a:p>
+            <a:pPr marL="342900" indent="-342900">
+              <a:lnSpc>
+                <a:spcPts val="2600"/>
+              </a:lnSpc>
+              <a:buFont typeface=".AppleSystemUIFont" charset="-120"/>
+              <a:buChar char="-"/>
+            </a:pPr>
+            <a:r>
+              <a:rPr lang="de-DE" dirty="0" err="1"/>
+              <a:t>g</a:t>
             </a:r>
             <a:r>
               <a:rPr lang="de-DE" dirty="0" err="1" smtClean="0"/>
-              <a:t>LaTeX</a:t>
+              <a:t>it</a:t>
             </a:r>
             <a:r>
               <a:rPr lang="de-DE" dirty="0" smtClean="0"/>
-              <a:t>-Umsetzung</a:t>
+              <a:t> als Versionskontrolle</a:t>
+            </a:r>
+            <a:br>
+              <a:rPr lang="de-DE" dirty="0" smtClean="0"/>
+            </a:br>
+            <a:r>
+              <a:rPr lang="de-DE" dirty="0" smtClean="0">
+                <a:sym typeface="Wingdings"/>
+              </a:rPr>
+              <a:t> </a:t>
+            </a:r>
+            <a:r>
+              <a:rPr lang="de-DE" dirty="0" err="1" smtClean="0">
+                <a:sym typeface="Wingdings"/>
+              </a:rPr>
+              <a:t>GitHub</a:t>
+            </a:r>
+            <a:r>
+              <a:rPr lang="de-DE" dirty="0" smtClean="0">
+                <a:sym typeface="Wingdings"/>
+              </a:rPr>
+              <a:t> als Ticketsystem</a:t>
+            </a:r>
+          </a:p>
+          <a:p>
+            <a:pPr marL="342900" indent="-342900">
+              <a:lnSpc>
+                <a:spcPts val="2600"/>
+              </a:lnSpc>
+              <a:buFont typeface=".AppleSystemUIFont" charset="-120"/>
+              <a:buChar char="-"/>
+            </a:pPr>
+            <a:r>
+              <a:rPr lang="de-DE" dirty="0" smtClean="0">
+                <a:sym typeface="Wingdings"/>
+              </a:rPr>
+              <a:t>Programmiersprachen:</a:t>
+            </a:r>
+          </a:p>
+          <a:p>
+            <a:pPr marL="631825" lvl="3" indent="-342900">
+              <a:lnSpc>
+                <a:spcPts val="2600"/>
+              </a:lnSpc>
+              <a:buFont typeface="Wingdings" charset="2"/>
+              <a:buChar char="§"/>
+            </a:pPr>
+            <a:r>
+              <a:rPr lang="de-DE" dirty="0" smtClean="0"/>
+              <a:t>JavaScript		5474 Zeilen Code</a:t>
+            </a:r>
+            <a:endParaRPr lang="de-DE" dirty="0"/>
+          </a:p>
+          <a:p>
+            <a:pPr marL="631825" lvl="3" indent="-342900">
+              <a:lnSpc>
+                <a:spcPts val="2600"/>
+              </a:lnSpc>
+              <a:buFont typeface="Wingdings" charset="2"/>
+              <a:buChar char="§"/>
+            </a:pPr>
+            <a:r>
+              <a:rPr lang="de-DE" dirty="0" err="1"/>
+              <a:t>l</a:t>
+            </a:r>
+            <a:r>
+              <a:rPr lang="de-DE" dirty="0" err="1" smtClean="0"/>
+              <a:t>ess</a:t>
+            </a:r>
+            <a:r>
+              <a:rPr lang="de-DE" dirty="0" smtClean="0"/>
+              <a:t>		1662 Zeilen Code</a:t>
             </a:r>
           </a:p>
           <a:p>
@@ -7281,137 +8022,14 @@
               <a:buFont typeface=".AppleSystemUIFont" charset="-120"/>
               <a:buChar char="-"/>
             </a:pPr>
-            <a:r>
-              <a:rPr lang="de-DE" dirty="0" smtClean="0"/>
-              <a:t>GUIs </a:t>
-            </a:r>
-            <a:r>
-              <a:rPr lang="de-DE" dirty="0"/>
-              <a:t>für</a:t>
-            </a:r>
+            <a:endParaRPr lang="de-DE" dirty="0" smtClean="0"/>
           </a:p>
           <a:p>
             <a:pPr marL="631825" lvl="3" indent="-342900">
               <a:buFont typeface="Wingdings" charset="2"/>
               <a:buChar char="§"/>
             </a:pPr>
-            <a:r>
-              <a:rPr lang="de-DE" dirty="0" err="1"/>
-              <a:t>Markdown</a:t>
-            </a:r>
-            <a:r>
-              <a:rPr lang="de-DE" dirty="0"/>
-              <a:t>-Syntax</a:t>
-            </a:r>
-          </a:p>
-          <a:p>
-            <a:pPr marL="631825" lvl="3" indent="-342900">
-              <a:buFont typeface="Wingdings" charset="2"/>
-              <a:buChar char="§"/>
-            </a:pPr>
-            <a:r>
-              <a:rPr lang="de-DE" dirty="0"/>
-              <a:t>Anlegen eines neuen </a:t>
-            </a:r>
-            <a:r>
-              <a:rPr lang="de-DE" dirty="0" smtClean="0"/>
-              <a:t>Projekts</a:t>
-            </a:r>
-          </a:p>
-          <a:p>
-            <a:pPr marL="631825" lvl="3" indent="-342900">
-              <a:buFont typeface="Wingdings" charset="2"/>
-              <a:buChar char="§"/>
-            </a:pPr>
-            <a:r>
-              <a:rPr lang="de-DE" dirty="0" smtClean="0"/>
-              <a:t>Bearbeiten der Metadaten</a:t>
-            </a:r>
             <a:endParaRPr lang="de-DE" dirty="0"/>
-          </a:p>
-          <a:p>
-            <a:pPr marL="631825" lvl="3" indent="-342900">
-              <a:buFont typeface="Wingdings" charset="2"/>
-              <a:buChar char="§"/>
-            </a:pPr>
-            <a:r>
-              <a:rPr lang="de-DE" dirty="0"/>
-              <a:t>Einfügen von Links</a:t>
-            </a:r>
-          </a:p>
-          <a:p>
-            <a:pPr marL="631825" lvl="3" indent="-342900">
-              <a:buFont typeface="Wingdings" charset="2"/>
-              <a:buChar char="§"/>
-            </a:pPr>
-            <a:r>
-              <a:rPr lang="de-DE" dirty="0"/>
-              <a:t>Einfügen von Bildern</a:t>
-            </a:r>
-          </a:p>
-          <a:p>
-            <a:pPr marL="631825" lvl="3" indent="-342900">
-              <a:buFont typeface="Wingdings" charset="2"/>
-              <a:buChar char="§"/>
-            </a:pPr>
-            <a:r>
-              <a:rPr lang="de-DE" dirty="0"/>
-              <a:t>Einfügen von Tabellen</a:t>
-            </a:r>
-          </a:p>
-          <a:p>
-            <a:pPr marL="631825" lvl="3" indent="-342900">
-              <a:buFont typeface="Wingdings" charset="2"/>
-              <a:buChar char="§"/>
-            </a:pPr>
-            <a:r>
-              <a:rPr lang="de-DE" dirty="0" err="1"/>
-              <a:t>git</a:t>
-            </a:r>
-            <a:r>
-              <a:rPr lang="de-DE" dirty="0"/>
-              <a:t> </a:t>
-            </a:r>
-            <a:r>
-              <a:rPr lang="de-DE" dirty="0" err="1"/>
-              <a:t>commit</a:t>
-            </a:r>
-            <a:r>
-              <a:rPr lang="de-DE" dirty="0"/>
-              <a:t> </a:t>
-            </a:r>
-            <a:r>
-              <a:rPr lang="de-DE" dirty="0" smtClean="0"/>
-              <a:t>Nachrichten</a:t>
-            </a:r>
-          </a:p>
-          <a:p>
-            <a:pPr marL="342900" lvl="2" indent="-342900">
-              <a:buFont typeface=".AppleSystemUIFont" charset="-120"/>
-              <a:buChar char="-"/>
-            </a:pPr>
-            <a:r>
-              <a:rPr lang="de-DE" sz="2000" dirty="0" err="1"/>
-              <a:t>g</a:t>
-            </a:r>
-            <a:r>
-              <a:rPr lang="de-DE" sz="2000" dirty="0" err="1" smtClean="0"/>
-              <a:t>it</a:t>
-            </a:r>
-            <a:r>
-              <a:rPr lang="de-DE" sz="2000" dirty="0" smtClean="0"/>
-              <a:t>-Integration</a:t>
-            </a:r>
-          </a:p>
-          <a:p>
-            <a:pPr marL="342900" indent="-342900">
-              <a:buFont typeface=".AppleSystemUIFont" charset="-120"/>
-              <a:buChar char="-"/>
-            </a:pPr>
-            <a:r>
-              <a:rPr lang="de-DE" dirty="0" smtClean="0"/>
-              <a:t>Unterstützung in der Ausführung einzelner Arbeitsschritte</a:t>
-            </a:r>
           </a:p>
         </p:txBody>
       </p:sp>
@@ -7419,6 +8037,2110 @@
     <p:extLst>
       <p:ext uri="{BB962C8B-B14F-4D97-AF65-F5344CB8AC3E}">
         <p14:creationId xmlns:p14="http://schemas.microsoft.com/office/powerpoint/2010/main" val="1782800565"/>
+      </p:ext>
+    </p:extLst>
+  </p:cSld>
+  <p:clrMapOvr>
+    <a:masterClrMapping/>
+  </p:clrMapOvr>
+  <p:transition spd="slow">
+    <p:push dir="u"/>
+  </p:transition>
+  <p:timing>
+    <p:tnLst>
+      <p:par>
+        <p:cTn id="1" dur="indefinite" restart="never" nodeType="tmRoot"/>
+      </p:par>
+    </p:tnLst>
+  </p:timing>
+</p:sld>
+</file>
+
+<file path=ppt/slides/slide12.xml><?xml version="1.0" encoding="utf-8"?>
+<p:sld xmlns:a="http://schemas.openxmlformats.org/drawingml/2006/main" xmlns:r="http://schemas.openxmlformats.org/officeDocument/2006/relationships" xmlns:p="http://schemas.openxmlformats.org/presentationml/2006/main">
+  <p:cSld>
+    <p:spTree>
+      <p:nvGrpSpPr>
+        <p:cNvPr id="1" name=""/>
+        <p:cNvGrpSpPr/>
+        <p:nvPr/>
+      </p:nvGrpSpPr>
+      <p:grpSpPr>
+        <a:xfrm>
+          <a:off x="0" y="0"/>
+          <a:ext cx="0" cy="0"/>
+          <a:chOff x="0" y="0"/>
+          <a:chExt cx="0" cy="0"/>
+        </a:xfrm>
+      </p:grpSpPr>
+      <p:sp>
+        <p:nvSpPr>
+          <p:cNvPr id="3" name="Inhaltsplatzhalter 2"/>
+          <p:cNvSpPr>
+            <a:spLocks noGrp="1"/>
+          </p:cNvSpPr>
+          <p:nvPr>
+            <p:ph sz="quarter" idx="19"/>
+          </p:nvPr>
+        </p:nvSpPr>
+        <p:spPr>
+          <a:xfrm>
+            <a:off x="0" y="764704"/>
+            <a:ext cx="9144000" cy="288032"/>
+          </a:xfrm>
+        </p:spPr>
+        <p:txBody>
+          <a:bodyPr anchor="ctr"/>
+          <a:lstStyle/>
+          <a:p>
+            <a:pPr algn="ctr"/>
+            <a:r>
+              <a:rPr lang="de-DE" sz="1200" b="0" dirty="0"/>
+              <a:t>1. Zielstellung &gt; 2. Bestehende Lösungsansätze &gt; </a:t>
+            </a:r>
+            <a:r>
+              <a:rPr lang="de-DE" sz="1200" b="0" dirty="0">
+                <a:solidFill>
+                  <a:schemeClr val="tx1"/>
+                </a:solidFill>
+              </a:rPr>
+              <a:t>3. Entwicklung einer neuen Erweiterung für ATOM</a:t>
+            </a:r>
+            <a:r>
+              <a:rPr lang="de-DE" sz="1200" b="0" dirty="0"/>
+              <a:t> &gt; 4. Ausblick</a:t>
+            </a:r>
+          </a:p>
+        </p:txBody>
+      </p:sp>
+      <p:sp>
+        <p:nvSpPr>
+          <p:cNvPr id="4" name="Datumsplatzhalter 3"/>
+          <p:cNvSpPr>
+            <a:spLocks noGrp="1"/>
+          </p:cNvSpPr>
+          <p:nvPr>
+            <p:ph type="dt" sz="half" idx="20"/>
+          </p:nvPr>
+        </p:nvSpPr>
+        <p:spPr/>
+        <p:txBody>
+          <a:bodyPr/>
+          <a:lstStyle/>
+          <a:p>
+            <a:fld id="{852F18A7-60EF-DD48-8F37-BE93452F0A67}" type="datetime1">
+              <a:rPr lang="de-DE" smtClean="0"/>
+              <a:t>25.10.16</a:t>
+            </a:fld>
+            <a:endParaRPr lang="de-DE" dirty="0"/>
+          </a:p>
+        </p:txBody>
+      </p:sp>
+      <p:sp>
+        <p:nvSpPr>
+          <p:cNvPr id="6" name="Foliennummernplatzhalter 5"/>
+          <p:cNvSpPr>
+            <a:spLocks noGrp="1"/>
+          </p:cNvSpPr>
+          <p:nvPr>
+            <p:ph type="sldNum" sz="quarter" idx="22"/>
+          </p:nvPr>
+        </p:nvSpPr>
+        <p:spPr/>
+        <p:txBody>
+          <a:bodyPr/>
+          <a:lstStyle/>
+          <a:p>
+            <a:r>
+              <a:rPr lang="de-DE"/>
+              <a:t>Folie </a:t>
+            </a:r>
+            <a:fld id="{20336FBE-96EF-1B43-9998-83765DDB0397}" type="slidenum">
+              <a:rPr lang="de-DE" smtClean="0"/>
+              <a:pPr/>
+              <a:t>12</a:t>
+            </a:fld>
+            <a:r>
+              <a:rPr lang="de-DE"/>
+              <a:t> von XYZ</a:t>
+            </a:r>
+            <a:endParaRPr lang="de-DE" dirty="0"/>
+          </a:p>
+        </p:txBody>
+      </p:sp>
+      <p:sp>
+        <p:nvSpPr>
+          <p:cNvPr id="7" name="Textfeld 6"/>
+          <p:cNvSpPr txBox="1"/>
+          <p:nvPr/>
+        </p:nvSpPr>
+        <p:spPr>
+          <a:xfrm>
+            <a:off x="76971" y="1106160"/>
+            <a:ext cx="3773597" cy="369332"/>
+          </a:xfrm>
+          <a:prstGeom prst="rect">
+            <a:avLst/>
+          </a:prstGeom>
+          <a:noFill/>
+        </p:spPr>
+        <p:txBody>
+          <a:bodyPr wrap="none" rtlCol="0">
+            <a:spAutoFit/>
+          </a:bodyPr>
+          <a:lstStyle/>
+          <a:p>
+            <a:r>
+              <a:rPr lang="de-DE" b="1" dirty="0" smtClean="0"/>
+              <a:t>Funktionalität der neuen Erweiterung</a:t>
+            </a:r>
+            <a:endParaRPr lang="de-DE" b="1" dirty="0"/>
+          </a:p>
+        </p:txBody>
+      </p:sp>
+      <p:sp>
+        <p:nvSpPr>
+          <p:cNvPr id="8" name="Inhaltsplatzhalter 1"/>
+          <p:cNvSpPr txBox="1">
+            <a:spLocks/>
+          </p:cNvSpPr>
+          <p:nvPr/>
+        </p:nvSpPr>
+        <p:spPr>
+          <a:xfrm>
+            <a:off x="655637" y="1556792"/>
+            <a:ext cx="7832725" cy="4608041"/>
+          </a:xfrm>
+          <a:prstGeom prst="rect">
+            <a:avLst/>
+          </a:prstGeom>
+        </p:spPr>
+        <p:txBody>
+          <a:bodyPr lIns="0" tIns="0" rIns="0" bIns="0"/>
+          <a:lstStyle>
+            <a:lvl1pPr marL="0" marR="0" indent="0" algn="l" defTabSz="914368" rtl="0" eaLnBrk="1" fontAlgn="t" latinLnBrk="0" hangingPunct="1">
+              <a:lnSpc>
+                <a:spcPct val="100000"/>
+              </a:lnSpc>
+              <a:spcBef>
+                <a:spcPts val="0"/>
+              </a:spcBef>
+              <a:spcAft>
+                <a:spcPts val="600"/>
+              </a:spcAft>
+              <a:buClrTx/>
+              <a:buSzTx/>
+              <a:buFontTx/>
+              <a:buNone/>
+              <a:tabLst/>
+              <a:defRPr sz="2000" kern="1200" baseline="0">
+                <a:solidFill>
+                  <a:srgbClr val="0B2A51"/>
+                </a:solidFill>
+                <a:latin typeface="Verdana" pitchFamily="34" charset="0"/>
+                <a:ea typeface="+mn-ea"/>
+                <a:cs typeface="+mn-cs"/>
+              </a:defRPr>
+            </a:lvl1pPr>
+            <a:lvl2pPr marL="161925" indent="-161925" algn="l" defTabSz="914368" rtl="0" eaLnBrk="1" fontAlgn="t" latinLnBrk="0" hangingPunct="1">
+              <a:spcBef>
+                <a:spcPts val="300"/>
+              </a:spcBef>
+              <a:spcAft>
+                <a:spcPts val="600"/>
+              </a:spcAft>
+              <a:buClr>
+                <a:schemeClr val="tx1"/>
+              </a:buClr>
+              <a:buSzPct val="120000"/>
+              <a:buFont typeface="LucidaGrande" charset="0"/>
+              <a:buChar char="_"/>
+              <a:tabLst/>
+              <a:defRPr sz="2000" kern="1200" baseline="0">
+                <a:solidFill>
+                  <a:srgbClr val="0B2A51"/>
+                </a:solidFill>
+                <a:latin typeface="Verdana" pitchFamily="34" charset="0"/>
+                <a:ea typeface="+mn-ea"/>
+                <a:cs typeface="+mn-cs"/>
+              </a:defRPr>
+            </a:lvl2pPr>
+            <a:lvl3pPr marL="0" indent="0" algn="l" defTabSz="914368" rtl="0" eaLnBrk="1" fontAlgn="t" latinLnBrk="0" hangingPunct="1">
+              <a:spcBef>
+                <a:spcPts val="0"/>
+              </a:spcBef>
+              <a:spcAft>
+                <a:spcPts val="600"/>
+              </a:spcAft>
+              <a:buSzPct val="100000"/>
+              <a:buFont typeface="Symbol" charset="2"/>
+              <a:buNone/>
+              <a:tabLst/>
+              <a:defRPr sz="1600" kern="1200" baseline="0">
+                <a:solidFill>
+                  <a:srgbClr val="0B2A51"/>
+                </a:solidFill>
+                <a:latin typeface="Verdana" pitchFamily="34" charset="0"/>
+                <a:ea typeface="+mn-ea"/>
+                <a:cs typeface="+mn-cs"/>
+              </a:defRPr>
+            </a:lvl3pPr>
+            <a:lvl4pPr marL="288925" indent="-127000" algn="l" defTabSz="914368" rtl="0" eaLnBrk="1" latinLnBrk="0" hangingPunct="1">
+              <a:spcBef>
+                <a:spcPts val="0"/>
+              </a:spcBef>
+              <a:spcAft>
+                <a:spcPts val="600"/>
+              </a:spcAft>
+              <a:buClr>
+                <a:schemeClr val="tx1"/>
+              </a:buClr>
+              <a:buSzPct val="100000"/>
+              <a:buFont typeface="LucidaGrande" charset="0"/>
+              <a:buChar char="_"/>
+              <a:tabLst/>
+              <a:defRPr sz="1600" kern="1200" baseline="0">
+                <a:solidFill>
+                  <a:srgbClr val="0B2A51"/>
+                </a:solidFill>
+                <a:latin typeface="Verdana" pitchFamily="34" charset="0"/>
+                <a:ea typeface="+mn-ea"/>
+                <a:cs typeface="+mn-cs"/>
+              </a:defRPr>
+            </a:lvl4pPr>
+            <a:lvl5pPr marL="415925" indent="-127000" algn="l" defTabSz="914368" rtl="0" eaLnBrk="1" latinLnBrk="0" hangingPunct="1">
+              <a:spcBef>
+                <a:spcPts val="0"/>
+              </a:spcBef>
+              <a:spcAft>
+                <a:spcPts val="600"/>
+              </a:spcAft>
+              <a:buSzPct val="170000"/>
+              <a:buFont typeface="AppleSymbols" charset="0"/>
+              <a:buChar char="⌞"/>
+              <a:tabLst/>
+              <a:defRPr sz="1600" kern="1200" baseline="0">
+                <a:solidFill>
+                  <a:srgbClr val="0B2A51"/>
+                </a:solidFill>
+                <a:latin typeface="Verdana" pitchFamily="34" charset="0"/>
+                <a:ea typeface="+mn-ea"/>
+                <a:cs typeface="+mn-cs"/>
+              </a:defRPr>
+            </a:lvl5pPr>
+            <a:lvl6pPr marL="2514512" indent="-228592" algn="l" defTabSz="914368" rtl="0" eaLnBrk="1" latinLnBrk="0" hangingPunct="1">
+              <a:spcBef>
+                <a:spcPct val="20000"/>
+              </a:spcBef>
+              <a:buFont typeface="Arial" pitchFamily="34" charset="0"/>
+              <a:buChar char="•"/>
+              <a:defRPr sz="2000" kern="1200">
+                <a:solidFill>
+                  <a:schemeClr val="tx1"/>
+                </a:solidFill>
+                <a:latin typeface="+mn-lt"/>
+                <a:ea typeface="+mn-ea"/>
+                <a:cs typeface="+mn-cs"/>
+              </a:defRPr>
+            </a:lvl6pPr>
+            <a:lvl7pPr marL="2971696" indent="-228592" algn="l" defTabSz="914368" rtl="0" eaLnBrk="1" latinLnBrk="0" hangingPunct="1">
+              <a:spcBef>
+                <a:spcPct val="20000"/>
+              </a:spcBef>
+              <a:buFont typeface="Arial" pitchFamily="34" charset="0"/>
+              <a:buChar char="•"/>
+              <a:defRPr sz="2000" kern="1200">
+                <a:solidFill>
+                  <a:schemeClr val="tx1"/>
+                </a:solidFill>
+                <a:latin typeface="+mn-lt"/>
+                <a:ea typeface="+mn-ea"/>
+                <a:cs typeface="+mn-cs"/>
+              </a:defRPr>
+            </a:lvl7pPr>
+            <a:lvl8pPr marL="3428880" indent="-228592" algn="l" defTabSz="914368" rtl="0" eaLnBrk="1" latinLnBrk="0" hangingPunct="1">
+              <a:spcBef>
+                <a:spcPct val="20000"/>
+              </a:spcBef>
+              <a:buFont typeface="Arial" pitchFamily="34" charset="0"/>
+              <a:buChar char="•"/>
+              <a:defRPr sz="2000" kern="1200">
+                <a:solidFill>
+                  <a:schemeClr val="tx1"/>
+                </a:solidFill>
+                <a:latin typeface="+mn-lt"/>
+                <a:ea typeface="+mn-ea"/>
+                <a:cs typeface="+mn-cs"/>
+              </a:defRPr>
+            </a:lvl8pPr>
+            <a:lvl9pPr marL="3886064" indent="-228592" algn="l" defTabSz="914368" rtl="0" eaLnBrk="1" latinLnBrk="0" hangingPunct="1">
+              <a:spcBef>
+                <a:spcPct val="20000"/>
+              </a:spcBef>
+              <a:buFont typeface="Arial" pitchFamily="34" charset="0"/>
+              <a:buChar char="•"/>
+              <a:defRPr sz="2000" kern="1200">
+                <a:solidFill>
+                  <a:schemeClr val="tx1"/>
+                </a:solidFill>
+                <a:latin typeface="+mn-lt"/>
+                <a:ea typeface="+mn-ea"/>
+                <a:cs typeface="+mn-cs"/>
+              </a:defRPr>
+            </a:lvl9pPr>
+          </a:lstStyle>
+          <a:p>
+            <a:pPr marL="342900" indent="-342900">
+              <a:buFont typeface=".AppleSystemUIFont" charset="-120"/>
+              <a:buChar char="-"/>
+            </a:pPr>
+            <a:r>
+              <a:rPr lang="de-DE" dirty="0"/>
+              <a:t>Live-Vorschau mit </a:t>
+            </a:r>
+            <a:r>
+              <a:rPr lang="de-DE" dirty="0" err="1" smtClean="0"/>
+              <a:t>LaTeX</a:t>
+            </a:r>
+            <a:r>
+              <a:rPr lang="de-DE" dirty="0" smtClean="0"/>
+              <a:t>-Umsetzung</a:t>
+            </a:r>
+          </a:p>
+          <a:p>
+            <a:pPr marL="342900" lvl="2" indent="-342900">
+              <a:buFont typeface=".AppleSystemUIFont" charset="-120"/>
+              <a:buChar char="-"/>
+            </a:pPr>
+            <a:r>
+              <a:rPr lang="de-DE" sz="2000" dirty="0" err="1" smtClean="0"/>
+              <a:t>git</a:t>
+            </a:r>
+            <a:r>
+              <a:rPr lang="de-DE" sz="2000" dirty="0" smtClean="0"/>
+              <a:t>-Integration</a:t>
+            </a:r>
+          </a:p>
+          <a:p>
+            <a:pPr marL="342900" lvl="2" indent="-342900">
+              <a:buFont typeface=".AppleSystemUIFont" charset="-120"/>
+              <a:buChar char="-"/>
+            </a:pPr>
+            <a:r>
+              <a:rPr lang="de-DE" sz="2000" dirty="0" smtClean="0"/>
+              <a:t>Shortcuts für erfahrene Benutzer</a:t>
+            </a:r>
+          </a:p>
+          <a:p>
+            <a:pPr marL="342900" indent="-342900">
+              <a:buFont typeface=".AppleSystemUIFont" charset="-120"/>
+              <a:buChar char="-"/>
+            </a:pPr>
+            <a:r>
+              <a:rPr lang="de-DE" dirty="0" smtClean="0"/>
+              <a:t>Unterstützung in der Ausführung einzelner Arbeitsschritte</a:t>
+            </a:r>
+          </a:p>
+        </p:txBody>
+      </p:sp>
+    </p:spTree>
+    <p:extLst>
+      <p:ext uri="{BB962C8B-B14F-4D97-AF65-F5344CB8AC3E}">
+        <p14:creationId xmlns:p14="http://schemas.microsoft.com/office/powerpoint/2010/main" val="1044140025"/>
+      </p:ext>
+    </p:extLst>
+  </p:cSld>
+  <p:clrMapOvr>
+    <a:masterClrMapping/>
+  </p:clrMapOvr>
+  <p:transition spd="slow">
+    <p:push dir="u"/>
+  </p:transition>
+  <p:timing>
+    <p:tnLst>
+      <p:par>
+        <p:cTn id="1" dur="indefinite" restart="never" nodeType="tmRoot"/>
+      </p:par>
+    </p:tnLst>
+  </p:timing>
+</p:sld>
+</file>
+
+<file path=ppt/slides/slide13.xml><?xml version="1.0" encoding="utf-8"?>
+<p:sld xmlns:a="http://schemas.openxmlformats.org/drawingml/2006/main" xmlns:r="http://schemas.openxmlformats.org/officeDocument/2006/relationships" xmlns:p="http://schemas.openxmlformats.org/presentationml/2006/main">
+  <p:cSld>
+    <p:spTree>
+      <p:nvGrpSpPr>
+        <p:cNvPr id="1" name=""/>
+        <p:cNvGrpSpPr/>
+        <p:nvPr/>
+      </p:nvGrpSpPr>
+      <p:grpSpPr>
+        <a:xfrm>
+          <a:off x="0" y="0"/>
+          <a:ext cx="0" cy="0"/>
+          <a:chOff x="0" y="0"/>
+          <a:chExt cx="0" cy="0"/>
+        </a:xfrm>
+      </p:grpSpPr>
+      <p:sp>
+        <p:nvSpPr>
+          <p:cNvPr id="3" name="Inhaltsplatzhalter 2"/>
+          <p:cNvSpPr>
+            <a:spLocks noGrp="1"/>
+          </p:cNvSpPr>
+          <p:nvPr>
+            <p:ph sz="quarter" idx="19"/>
+          </p:nvPr>
+        </p:nvSpPr>
+        <p:spPr>
+          <a:xfrm>
+            <a:off x="0" y="764704"/>
+            <a:ext cx="9144000" cy="288032"/>
+          </a:xfrm>
+        </p:spPr>
+        <p:txBody>
+          <a:bodyPr anchor="ctr"/>
+          <a:lstStyle/>
+          <a:p>
+            <a:pPr algn="ctr"/>
+            <a:r>
+              <a:rPr lang="de-DE" sz="1200" b="0" dirty="0"/>
+              <a:t>1. Zielstellung &gt; 2. Bestehende Lösungsansätze &gt; </a:t>
+            </a:r>
+            <a:r>
+              <a:rPr lang="de-DE" sz="1200" b="0" dirty="0">
+                <a:solidFill>
+                  <a:schemeClr val="tx1"/>
+                </a:solidFill>
+              </a:rPr>
+              <a:t>3. Entwicklung einer neuen Erweiterung für ATOM</a:t>
+            </a:r>
+            <a:r>
+              <a:rPr lang="de-DE" sz="1200" b="0" dirty="0"/>
+              <a:t> &gt; 4. Ausblick</a:t>
+            </a:r>
+          </a:p>
+        </p:txBody>
+      </p:sp>
+      <p:sp>
+        <p:nvSpPr>
+          <p:cNvPr id="4" name="Datumsplatzhalter 3"/>
+          <p:cNvSpPr>
+            <a:spLocks noGrp="1"/>
+          </p:cNvSpPr>
+          <p:nvPr>
+            <p:ph type="dt" sz="half" idx="20"/>
+          </p:nvPr>
+        </p:nvSpPr>
+        <p:spPr/>
+        <p:txBody>
+          <a:bodyPr/>
+          <a:lstStyle/>
+          <a:p>
+            <a:fld id="{852F18A7-60EF-DD48-8F37-BE93452F0A67}" type="datetime1">
+              <a:rPr lang="de-DE" smtClean="0"/>
+              <a:t>25.10.16</a:t>
+            </a:fld>
+            <a:endParaRPr lang="de-DE" dirty="0"/>
+          </a:p>
+        </p:txBody>
+      </p:sp>
+      <p:sp>
+        <p:nvSpPr>
+          <p:cNvPr id="6" name="Foliennummernplatzhalter 5"/>
+          <p:cNvSpPr>
+            <a:spLocks noGrp="1"/>
+          </p:cNvSpPr>
+          <p:nvPr>
+            <p:ph type="sldNum" sz="quarter" idx="22"/>
+          </p:nvPr>
+        </p:nvSpPr>
+        <p:spPr/>
+        <p:txBody>
+          <a:bodyPr/>
+          <a:lstStyle/>
+          <a:p>
+            <a:r>
+              <a:rPr lang="de-DE"/>
+              <a:t>Folie </a:t>
+            </a:r>
+            <a:fld id="{20336FBE-96EF-1B43-9998-83765DDB0397}" type="slidenum">
+              <a:rPr lang="de-DE" smtClean="0"/>
+              <a:pPr/>
+              <a:t>13</a:t>
+            </a:fld>
+            <a:r>
+              <a:rPr lang="de-DE"/>
+              <a:t> von XYZ</a:t>
+            </a:r>
+            <a:endParaRPr lang="de-DE" dirty="0"/>
+          </a:p>
+        </p:txBody>
+      </p:sp>
+      <p:sp>
+        <p:nvSpPr>
+          <p:cNvPr id="7" name="Textfeld 6"/>
+          <p:cNvSpPr txBox="1"/>
+          <p:nvPr/>
+        </p:nvSpPr>
+        <p:spPr>
+          <a:xfrm>
+            <a:off x="76971" y="1106160"/>
+            <a:ext cx="3773597" cy="369332"/>
+          </a:xfrm>
+          <a:prstGeom prst="rect">
+            <a:avLst/>
+          </a:prstGeom>
+          <a:noFill/>
+        </p:spPr>
+        <p:txBody>
+          <a:bodyPr wrap="none" rtlCol="0">
+            <a:spAutoFit/>
+          </a:bodyPr>
+          <a:lstStyle/>
+          <a:p>
+            <a:r>
+              <a:rPr lang="de-DE" b="1" dirty="0" smtClean="0"/>
+              <a:t>Funktionalität der neuen Erweiterung</a:t>
+            </a:r>
+            <a:endParaRPr lang="de-DE" b="1" dirty="0"/>
+          </a:p>
+        </p:txBody>
+      </p:sp>
+      <p:sp>
+        <p:nvSpPr>
+          <p:cNvPr id="8" name="Inhaltsplatzhalter 1"/>
+          <p:cNvSpPr txBox="1">
+            <a:spLocks/>
+          </p:cNvSpPr>
+          <p:nvPr/>
+        </p:nvSpPr>
+        <p:spPr>
+          <a:xfrm>
+            <a:off x="655637" y="1556792"/>
+            <a:ext cx="7832725" cy="4608041"/>
+          </a:xfrm>
+          <a:prstGeom prst="rect">
+            <a:avLst/>
+          </a:prstGeom>
+        </p:spPr>
+        <p:txBody>
+          <a:bodyPr lIns="0" tIns="0" rIns="0" bIns="0"/>
+          <a:lstStyle>
+            <a:lvl1pPr marL="0" marR="0" indent="0" algn="l" defTabSz="914368" rtl="0" eaLnBrk="1" fontAlgn="t" latinLnBrk="0" hangingPunct="1">
+              <a:lnSpc>
+                <a:spcPct val="100000"/>
+              </a:lnSpc>
+              <a:spcBef>
+                <a:spcPts val="0"/>
+              </a:spcBef>
+              <a:spcAft>
+                <a:spcPts val="600"/>
+              </a:spcAft>
+              <a:buClrTx/>
+              <a:buSzTx/>
+              <a:buFontTx/>
+              <a:buNone/>
+              <a:tabLst/>
+              <a:defRPr sz="2000" kern="1200" baseline="0">
+                <a:solidFill>
+                  <a:srgbClr val="0B2A51"/>
+                </a:solidFill>
+                <a:latin typeface="Verdana" pitchFamily="34" charset="0"/>
+                <a:ea typeface="+mn-ea"/>
+                <a:cs typeface="+mn-cs"/>
+              </a:defRPr>
+            </a:lvl1pPr>
+            <a:lvl2pPr marL="161925" indent="-161925" algn="l" defTabSz="914368" rtl="0" eaLnBrk="1" fontAlgn="t" latinLnBrk="0" hangingPunct="1">
+              <a:spcBef>
+                <a:spcPts val="300"/>
+              </a:spcBef>
+              <a:spcAft>
+                <a:spcPts val="600"/>
+              </a:spcAft>
+              <a:buClr>
+                <a:schemeClr val="tx1"/>
+              </a:buClr>
+              <a:buSzPct val="120000"/>
+              <a:buFont typeface="LucidaGrande" charset="0"/>
+              <a:buChar char="_"/>
+              <a:tabLst/>
+              <a:defRPr sz="2000" kern="1200" baseline="0">
+                <a:solidFill>
+                  <a:srgbClr val="0B2A51"/>
+                </a:solidFill>
+                <a:latin typeface="Verdana" pitchFamily="34" charset="0"/>
+                <a:ea typeface="+mn-ea"/>
+                <a:cs typeface="+mn-cs"/>
+              </a:defRPr>
+            </a:lvl2pPr>
+            <a:lvl3pPr marL="0" indent="0" algn="l" defTabSz="914368" rtl="0" eaLnBrk="1" fontAlgn="t" latinLnBrk="0" hangingPunct="1">
+              <a:spcBef>
+                <a:spcPts val="0"/>
+              </a:spcBef>
+              <a:spcAft>
+                <a:spcPts val="600"/>
+              </a:spcAft>
+              <a:buSzPct val="100000"/>
+              <a:buFont typeface="Symbol" charset="2"/>
+              <a:buNone/>
+              <a:tabLst/>
+              <a:defRPr sz="1600" kern="1200" baseline="0">
+                <a:solidFill>
+                  <a:srgbClr val="0B2A51"/>
+                </a:solidFill>
+                <a:latin typeface="Verdana" pitchFamily="34" charset="0"/>
+                <a:ea typeface="+mn-ea"/>
+                <a:cs typeface="+mn-cs"/>
+              </a:defRPr>
+            </a:lvl3pPr>
+            <a:lvl4pPr marL="288925" indent="-127000" algn="l" defTabSz="914368" rtl="0" eaLnBrk="1" latinLnBrk="0" hangingPunct="1">
+              <a:spcBef>
+                <a:spcPts val="0"/>
+              </a:spcBef>
+              <a:spcAft>
+                <a:spcPts val="600"/>
+              </a:spcAft>
+              <a:buClr>
+                <a:schemeClr val="tx1"/>
+              </a:buClr>
+              <a:buSzPct val="100000"/>
+              <a:buFont typeface="LucidaGrande" charset="0"/>
+              <a:buChar char="_"/>
+              <a:tabLst/>
+              <a:defRPr sz="1600" kern="1200" baseline="0">
+                <a:solidFill>
+                  <a:srgbClr val="0B2A51"/>
+                </a:solidFill>
+                <a:latin typeface="Verdana" pitchFamily="34" charset="0"/>
+                <a:ea typeface="+mn-ea"/>
+                <a:cs typeface="+mn-cs"/>
+              </a:defRPr>
+            </a:lvl4pPr>
+            <a:lvl5pPr marL="415925" indent="-127000" algn="l" defTabSz="914368" rtl="0" eaLnBrk="1" latinLnBrk="0" hangingPunct="1">
+              <a:spcBef>
+                <a:spcPts val="0"/>
+              </a:spcBef>
+              <a:spcAft>
+                <a:spcPts val="600"/>
+              </a:spcAft>
+              <a:buSzPct val="170000"/>
+              <a:buFont typeface="AppleSymbols" charset="0"/>
+              <a:buChar char="⌞"/>
+              <a:tabLst/>
+              <a:defRPr sz="1600" kern="1200" baseline="0">
+                <a:solidFill>
+                  <a:srgbClr val="0B2A51"/>
+                </a:solidFill>
+                <a:latin typeface="Verdana" pitchFamily="34" charset="0"/>
+                <a:ea typeface="+mn-ea"/>
+                <a:cs typeface="+mn-cs"/>
+              </a:defRPr>
+            </a:lvl5pPr>
+            <a:lvl6pPr marL="2514512" indent="-228592" algn="l" defTabSz="914368" rtl="0" eaLnBrk="1" latinLnBrk="0" hangingPunct="1">
+              <a:spcBef>
+                <a:spcPct val="20000"/>
+              </a:spcBef>
+              <a:buFont typeface="Arial" pitchFamily="34" charset="0"/>
+              <a:buChar char="•"/>
+              <a:defRPr sz="2000" kern="1200">
+                <a:solidFill>
+                  <a:schemeClr val="tx1"/>
+                </a:solidFill>
+                <a:latin typeface="+mn-lt"/>
+                <a:ea typeface="+mn-ea"/>
+                <a:cs typeface="+mn-cs"/>
+              </a:defRPr>
+            </a:lvl6pPr>
+            <a:lvl7pPr marL="2971696" indent="-228592" algn="l" defTabSz="914368" rtl="0" eaLnBrk="1" latinLnBrk="0" hangingPunct="1">
+              <a:spcBef>
+                <a:spcPct val="20000"/>
+              </a:spcBef>
+              <a:buFont typeface="Arial" pitchFamily="34" charset="0"/>
+              <a:buChar char="•"/>
+              <a:defRPr sz="2000" kern="1200">
+                <a:solidFill>
+                  <a:schemeClr val="tx1"/>
+                </a:solidFill>
+                <a:latin typeface="+mn-lt"/>
+                <a:ea typeface="+mn-ea"/>
+                <a:cs typeface="+mn-cs"/>
+              </a:defRPr>
+            </a:lvl7pPr>
+            <a:lvl8pPr marL="3428880" indent="-228592" algn="l" defTabSz="914368" rtl="0" eaLnBrk="1" latinLnBrk="0" hangingPunct="1">
+              <a:spcBef>
+                <a:spcPct val="20000"/>
+              </a:spcBef>
+              <a:buFont typeface="Arial" pitchFamily="34" charset="0"/>
+              <a:buChar char="•"/>
+              <a:defRPr sz="2000" kern="1200">
+                <a:solidFill>
+                  <a:schemeClr val="tx1"/>
+                </a:solidFill>
+                <a:latin typeface="+mn-lt"/>
+                <a:ea typeface="+mn-ea"/>
+                <a:cs typeface="+mn-cs"/>
+              </a:defRPr>
+            </a:lvl8pPr>
+            <a:lvl9pPr marL="3886064" indent="-228592" algn="l" defTabSz="914368" rtl="0" eaLnBrk="1" latinLnBrk="0" hangingPunct="1">
+              <a:spcBef>
+                <a:spcPct val="20000"/>
+              </a:spcBef>
+              <a:buFont typeface="Arial" pitchFamily="34" charset="0"/>
+              <a:buChar char="•"/>
+              <a:defRPr sz="2000" kern="1200">
+                <a:solidFill>
+                  <a:schemeClr val="tx1"/>
+                </a:solidFill>
+                <a:latin typeface="+mn-lt"/>
+                <a:ea typeface="+mn-ea"/>
+                <a:cs typeface="+mn-cs"/>
+              </a:defRPr>
+            </a:lvl9pPr>
+          </a:lstStyle>
+          <a:p>
+            <a:pPr marL="342900" indent="-342900">
+              <a:buFont typeface=".AppleSystemUIFont" charset="-120"/>
+              <a:buChar char="-"/>
+            </a:pPr>
+            <a:r>
+              <a:rPr lang="de-DE" dirty="0" smtClean="0"/>
+              <a:t>Graphische Benutzeroberflächen </a:t>
+            </a:r>
+            <a:r>
+              <a:rPr lang="de-DE" dirty="0"/>
+              <a:t>für</a:t>
+            </a:r>
+          </a:p>
+          <a:p>
+            <a:pPr marL="631825" lvl="3" indent="-342900">
+              <a:buFont typeface="Wingdings" charset="2"/>
+              <a:buChar char="§"/>
+            </a:pPr>
+            <a:r>
+              <a:rPr lang="de-DE" dirty="0" err="1"/>
+              <a:t>Markdown</a:t>
+            </a:r>
+            <a:r>
+              <a:rPr lang="de-DE" dirty="0"/>
+              <a:t>-Syntax</a:t>
+            </a:r>
+          </a:p>
+          <a:p>
+            <a:pPr marL="631825" lvl="3" indent="-342900">
+              <a:buFont typeface="Wingdings" charset="2"/>
+              <a:buChar char="§"/>
+            </a:pPr>
+            <a:r>
+              <a:rPr lang="de-DE" dirty="0"/>
+              <a:t>Anlegen eines neuen </a:t>
+            </a:r>
+            <a:r>
+              <a:rPr lang="de-DE" dirty="0" smtClean="0"/>
+              <a:t>Projekts</a:t>
+            </a:r>
+          </a:p>
+          <a:p>
+            <a:pPr marL="631825" lvl="3" indent="-342900">
+              <a:buFont typeface="Wingdings" charset="2"/>
+              <a:buChar char="§"/>
+            </a:pPr>
+            <a:r>
+              <a:rPr lang="de-DE" dirty="0" smtClean="0"/>
+              <a:t>Bearbeiten der Metadaten</a:t>
+            </a:r>
+            <a:endParaRPr lang="de-DE" dirty="0"/>
+          </a:p>
+          <a:p>
+            <a:pPr marL="631825" lvl="3" indent="-342900">
+              <a:buFont typeface="Wingdings" charset="2"/>
+              <a:buChar char="§"/>
+            </a:pPr>
+            <a:r>
+              <a:rPr lang="de-DE" dirty="0"/>
+              <a:t>Einfügen von Links</a:t>
+            </a:r>
+          </a:p>
+          <a:p>
+            <a:pPr marL="631825" lvl="3" indent="-342900">
+              <a:buFont typeface="Wingdings" charset="2"/>
+              <a:buChar char="§"/>
+            </a:pPr>
+            <a:r>
+              <a:rPr lang="de-DE" dirty="0"/>
+              <a:t>Einfügen von Bildern</a:t>
+            </a:r>
+          </a:p>
+          <a:p>
+            <a:pPr marL="631825" lvl="3" indent="-342900">
+              <a:buFont typeface="Wingdings" charset="2"/>
+              <a:buChar char="§"/>
+            </a:pPr>
+            <a:r>
+              <a:rPr lang="de-DE" dirty="0"/>
+              <a:t>Einfügen von Tabellen</a:t>
+            </a:r>
+          </a:p>
+          <a:p>
+            <a:pPr marL="631825" lvl="3" indent="-342900">
+              <a:buFont typeface="Wingdings" charset="2"/>
+              <a:buChar char="§"/>
+            </a:pPr>
+            <a:r>
+              <a:rPr lang="de-DE" dirty="0" err="1"/>
+              <a:t>git</a:t>
+            </a:r>
+            <a:r>
+              <a:rPr lang="de-DE" dirty="0"/>
+              <a:t> </a:t>
+            </a:r>
+            <a:r>
+              <a:rPr lang="de-DE" dirty="0" err="1"/>
+              <a:t>commit</a:t>
+            </a:r>
+            <a:r>
+              <a:rPr lang="de-DE" dirty="0"/>
+              <a:t> </a:t>
+            </a:r>
+            <a:r>
+              <a:rPr lang="de-DE" dirty="0" smtClean="0"/>
+              <a:t>Nachrichten</a:t>
+            </a:r>
+          </a:p>
+        </p:txBody>
+      </p:sp>
+    </p:spTree>
+    <p:extLst>
+      <p:ext uri="{BB962C8B-B14F-4D97-AF65-F5344CB8AC3E}">
+        <p14:creationId xmlns:p14="http://schemas.microsoft.com/office/powerpoint/2010/main" val="1615594771"/>
+      </p:ext>
+    </p:extLst>
+  </p:cSld>
+  <p:clrMapOvr>
+    <a:masterClrMapping/>
+  </p:clrMapOvr>
+  <p:transition spd="slow">
+    <p:push dir="u"/>
+  </p:transition>
+  <p:timing>
+    <p:tnLst>
+      <p:par>
+        <p:cTn id="1" dur="indefinite" restart="never" nodeType="tmRoot"/>
+      </p:par>
+    </p:tnLst>
+  </p:timing>
+</p:sld>
+</file>
+
+<file path=ppt/slides/slide14.xml><?xml version="1.0" encoding="utf-8"?>
+<p:sld xmlns:a="http://schemas.openxmlformats.org/drawingml/2006/main" xmlns:r="http://schemas.openxmlformats.org/officeDocument/2006/relationships" xmlns:p="http://schemas.openxmlformats.org/presentationml/2006/main">
+  <p:cSld>
+    <p:spTree>
+      <p:nvGrpSpPr>
+        <p:cNvPr id="1" name=""/>
+        <p:cNvGrpSpPr/>
+        <p:nvPr/>
+      </p:nvGrpSpPr>
+      <p:grpSpPr>
+        <a:xfrm>
+          <a:off x="0" y="0"/>
+          <a:ext cx="0" cy="0"/>
+          <a:chOff x="0" y="0"/>
+          <a:chExt cx="0" cy="0"/>
+        </a:xfrm>
+      </p:grpSpPr>
+      <p:sp>
+        <p:nvSpPr>
+          <p:cNvPr id="3" name="Inhaltsplatzhalter 2"/>
+          <p:cNvSpPr>
+            <a:spLocks noGrp="1"/>
+          </p:cNvSpPr>
+          <p:nvPr>
+            <p:ph sz="quarter" idx="19"/>
+          </p:nvPr>
+        </p:nvSpPr>
+        <p:spPr>
+          <a:xfrm>
+            <a:off x="0" y="764704"/>
+            <a:ext cx="9144000" cy="288032"/>
+          </a:xfrm>
+        </p:spPr>
+        <p:txBody>
+          <a:bodyPr anchor="ctr"/>
+          <a:lstStyle/>
+          <a:p>
+            <a:pPr algn="ctr"/>
+            <a:r>
+              <a:rPr lang="de-DE" sz="1200" b="0" dirty="0"/>
+              <a:t>1. Zielstellung &gt; 2. Bestehende Lösungsansätze &gt; </a:t>
+            </a:r>
+            <a:r>
+              <a:rPr lang="de-DE" sz="1200" b="0" dirty="0">
+                <a:solidFill>
+                  <a:schemeClr val="tx1"/>
+                </a:solidFill>
+              </a:rPr>
+              <a:t>3. Entwicklung einer neuen Erweiterung für ATOM</a:t>
+            </a:r>
+            <a:r>
+              <a:rPr lang="de-DE" sz="1200" b="0" dirty="0"/>
+              <a:t> &gt; 4. Ausblick</a:t>
+            </a:r>
+          </a:p>
+        </p:txBody>
+      </p:sp>
+      <p:sp>
+        <p:nvSpPr>
+          <p:cNvPr id="4" name="Datumsplatzhalter 3"/>
+          <p:cNvSpPr>
+            <a:spLocks noGrp="1"/>
+          </p:cNvSpPr>
+          <p:nvPr>
+            <p:ph type="dt" sz="half" idx="20"/>
+          </p:nvPr>
+        </p:nvSpPr>
+        <p:spPr/>
+        <p:txBody>
+          <a:bodyPr/>
+          <a:lstStyle/>
+          <a:p>
+            <a:fld id="{852F18A7-60EF-DD48-8F37-BE93452F0A67}" type="datetime1">
+              <a:rPr lang="de-DE" smtClean="0"/>
+              <a:t>25.10.16</a:t>
+            </a:fld>
+            <a:endParaRPr lang="de-DE" dirty="0"/>
+          </a:p>
+        </p:txBody>
+      </p:sp>
+      <p:sp>
+        <p:nvSpPr>
+          <p:cNvPr id="6" name="Foliennummernplatzhalter 5"/>
+          <p:cNvSpPr>
+            <a:spLocks noGrp="1"/>
+          </p:cNvSpPr>
+          <p:nvPr>
+            <p:ph type="sldNum" sz="quarter" idx="22"/>
+          </p:nvPr>
+        </p:nvSpPr>
+        <p:spPr/>
+        <p:txBody>
+          <a:bodyPr/>
+          <a:lstStyle/>
+          <a:p>
+            <a:r>
+              <a:rPr lang="de-DE"/>
+              <a:t>Folie </a:t>
+            </a:r>
+            <a:fld id="{20336FBE-96EF-1B43-9998-83765DDB0397}" type="slidenum">
+              <a:rPr lang="de-DE" smtClean="0"/>
+              <a:pPr/>
+              <a:t>14</a:t>
+            </a:fld>
+            <a:r>
+              <a:rPr lang="de-DE"/>
+              <a:t> von XYZ</a:t>
+            </a:r>
+            <a:endParaRPr lang="de-DE" dirty="0"/>
+          </a:p>
+        </p:txBody>
+      </p:sp>
+      <p:sp>
+        <p:nvSpPr>
+          <p:cNvPr id="7" name="Textfeld 6"/>
+          <p:cNvSpPr txBox="1"/>
+          <p:nvPr/>
+        </p:nvSpPr>
+        <p:spPr>
+          <a:xfrm>
+            <a:off x="76971" y="1106160"/>
+            <a:ext cx="4500206" cy="369332"/>
+          </a:xfrm>
+          <a:prstGeom prst="rect">
+            <a:avLst/>
+          </a:prstGeom>
+          <a:noFill/>
+        </p:spPr>
+        <p:txBody>
+          <a:bodyPr wrap="none" rtlCol="0">
+            <a:spAutoFit/>
+          </a:bodyPr>
+          <a:lstStyle/>
+          <a:p>
+            <a:r>
+              <a:rPr lang="de-DE" b="1" dirty="0" smtClean="0"/>
+              <a:t>Struktur im Code und Wiederverwendbarkeit</a:t>
+            </a:r>
+            <a:endParaRPr lang="de-DE" b="1" dirty="0"/>
+          </a:p>
+        </p:txBody>
+      </p:sp>
+      <p:sp>
+        <p:nvSpPr>
+          <p:cNvPr id="8" name="Inhaltsplatzhalter 1"/>
+          <p:cNvSpPr txBox="1">
+            <a:spLocks/>
+          </p:cNvSpPr>
+          <p:nvPr/>
+        </p:nvSpPr>
+        <p:spPr>
+          <a:xfrm>
+            <a:off x="655638" y="1556792"/>
+            <a:ext cx="3921540" cy="4608041"/>
+          </a:xfrm>
+          <a:prstGeom prst="rect">
+            <a:avLst/>
+          </a:prstGeom>
+        </p:spPr>
+        <p:txBody>
+          <a:bodyPr lIns="0" tIns="0" rIns="0" bIns="0"/>
+          <a:lstStyle>
+            <a:lvl1pPr marL="0" marR="0" indent="0" algn="l" defTabSz="914368" rtl="0" eaLnBrk="1" fontAlgn="t" latinLnBrk="0" hangingPunct="1">
+              <a:lnSpc>
+                <a:spcPct val="100000"/>
+              </a:lnSpc>
+              <a:spcBef>
+                <a:spcPts val="0"/>
+              </a:spcBef>
+              <a:spcAft>
+                <a:spcPts val="600"/>
+              </a:spcAft>
+              <a:buClrTx/>
+              <a:buSzTx/>
+              <a:buFontTx/>
+              <a:buNone/>
+              <a:tabLst/>
+              <a:defRPr sz="2000" kern="1200" baseline="0">
+                <a:solidFill>
+                  <a:srgbClr val="0B2A51"/>
+                </a:solidFill>
+                <a:latin typeface="Verdana" pitchFamily="34" charset="0"/>
+                <a:ea typeface="+mn-ea"/>
+                <a:cs typeface="+mn-cs"/>
+              </a:defRPr>
+            </a:lvl1pPr>
+            <a:lvl2pPr marL="161925" indent="-161925" algn="l" defTabSz="914368" rtl="0" eaLnBrk="1" fontAlgn="t" latinLnBrk="0" hangingPunct="1">
+              <a:spcBef>
+                <a:spcPts val="300"/>
+              </a:spcBef>
+              <a:spcAft>
+                <a:spcPts val="600"/>
+              </a:spcAft>
+              <a:buClr>
+                <a:schemeClr val="tx1"/>
+              </a:buClr>
+              <a:buSzPct val="120000"/>
+              <a:buFont typeface="LucidaGrande" charset="0"/>
+              <a:buChar char="_"/>
+              <a:tabLst/>
+              <a:defRPr sz="2000" kern="1200" baseline="0">
+                <a:solidFill>
+                  <a:srgbClr val="0B2A51"/>
+                </a:solidFill>
+                <a:latin typeface="Verdana" pitchFamily="34" charset="0"/>
+                <a:ea typeface="+mn-ea"/>
+                <a:cs typeface="+mn-cs"/>
+              </a:defRPr>
+            </a:lvl2pPr>
+            <a:lvl3pPr marL="0" indent="0" algn="l" defTabSz="914368" rtl="0" eaLnBrk="1" fontAlgn="t" latinLnBrk="0" hangingPunct="1">
+              <a:spcBef>
+                <a:spcPts val="0"/>
+              </a:spcBef>
+              <a:spcAft>
+                <a:spcPts val="600"/>
+              </a:spcAft>
+              <a:buSzPct val="100000"/>
+              <a:buFont typeface="Symbol" charset="2"/>
+              <a:buNone/>
+              <a:tabLst/>
+              <a:defRPr sz="1600" kern="1200" baseline="0">
+                <a:solidFill>
+                  <a:srgbClr val="0B2A51"/>
+                </a:solidFill>
+                <a:latin typeface="Verdana" pitchFamily="34" charset="0"/>
+                <a:ea typeface="+mn-ea"/>
+                <a:cs typeface="+mn-cs"/>
+              </a:defRPr>
+            </a:lvl3pPr>
+            <a:lvl4pPr marL="288925" indent="-127000" algn="l" defTabSz="914368" rtl="0" eaLnBrk="1" latinLnBrk="0" hangingPunct="1">
+              <a:spcBef>
+                <a:spcPts val="0"/>
+              </a:spcBef>
+              <a:spcAft>
+                <a:spcPts val="600"/>
+              </a:spcAft>
+              <a:buClr>
+                <a:schemeClr val="tx1"/>
+              </a:buClr>
+              <a:buSzPct val="100000"/>
+              <a:buFont typeface="LucidaGrande" charset="0"/>
+              <a:buChar char="_"/>
+              <a:tabLst/>
+              <a:defRPr sz="1600" kern="1200" baseline="0">
+                <a:solidFill>
+                  <a:srgbClr val="0B2A51"/>
+                </a:solidFill>
+                <a:latin typeface="Verdana" pitchFamily="34" charset="0"/>
+                <a:ea typeface="+mn-ea"/>
+                <a:cs typeface="+mn-cs"/>
+              </a:defRPr>
+            </a:lvl4pPr>
+            <a:lvl5pPr marL="415925" indent="-127000" algn="l" defTabSz="914368" rtl="0" eaLnBrk="1" latinLnBrk="0" hangingPunct="1">
+              <a:spcBef>
+                <a:spcPts val="0"/>
+              </a:spcBef>
+              <a:spcAft>
+                <a:spcPts val="600"/>
+              </a:spcAft>
+              <a:buSzPct val="170000"/>
+              <a:buFont typeface="AppleSymbols" charset="0"/>
+              <a:buChar char="⌞"/>
+              <a:tabLst/>
+              <a:defRPr sz="1600" kern="1200" baseline="0">
+                <a:solidFill>
+                  <a:srgbClr val="0B2A51"/>
+                </a:solidFill>
+                <a:latin typeface="Verdana" pitchFamily="34" charset="0"/>
+                <a:ea typeface="+mn-ea"/>
+                <a:cs typeface="+mn-cs"/>
+              </a:defRPr>
+            </a:lvl5pPr>
+            <a:lvl6pPr marL="2514512" indent="-228592" algn="l" defTabSz="914368" rtl="0" eaLnBrk="1" latinLnBrk="0" hangingPunct="1">
+              <a:spcBef>
+                <a:spcPct val="20000"/>
+              </a:spcBef>
+              <a:buFont typeface="Arial" pitchFamily="34" charset="0"/>
+              <a:buChar char="•"/>
+              <a:defRPr sz="2000" kern="1200">
+                <a:solidFill>
+                  <a:schemeClr val="tx1"/>
+                </a:solidFill>
+                <a:latin typeface="+mn-lt"/>
+                <a:ea typeface="+mn-ea"/>
+                <a:cs typeface="+mn-cs"/>
+              </a:defRPr>
+            </a:lvl6pPr>
+            <a:lvl7pPr marL="2971696" indent="-228592" algn="l" defTabSz="914368" rtl="0" eaLnBrk="1" latinLnBrk="0" hangingPunct="1">
+              <a:spcBef>
+                <a:spcPct val="20000"/>
+              </a:spcBef>
+              <a:buFont typeface="Arial" pitchFamily="34" charset="0"/>
+              <a:buChar char="•"/>
+              <a:defRPr sz="2000" kern="1200">
+                <a:solidFill>
+                  <a:schemeClr val="tx1"/>
+                </a:solidFill>
+                <a:latin typeface="+mn-lt"/>
+                <a:ea typeface="+mn-ea"/>
+                <a:cs typeface="+mn-cs"/>
+              </a:defRPr>
+            </a:lvl7pPr>
+            <a:lvl8pPr marL="3428880" indent="-228592" algn="l" defTabSz="914368" rtl="0" eaLnBrk="1" latinLnBrk="0" hangingPunct="1">
+              <a:spcBef>
+                <a:spcPct val="20000"/>
+              </a:spcBef>
+              <a:buFont typeface="Arial" pitchFamily="34" charset="0"/>
+              <a:buChar char="•"/>
+              <a:defRPr sz="2000" kern="1200">
+                <a:solidFill>
+                  <a:schemeClr val="tx1"/>
+                </a:solidFill>
+                <a:latin typeface="+mn-lt"/>
+                <a:ea typeface="+mn-ea"/>
+                <a:cs typeface="+mn-cs"/>
+              </a:defRPr>
+            </a:lvl8pPr>
+            <a:lvl9pPr marL="3886064" indent="-228592" algn="l" defTabSz="914368" rtl="0" eaLnBrk="1" latinLnBrk="0" hangingPunct="1">
+              <a:spcBef>
+                <a:spcPct val="20000"/>
+              </a:spcBef>
+              <a:buFont typeface="Arial" pitchFamily="34" charset="0"/>
+              <a:buChar char="•"/>
+              <a:defRPr sz="2000" kern="1200">
+                <a:solidFill>
+                  <a:schemeClr val="tx1"/>
+                </a:solidFill>
+                <a:latin typeface="+mn-lt"/>
+                <a:ea typeface="+mn-ea"/>
+                <a:cs typeface="+mn-cs"/>
+              </a:defRPr>
+            </a:lvl9pPr>
+          </a:lstStyle>
+          <a:p>
+            <a:pPr marL="342900" indent="-342900">
+              <a:buFont typeface=".AppleSystemUIFont" charset="-120"/>
+              <a:buChar char="-"/>
+            </a:pPr>
+            <a:r>
+              <a:rPr lang="de-DE" dirty="0" smtClean="0"/>
+              <a:t>Klassen des Packages</a:t>
+            </a:r>
+            <a:endParaRPr lang="de-DE" dirty="0"/>
+          </a:p>
+          <a:p>
+            <a:pPr marL="631825" lvl="3" indent="-342900">
+              <a:buFont typeface="Wingdings" charset="2"/>
+              <a:buChar char="§"/>
+            </a:pPr>
+            <a:r>
+              <a:rPr lang="de-DE" dirty="0" smtClean="0"/>
+              <a:t>Views</a:t>
+            </a:r>
+          </a:p>
+          <a:p>
+            <a:pPr marL="758825" lvl="4" indent="-342900">
+              <a:buFont typeface="Wingdings" charset="2"/>
+              <a:buChar char="§"/>
+            </a:pPr>
+            <a:r>
+              <a:rPr lang="de-DE" dirty="0" err="1" smtClean="0"/>
+              <a:t>MainNavigationView</a:t>
+            </a:r>
+            <a:endParaRPr lang="de-DE" dirty="0" smtClean="0"/>
+          </a:p>
+          <a:p>
+            <a:pPr marL="758825" lvl="4" indent="-342900">
+              <a:buFont typeface="Wingdings" charset="2"/>
+              <a:buChar char="§"/>
+            </a:pPr>
+            <a:r>
+              <a:rPr lang="de-DE" dirty="0" err="1" smtClean="0"/>
+              <a:t>FooterPanelView</a:t>
+            </a:r>
+            <a:endParaRPr lang="de-DE" dirty="0" smtClean="0"/>
+          </a:p>
+          <a:p>
+            <a:pPr marL="631825" lvl="3" indent="-342900">
+              <a:buFont typeface="Wingdings" charset="2"/>
+              <a:buChar char="§"/>
+            </a:pPr>
+            <a:r>
+              <a:rPr lang="de-DE" dirty="0" smtClean="0"/>
+              <a:t>Funktionalität</a:t>
+            </a:r>
+          </a:p>
+          <a:p>
+            <a:pPr marL="758825" lvl="4" indent="-342900">
+              <a:buFont typeface="Wingdings" charset="2"/>
+              <a:buChar char="§"/>
+            </a:pPr>
+            <a:r>
+              <a:rPr lang="de-DE" dirty="0" smtClean="0"/>
+              <a:t>Editor</a:t>
+            </a:r>
+          </a:p>
+          <a:p>
+            <a:pPr marL="758825" lvl="4" indent="-342900">
+              <a:buFont typeface="Wingdings" charset="2"/>
+              <a:buChar char="§"/>
+            </a:pPr>
+            <a:r>
+              <a:rPr lang="de-DE" dirty="0" err="1" smtClean="0"/>
+              <a:t>Matuc</a:t>
+            </a:r>
+            <a:endParaRPr lang="de-DE" dirty="0" smtClean="0"/>
+          </a:p>
+          <a:p>
+            <a:pPr marL="758825" lvl="4" indent="-342900">
+              <a:buFont typeface="Wingdings" charset="2"/>
+              <a:buChar char="§"/>
+            </a:pPr>
+            <a:r>
+              <a:rPr lang="de-DE" dirty="0" err="1" smtClean="0"/>
+              <a:t>Git</a:t>
+            </a:r>
+            <a:endParaRPr lang="de-DE" dirty="0" smtClean="0"/>
+          </a:p>
+          <a:p>
+            <a:pPr marL="631825" lvl="3" indent="-342900">
+              <a:buFont typeface="Wingdings" charset="2"/>
+              <a:buChar char="§"/>
+            </a:pPr>
+            <a:r>
+              <a:rPr lang="de-DE" dirty="0" smtClean="0"/>
+              <a:t>Helfer</a:t>
+            </a:r>
+          </a:p>
+          <a:p>
+            <a:pPr marL="758825" lvl="4" indent="-342900">
+              <a:buFont typeface="Wingdings" charset="2"/>
+              <a:buChar char="§"/>
+            </a:pPr>
+            <a:r>
+              <a:rPr lang="de-DE" dirty="0" err="1" smtClean="0"/>
+              <a:t>ErrorMessageFormatter</a:t>
+            </a:r>
+            <a:endParaRPr lang="de-DE" dirty="0" smtClean="0"/>
+          </a:p>
+          <a:p>
+            <a:pPr marL="758825" lvl="4" indent="-342900">
+              <a:buFont typeface="Wingdings" charset="2"/>
+              <a:buChar char="§"/>
+            </a:pPr>
+            <a:r>
+              <a:rPr lang="de-DE" dirty="0" err="1" smtClean="0"/>
+              <a:t>ShortcutManager</a:t>
+            </a:r>
+            <a:endParaRPr lang="de-DE" dirty="0" smtClean="0"/>
+          </a:p>
+          <a:p>
+            <a:pPr marL="758825" lvl="4" indent="-342900">
+              <a:buFont typeface="Wingdings" charset="2"/>
+              <a:buChar char="§"/>
+            </a:pPr>
+            <a:r>
+              <a:rPr lang="de-DE" dirty="0" err="1" smtClean="0"/>
+              <a:t>ViewManager</a:t>
+            </a:r>
+            <a:endParaRPr lang="de-DE" dirty="0" smtClean="0"/>
+          </a:p>
+          <a:p>
+            <a:pPr marL="758825" lvl="4" indent="-342900">
+              <a:buFont typeface="Wingdings" charset="2"/>
+              <a:buChar char="§"/>
+            </a:pPr>
+            <a:endParaRPr lang="de-DE" dirty="0" smtClean="0"/>
+          </a:p>
+          <a:p>
+            <a:pPr marL="758825" lvl="4" indent="-342900">
+              <a:buFont typeface="Wingdings" charset="2"/>
+              <a:buChar char="§"/>
+            </a:pPr>
+            <a:endParaRPr lang="de-DE" dirty="0" smtClean="0"/>
+          </a:p>
+        </p:txBody>
+      </p:sp>
+      <p:sp>
+        <p:nvSpPr>
+          <p:cNvPr id="9" name="Inhaltsplatzhalter 1"/>
+          <p:cNvSpPr txBox="1">
+            <a:spLocks/>
+          </p:cNvSpPr>
+          <p:nvPr/>
+        </p:nvSpPr>
+        <p:spPr>
+          <a:xfrm>
+            <a:off x="4572000" y="1555036"/>
+            <a:ext cx="3921540" cy="4608041"/>
+          </a:xfrm>
+          <a:prstGeom prst="rect">
+            <a:avLst/>
+          </a:prstGeom>
+        </p:spPr>
+        <p:txBody>
+          <a:bodyPr lIns="0" tIns="0" rIns="0" bIns="0"/>
+          <a:lstStyle>
+            <a:lvl1pPr marL="0" marR="0" indent="0" algn="l" defTabSz="914368" rtl="0" eaLnBrk="1" fontAlgn="t" latinLnBrk="0" hangingPunct="1">
+              <a:lnSpc>
+                <a:spcPct val="100000"/>
+              </a:lnSpc>
+              <a:spcBef>
+                <a:spcPts val="0"/>
+              </a:spcBef>
+              <a:spcAft>
+                <a:spcPts val="600"/>
+              </a:spcAft>
+              <a:buClrTx/>
+              <a:buSzTx/>
+              <a:buFontTx/>
+              <a:buNone/>
+              <a:tabLst/>
+              <a:defRPr sz="2000" kern="1200" baseline="0">
+                <a:solidFill>
+                  <a:srgbClr val="0B2A51"/>
+                </a:solidFill>
+                <a:latin typeface="Verdana" pitchFamily="34" charset="0"/>
+                <a:ea typeface="+mn-ea"/>
+                <a:cs typeface="+mn-cs"/>
+              </a:defRPr>
+            </a:lvl1pPr>
+            <a:lvl2pPr marL="161925" indent="-161925" algn="l" defTabSz="914368" rtl="0" eaLnBrk="1" fontAlgn="t" latinLnBrk="0" hangingPunct="1">
+              <a:spcBef>
+                <a:spcPts val="300"/>
+              </a:spcBef>
+              <a:spcAft>
+                <a:spcPts val="600"/>
+              </a:spcAft>
+              <a:buClr>
+                <a:schemeClr val="tx1"/>
+              </a:buClr>
+              <a:buSzPct val="120000"/>
+              <a:buFont typeface="LucidaGrande" charset="0"/>
+              <a:buChar char="_"/>
+              <a:tabLst/>
+              <a:defRPr sz="2000" kern="1200" baseline="0">
+                <a:solidFill>
+                  <a:srgbClr val="0B2A51"/>
+                </a:solidFill>
+                <a:latin typeface="Verdana" pitchFamily="34" charset="0"/>
+                <a:ea typeface="+mn-ea"/>
+                <a:cs typeface="+mn-cs"/>
+              </a:defRPr>
+            </a:lvl2pPr>
+            <a:lvl3pPr marL="0" indent="0" algn="l" defTabSz="914368" rtl="0" eaLnBrk="1" fontAlgn="t" latinLnBrk="0" hangingPunct="1">
+              <a:spcBef>
+                <a:spcPts val="0"/>
+              </a:spcBef>
+              <a:spcAft>
+                <a:spcPts val="600"/>
+              </a:spcAft>
+              <a:buSzPct val="100000"/>
+              <a:buFont typeface="Symbol" charset="2"/>
+              <a:buNone/>
+              <a:tabLst/>
+              <a:defRPr sz="1600" kern="1200" baseline="0">
+                <a:solidFill>
+                  <a:srgbClr val="0B2A51"/>
+                </a:solidFill>
+                <a:latin typeface="Verdana" pitchFamily="34" charset="0"/>
+                <a:ea typeface="+mn-ea"/>
+                <a:cs typeface="+mn-cs"/>
+              </a:defRPr>
+            </a:lvl3pPr>
+            <a:lvl4pPr marL="288925" indent="-127000" algn="l" defTabSz="914368" rtl="0" eaLnBrk="1" latinLnBrk="0" hangingPunct="1">
+              <a:spcBef>
+                <a:spcPts val="0"/>
+              </a:spcBef>
+              <a:spcAft>
+                <a:spcPts val="600"/>
+              </a:spcAft>
+              <a:buClr>
+                <a:schemeClr val="tx1"/>
+              </a:buClr>
+              <a:buSzPct val="100000"/>
+              <a:buFont typeface="LucidaGrande" charset="0"/>
+              <a:buChar char="_"/>
+              <a:tabLst/>
+              <a:defRPr sz="1600" kern="1200" baseline="0">
+                <a:solidFill>
+                  <a:srgbClr val="0B2A51"/>
+                </a:solidFill>
+                <a:latin typeface="Verdana" pitchFamily="34" charset="0"/>
+                <a:ea typeface="+mn-ea"/>
+                <a:cs typeface="+mn-cs"/>
+              </a:defRPr>
+            </a:lvl4pPr>
+            <a:lvl5pPr marL="415925" indent="-127000" algn="l" defTabSz="914368" rtl="0" eaLnBrk="1" latinLnBrk="0" hangingPunct="1">
+              <a:spcBef>
+                <a:spcPts val="0"/>
+              </a:spcBef>
+              <a:spcAft>
+                <a:spcPts val="600"/>
+              </a:spcAft>
+              <a:buSzPct val="170000"/>
+              <a:buFont typeface="AppleSymbols" charset="0"/>
+              <a:buChar char="⌞"/>
+              <a:tabLst/>
+              <a:defRPr sz="1600" kern="1200" baseline="0">
+                <a:solidFill>
+                  <a:srgbClr val="0B2A51"/>
+                </a:solidFill>
+                <a:latin typeface="Verdana" pitchFamily="34" charset="0"/>
+                <a:ea typeface="+mn-ea"/>
+                <a:cs typeface="+mn-cs"/>
+              </a:defRPr>
+            </a:lvl5pPr>
+            <a:lvl6pPr marL="2514512" indent="-228592" algn="l" defTabSz="914368" rtl="0" eaLnBrk="1" latinLnBrk="0" hangingPunct="1">
+              <a:spcBef>
+                <a:spcPct val="20000"/>
+              </a:spcBef>
+              <a:buFont typeface="Arial" pitchFamily="34" charset="0"/>
+              <a:buChar char="•"/>
+              <a:defRPr sz="2000" kern="1200">
+                <a:solidFill>
+                  <a:schemeClr val="tx1"/>
+                </a:solidFill>
+                <a:latin typeface="+mn-lt"/>
+                <a:ea typeface="+mn-ea"/>
+                <a:cs typeface="+mn-cs"/>
+              </a:defRPr>
+            </a:lvl6pPr>
+            <a:lvl7pPr marL="2971696" indent="-228592" algn="l" defTabSz="914368" rtl="0" eaLnBrk="1" latinLnBrk="0" hangingPunct="1">
+              <a:spcBef>
+                <a:spcPct val="20000"/>
+              </a:spcBef>
+              <a:buFont typeface="Arial" pitchFamily="34" charset="0"/>
+              <a:buChar char="•"/>
+              <a:defRPr sz="2000" kern="1200">
+                <a:solidFill>
+                  <a:schemeClr val="tx1"/>
+                </a:solidFill>
+                <a:latin typeface="+mn-lt"/>
+                <a:ea typeface="+mn-ea"/>
+                <a:cs typeface="+mn-cs"/>
+              </a:defRPr>
+            </a:lvl7pPr>
+            <a:lvl8pPr marL="3428880" indent="-228592" algn="l" defTabSz="914368" rtl="0" eaLnBrk="1" latinLnBrk="0" hangingPunct="1">
+              <a:spcBef>
+                <a:spcPct val="20000"/>
+              </a:spcBef>
+              <a:buFont typeface="Arial" pitchFamily="34" charset="0"/>
+              <a:buChar char="•"/>
+              <a:defRPr sz="2000" kern="1200">
+                <a:solidFill>
+                  <a:schemeClr val="tx1"/>
+                </a:solidFill>
+                <a:latin typeface="+mn-lt"/>
+                <a:ea typeface="+mn-ea"/>
+                <a:cs typeface="+mn-cs"/>
+              </a:defRPr>
+            </a:lvl8pPr>
+            <a:lvl9pPr marL="3886064" indent="-228592" algn="l" defTabSz="914368" rtl="0" eaLnBrk="1" latinLnBrk="0" hangingPunct="1">
+              <a:spcBef>
+                <a:spcPct val="20000"/>
+              </a:spcBef>
+              <a:buFont typeface="Arial" pitchFamily="34" charset="0"/>
+              <a:buChar char="•"/>
+              <a:defRPr sz="2000" kern="1200">
+                <a:solidFill>
+                  <a:schemeClr val="tx1"/>
+                </a:solidFill>
+                <a:latin typeface="+mn-lt"/>
+                <a:ea typeface="+mn-ea"/>
+                <a:cs typeface="+mn-cs"/>
+              </a:defRPr>
+            </a:lvl9pPr>
+          </a:lstStyle>
+          <a:p>
+            <a:pPr marL="342900" indent="-342900">
+              <a:buFont typeface=".AppleSystemUIFont" charset="-120"/>
+              <a:buChar char="-"/>
+            </a:pPr>
+            <a:endParaRPr lang="de-DE" dirty="0" smtClean="0"/>
+          </a:p>
+          <a:p>
+            <a:pPr marL="631825" lvl="3" indent="-342900">
+              <a:buFont typeface="Wingdings" charset="2"/>
+              <a:buChar char="§"/>
+            </a:pPr>
+            <a:r>
+              <a:rPr lang="de-DE" dirty="0" smtClean="0"/>
+              <a:t>Dialoge</a:t>
+            </a:r>
+          </a:p>
+          <a:p>
+            <a:pPr marL="758825" lvl="4" indent="-342900">
+              <a:buFont typeface="Wingdings" charset="2"/>
+              <a:buChar char="§"/>
+            </a:pPr>
+            <a:r>
+              <a:rPr lang="de-DE" dirty="0" err="1" smtClean="0"/>
+              <a:t>NewProjectDialog</a:t>
+            </a:r>
+            <a:endParaRPr lang="de-DE" dirty="0" smtClean="0"/>
+          </a:p>
+          <a:p>
+            <a:pPr marL="758825" lvl="4" indent="-342900">
+              <a:buFont typeface="Wingdings" charset="2"/>
+              <a:buChar char="§"/>
+            </a:pPr>
+            <a:r>
+              <a:rPr lang="de-DE" dirty="0" err="1" smtClean="0"/>
+              <a:t>EditProjectDialog</a:t>
+            </a:r>
+            <a:endParaRPr lang="de-DE" dirty="0" smtClean="0"/>
+          </a:p>
+          <a:p>
+            <a:pPr marL="758825" lvl="4" indent="-342900">
+              <a:buFont typeface="Wingdings" charset="2"/>
+              <a:buChar char="§"/>
+            </a:pPr>
+            <a:r>
+              <a:rPr lang="de-DE" dirty="0" err="1" smtClean="0"/>
+              <a:t>ImportTableCsvDialog</a:t>
+            </a:r>
+            <a:endParaRPr lang="de-DE" dirty="0" smtClean="0"/>
+          </a:p>
+          <a:p>
+            <a:pPr marL="758825" lvl="4" indent="-342900">
+              <a:buFont typeface="Wingdings" charset="2"/>
+              <a:buChar char="§"/>
+            </a:pPr>
+            <a:r>
+              <a:rPr lang="de-DE" dirty="0" err="1" smtClean="0"/>
+              <a:t>InsertFootnoteDialog</a:t>
+            </a:r>
+            <a:endParaRPr lang="de-DE" dirty="0" smtClean="0"/>
+          </a:p>
+          <a:p>
+            <a:pPr marL="758825" lvl="4" indent="-342900">
+              <a:buFont typeface="Wingdings" charset="2"/>
+              <a:buChar char="§"/>
+            </a:pPr>
+            <a:r>
+              <a:rPr lang="de-DE" dirty="0" err="1" smtClean="0"/>
+              <a:t>InsertGraphicDialog</a:t>
+            </a:r>
+            <a:endParaRPr lang="de-DE" dirty="0" smtClean="0"/>
+          </a:p>
+          <a:p>
+            <a:pPr marL="758825" lvl="4" indent="-342900">
+              <a:buFont typeface="Wingdings" charset="2"/>
+              <a:buChar char="§"/>
+            </a:pPr>
+            <a:r>
+              <a:rPr lang="de-DE" dirty="0" err="1" smtClean="0"/>
+              <a:t>InsertLinkDialog</a:t>
+            </a:r>
+            <a:endParaRPr lang="de-DE" dirty="0" smtClean="0"/>
+          </a:p>
+          <a:p>
+            <a:pPr marL="758825" lvl="4" indent="-342900">
+              <a:buFont typeface="Wingdings" charset="2"/>
+              <a:buChar char="§"/>
+            </a:pPr>
+            <a:r>
+              <a:rPr lang="de-DE" dirty="0" err="1" smtClean="0"/>
+              <a:t>InsertTableDialog</a:t>
+            </a:r>
+            <a:endParaRPr lang="de-DE" dirty="0" smtClean="0"/>
+          </a:p>
+          <a:p>
+            <a:pPr marL="758825" lvl="4" indent="-342900">
+              <a:buFont typeface="Wingdings" charset="2"/>
+              <a:buChar char="§"/>
+            </a:pPr>
+            <a:r>
+              <a:rPr lang="de-DE" dirty="0" err="1" smtClean="0"/>
+              <a:t>SaveDialog</a:t>
+            </a:r>
+            <a:endParaRPr lang="de-DE" dirty="0" smtClean="0"/>
+          </a:p>
+          <a:p>
+            <a:pPr marL="758825" lvl="4" indent="-342900">
+              <a:buFont typeface="Wingdings" charset="2"/>
+              <a:buChar char="§"/>
+            </a:pPr>
+            <a:r>
+              <a:rPr lang="de-DE" dirty="0" err="1" smtClean="0"/>
+              <a:t>CommitChangesDialog</a:t>
+            </a:r>
+            <a:endParaRPr lang="de-DE" dirty="0" smtClean="0"/>
+          </a:p>
+        </p:txBody>
+      </p:sp>
+    </p:spTree>
+    <p:extLst>
+      <p:ext uri="{BB962C8B-B14F-4D97-AF65-F5344CB8AC3E}">
+        <p14:creationId xmlns:p14="http://schemas.microsoft.com/office/powerpoint/2010/main" val="624497072"/>
+      </p:ext>
+    </p:extLst>
+  </p:cSld>
+  <p:clrMapOvr>
+    <a:masterClrMapping/>
+  </p:clrMapOvr>
+  <p:transition spd="slow">
+    <p:push dir="u"/>
+  </p:transition>
+  <p:timing>
+    <p:tnLst>
+      <p:par>
+        <p:cTn id="1" dur="indefinite" restart="never" nodeType="tmRoot"/>
+      </p:par>
+    </p:tnLst>
+  </p:timing>
+</p:sld>
+</file>
+
+<file path=ppt/slides/slide15.xml><?xml version="1.0" encoding="utf-8"?>
+<p:sld xmlns:a="http://schemas.openxmlformats.org/drawingml/2006/main" xmlns:r="http://schemas.openxmlformats.org/officeDocument/2006/relationships" xmlns:p="http://schemas.openxmlformats.org/presentationml/2006/main">
+  <p:cSld>
+    <p:spTree>
+      <p:nvGrpSpPr>
+        <p:cNvPr id="1" name=""/>
+        <p:cNvGrpSpPr/>
+        <p:nvPr/>
+      </p:nvGrpSpPr>
+      <p:grpSpPr>
+        <a:xfrm>
+          <a:off x="0" y="0"/>
+          <a:ext cx="0" cy="0"/>
+          <a:chOff x="0" y="0"/>
+          <a:chExt cx="0" cy="0"/>
+        </a:xfrm>
+      </p:grpSpPr>
+      <p:sp>
+        <p:nvSpPr>
+          <p:cNvPr id="3" name="Inhaltsplatzhalter 2"/>
+          <p:cNvSpPr>
+            <a:spLocks noGrp="1"/>
+          </p:cNvSpPr>
+          <p:nvPr>
+            <p:ph sz="quarter" idx="19"/>
+          </p:nvPr>
+        </p:nvSpPr>
+        <p:spPr>
+          <a:xfrm>
+            <a:off x="0" y="764704"/>
+            <a:ext cx="9144000" cy="288032"/>
+          </a:xfrm>
+        </p:spPr>
+        <p:txBody>
+          <a:bodyPr anchor="ctr"/>
+          <a:lstStyle/>
+          <a:p>
+            <a:pPr algn="ctr"/>
+            <a:r>
+              <a:rPr lang="de-DE" sz="1200" b="0" dirty="0"/>
+              <a:t>1. Zielstellung &gt; 2. Bestehende Lösungsansätze &gt; </a:t>
+            </a:r>
+            <a:r>
+              <a:rPr lang="de-DE" sz="1200" b="0" dirty="0">
+                <a:solidFill>
+                  <a:schemeClr val="tx1"/>
+                </a:solidFill>
+              </a:rPr>
+              <a:t>3. Entwicklung einer neuen Erweiterung für ATOM</a:t>
+            </a:r>
+            <a:r>
+              <a:rPr lang="de-DE" sz="1200" b="0" dirty="0"/>
+              <a:t> &gt; 4. Ausblick</a:t>
+            </a:r>
+          </a:p>
+        </p:txBody>
+      </p:sp>
+      <p:sp>
+        <p:nvSpPr>
+          <p:cNvPr id="4" name="Datumsplatzhalter 3"/>
+          <p:cNvSpPr>
+            <a:spLocks noGrp="1"/>
+          </p:cNvSpPr>
+          <p:nvPr>
+            <p:ph type="dt" sz="half" idx="20"/>
+          </p:nvPr>
+        </p:nvSpPr>
+        <p:spPr/>
+        <p:txBody>
+          <a:bodyPr/>
+          <a:lstStyle/>
+          <a:p>
+            <a:fld id="{852F18A7-60EF-DD48-8F37-BE93452F0A67}" type="datetime1">
+              <a:rPr lang="de-DE" smtClean="0"/>
+              <a:t>25.10.16</a:t>
+            </a:fld>
+            <a:endParaRPr lang="de-DE" dirty="0"/>
+          </a:p>
+        </p:txBody>
+      </p:sp>
+      <p:sp>
+        <p:nvSpPr>
+          <p:cNvPr id="6" name="Foliennummernplatzhalter 5"/>
+          <p:cNvSpPr>
+            <a:spLocks noGrp="1"/>
+          </p:cNvSpPr>
+          <p:nvPr>
+            <p:ph type="sldNum" sz="quarter" idx="22"/>
+          </p:nvPr>
+        </p:nvSpPr>
+        <p:spPr/>
+        <p:txBody>
+          <a:bodyPr/>
+          <a:lstStyle/>
+          <a:p>
+            <a:r>
+              <a:rPr lang="de-DE"/>
+              <a:t>Folie </a:t>
+            </a:r>
+            <a:fld id="{20336FBE-96EF-1B43-9998-83765DDB0397}" type="slidenum">
+              <a:rPr lang="de-DE" smtClean="0"/>
+              <a:pPr/>
+              <a:t>15</a:t>
+            </a:fld>
+            <a:r>
+              <a:rPr lang="de-DE"/>
+              <a:t> von XYZ</a:t>
+            </a:r>
+            <a:endParaRPr lang="de-DE" dirty="0"/>
+          </a:p>
+        </p:txBody>
+      </p:sp>
+      <p:sp>
+        <p:nvSpPr>
+          <p:cNvPr id="7" name="Textfeld 6"/>
+          <p:cNvSpPr txBox="1"/>
+          <p:nvPr/>
+        </p:nvSpPr>
+        <p:spPr>
+          <a:xfrm>
+            <a:off x="76971" y="1106160"/>
+            <a:ext cx="4500206" cy="369332"/>
+          </a:xfrm>
+          <a:prstGeom prst="rect">
+            <a:avLst/>
+          </a:prstGeom>
+          <a:noFill/>
+        </p:spPr>
+        <p:txBody>
+          <a:bodyPr wrap="none" rtlCol="0">
+            <a:spAutoFit/>
+          </a:bodyPr>
+          <a:lstStyle/>
+          <a:p>
+            <a:r>
+              <a:rPr lang="de-DE" b="1" dirty="0" smtClean="0"/>
+              <a:t>Struktur im Code und Wiederverwendbarkeit</a:t>
+            </a:r>
+            <a:endParaRPr lang="de-DE" b="1" dirty="0"/>
+          </a:p>
+        </p:txBody>
+      </p:sp>
+      <p:sp>
+        <p:nvSpPr>
+          <p:cNvPr id="8" name="Inhaltsplatzhalter 1"/>
+          <p:cNvSpPr txBox="1">
+            <a:spLocks/>
+          </p:cNvSpPr>
+          <p:nvPr/>
+        </p:nvSpPr>
+        <p:spPr>
+          <a:xfrm>
+            <a:off x="655638" y="1556792"/>
+            <a:ext cx="7804794" cy="4608041"/>
+          </a:xfrm>
+          <a:prstGeom prst="rect">
+            <a:avLst/>
+          </a:prstGeom>
+        </p:spPr>
+        <p:txBody>
+          <a:bodyPr lIns="0" tIns="0" rIns="0" bIns="0"/>
+          <a:lstStyle>
+            <a:lvl1pPr marL="0" marR="0" indent="0" algn="l" defTabSz="914368" rtl="0" eaLnBrk="1" fontAlgn="t" latinLnBrk="0" hangingPunct="1">
+              <a:lnSpc>
+                <a:spcPct val="100000"/>
+              </a:lnSpc>
+              <a:spcBef>
+                <a:spcPts val="0"/>
+              </a:spcBef>
+              <a:spcAft>
+                <a:spcPts val="600"/>
+              </a:spcAft>
+              <a:buClrTx/>
+              <a:buSzTx/>
+              <a:buFontTx/>
+              <a:buNone/>
+              <a:tabLst/>
+              <a:defRPr sz="2000" kern="1200" baseline="0">
+                <a:solidFill>
+                  <a:srgbClr val="0B2A51"/>
+                </a:solidFill>
+                <a:latin typeface="Verdana" pitchFamily="34" charset="0"/>
+                <a:ea typeface="+mn-ea"/>
+                <a:cs typeface="+mn-cs"/>
+              </a:defRPr>
+            </a:lvl1pPr>
+            <a:lvl2pPr marL="161925" indent="-161925" algn="l" defTabSz="914368" rtl="0" eaLnBrk="1" fontAlgn="t" latinLnBrk="0" hangingPunct="1">
+              <a:spcBef>
+                <a:spcPts val="300"/>
+              </a:spcBef>
+              <a:spcAft>
+                <a:spcPts val="600"/>
+              </a:spcAft>
+              <a:buClr>
+                <a:schemeClr val="tx1"/>
+              </a:buClr>
+              <a:buSzPct val="120000"/>
+              <a:buFont typeface="LucidaGrande" charset="0"/>
+              <a:buChar char="_"/>
+              <a:tabLst/>
+              <a:defRPr sz="2000" kern="1200" baseline="0">
+                <a:solidFill>
+                  <a:srgbClr val="0B2A51"/>
+                </a:solidFill>
+                <a:latin typeface="Verdana" pitchFamily="34" charset="0"/>
+                <a:ea typeface="+mn-ea"/>
+                <a:cs typeface="+mn-cs"/>
+              </a:defRPr>
+            </a:lvl2pPr>
+            <a:lvl3pPr marL="0" indent="0" algn="l" defTabSz="914368" rtl="0" eaLnBrk="1" fontAlgn="t" latinLnBrk="0" hangingPunct="1">
+              <a:spcBef>
+                <a:spcPts val="0"/>
+              </a:spcBef>
+              <a:spcAft>
+                <a:spcPts val="600"/>
+              </a:spcAft>
+              <a:buSzPct val="100000"/>
+              <a:buFont typeface="Symbol" charset="2"/>
+              <a:buNone/>
+              <a:tabLst/>
+              <a:defRPr sz="1600" kern="1200" baseline="0">
+                <a:solidFill>
+                  <a:srgbClr val="0B2A51"/>
+                </a:solidFill>
+                <a:latin typeface="Verdana" pitchFamily="34" charset="0"/>
+                <a:ea typeface="+mn-ea"/>
+                <a:cs typeface="+mn-cs"/>
+              </a:defRPr>
+            </a:lvl3pPr>
+            <a:lvl4pPr marL="288925" indent="-127000" algn="l" defTabSz="914368" rtl="0" eaLnBrk="1" latinLnBrk="0" hangingPunct="1">
+              <a:spcBef>
+                <a:spcPts val="0"/>
+              </a:spcBef>
+              <a:spcAft>
+                <a:spcPts val="600"/>
+              </a:spcAft>
+              <a:buClr>
+                <a:schemeClr val="tx1"/>
+              </a:buClr>
+              <a:buSzPct val="100000"/>
+              <a:buFont typeface="LucidaGrande" charset="0"/>
+              <a:buChar char="_"/>
+              <a:tabLst/>
+              <a:defRPr sz="1600" kern="1200" baseline="0">
+                <a:solidFill>
+                  <a:srgbClr val="0B2A51"/>
+                </a:solidFill>
+                <a:latin typeface="Verdana" pitchFamily="34" charset="0"/>
+                <a:ea typeface="+mn-ea"/>
+                <a:cs typeface="+mn-cs"/>
+              </a:defRPr>
+            </a:lvl4pPr>
+            <a:lvl5pPr marL="415925" indent="-127000" algn="l" defTabSz="914368" rtl="0" eaLnBrk="1" latinLnBrk="0" hangingPunct="1">
+              <a:spcBef>
+                <a:spcPts val="0"/>
+              </a:spcBef>
+              <a:spcAft>
+                <a:spcPts val="600"/>
+              </a:spcAft>
+              <a:buSzPct val="170000"/>
+              <a:buFont typeface="AppleSymbols" charset="0"/>
+              <a:buChar char="⌞"/>
+              <a:tabLst/>
+              <a:defRPr sz="1600" kern="1200" baseline="0">
+                <a:solidFill>
+                  <a:srgbClr val="0B2A51"/>
+                </a:solidFill>
+                <a:latin typeface="Verdana" pitchFamily="34" charset="0"/>
+                <a:ea typeface="+mn-ea"/>
+                <a:cs typeface="+mn-cs"/>
+              </a:defRPr>
+            </a:lvl5pPr>
+            <a:lvl6pPr marL="2514512" indent="-228592" algn="l" defTabSz="914368" rtl="0" eaLnBrk="1" latinLnBrk="0" hangingPunct="1">
+              <a:spcBef>
+                <a:spcPct val="20000"/>
+              </a:spcBef>
+              <a:buFont typeface="Arial" pitchFamily="34" charset="0"/>
+              <a:buChar char="•"/>
+              <a:defRPr sz="2000" kern="1200">
+                <a:solidFill>
+                  <a:schemeClr val="tx1"/>
+                </a:solidFill>
+                <a:latin typeface="+mn-lt"/>
+                <a:ea typeface="+mn-ea"/>
+                <a:cs typeface="+mn-cs"/>
+              </a:defRPr>
+            </a:lvl6pPr>
+            <a:lvl7pPr marL="2971696" indent="-228592" algn="l" defTabSz="914368" rtl="0" eaLnBrk="1" latinLnBrk="0" hangingPunct="1">
+              <a:spcBef>
+                <a:spcPct val="20000"/>
+              </a:spcBef>
+              <a:buFont typeface="Arial" pitchFamily="34" charset="0"/>
+              <a:buChar char="•"/>
+              <a:defRPr sz="2000" kern="1200">
+                <a:solidFill>
+                  <a:schemeClr val="tx1"/>
+                </a:solidFill>
+                <a:latin typeface="+mn-lt"/>
+                <a:ea typeface="+mn-ea"/>
+                <a:cs typeface="+mn-cs"/>
+              </a:defRPr>
+            </a:lvl7pPr>
+            <a:lvl8pPr marL="3428880" indent="-228592" algn="l" defTabSz="914368" rtl="0" eaLnBrk="1" latinLnBrk="0" hangingPunct="1">
+              <a:spcBef>
+                <a:spcPct val="20000"/>
+              </a:spcBef>
+              <a:buFont typeface="Arial" pitchFamily="34" charset="0"/>
+              <a:buChar char="•"/>
+              <a:defRPr sz="2000" kern="1200">
+                <a:solidFill>
+                  <a:schemeClr val="tx1"/>
+                </a:solidFill>
+                <a:latin typeface="+mn-lt"/>
+                <a:ea typeface="+mn-ea"/>
+                <a:cs typeface="+mn-cs"/>
+              </a:defRPr>
+            </a:lvl8pPr>
+            <a:lvl9pPr marL="3886064" indent="-228592" algn="l" defTabSz="914368" rtl="0" eaLnBrk="1" latinLnBrk="0" hangingPunct="1">
+              <a:spcBef>
+                <a:spcPct val="20000"/>
+              </a:spcBef>
+              <a:buFont typeface="Arial" pitchFamily="34" charset="0"/>
+              <a:buChar char="•"/>
+              <a:defRPr sz="2000" kern="1200">
+                <a:solidFill>
+                  <a:schemeClr val="tx1"/>
+                </a:solidFill>
+                <a:latin typeface="+mn-lt"/>
+                <a:ea typeface="+mn-ea"/>
+                <a:cs typeface="+mn-cs"/>
+              </a:defRPr>
+            </a:lvl9pPr>
+          </a:lstStyle>
+          <a:p>
+            <a:pPr marL="342900" indent="-342900">
+              <a:buFont typeface=".AppleSystemUIFont" charset="-120"/>
+              <a:buChar char="-"/>
+            </a:pPr>
+            <a:r>
+              <a:rPr lang="de-DE" dirty="0" smtClean="0"/>
+              <a:t>Einfache Erweiterung des Packages</a:t>
+            </a:r>
+            <a:endParaRPr lang="de-DE" dirty="0"/>
+          </a:p>
+          <a:p>
+            <a:pPr marL="631825" lvl="3" indent="-342900">
+              <a:buFont typeface="Wingdings" charset="2"/>
+              <a:buChar char="§"/>
+            </a:pPr>
+            <a:r>
+              <a:rPr lang="de-DE" dirty="0" err="1" smtClean="0"/>
+              <a:t>DialogView</a:t>
+            </a:r>
+            <a:endParaRPr lang="de-DE" dirty="0" smtClean="0"/>
+          </a:p>
+          <a:p>
+            <a:pPr marL="631825" lvl="3" indent="-342900">
+              <a:buFont typeface="Wingdings" charset="2"/>
+              <a:buChar char="§"/>
+            </a:pPr>
+            <a:r>
+              <a:rPr lang="de-DE" dirty="0" err="1" smtClean="0"/>
+              <a:t>ViewManager</a:t>
+            </a:r>
+            <a:endParaRPr lang="de-DE" dirty="0"/>
+          </a:p>
+          <a:p>
+            <a:pPr marL="631825" lvl="3" indent="-342900">
+              <a:buFont typeface="Wingdings" charset="2"/>
+              <a:buChar char="§"/>
+            </a:pPr>
+            <a:endParaRPr lang="de-DE" dirty="0" smtClean="0"/>
+          </a:p>
+          <a:p>
+            <a:pPr marL="342900" lvl="2" indent="-342900">
+              <a:buFont typeface=".AppleSystemUIFont" charset="-120"/>
+              <a:buChar char="-"/>
+            </a:pPr>
+            <a:r>
+              <a:rPr lang="de-DE" sz="2000" dirty="0" smtClean="0"/>
+              <a:t>Sprachunterstützung</a:t>
+            </a:r>
+          </a:p>
+          <a:p>
+            <a:pPr marL="631825" lvl="3" indent="-342900">
+              <a:buFont typeface="Wingdings" charset="2"/>
+              <a:buChar char="§"/>
+            </a:pPr>
+            <a:r>
+              <a:rPr lang="de-DE" dirty="0" smtClean="0"/>
+              <a:t>Alle Textelemente in Variablen</a:t>
+            </a:r>
+          </a:p>
+        </p:txBody>
+      </p:sp>
+    </p:spTree>
+    <p:extLst>
+      <p:ext uri="{BB962C8B-B14F-4D97-AF65-F5344CB8AC3E}">
+        <p14:creationId xmlns:p14="http://schemas.microsoft.com/office/powerpoint/2010/main" val="679048016"/>
       </p:ext>
     </p:extLst>
   </p:cSld>
@@ -7476,34 +10198,41 @@
           <a:lstStyle/>
           <a:p>
             <a:pPr marL="457200" indent="-457200">
+              <a:lnSpc>
+                <a:spcPts val="2600"/>
+              </a:lnSpc>
               <a:buFont typeface="+mj-lt"/>
               <a:buAutoNum type="arabicPeriod"/>
             </a:pPr>
             <a:r>
-              <a:rPr lang="de-DE" dirty="0"/>
+              <a:rPr lang="de-DE" dirty="0" smtClean="0"/>
               <a:t>Zielstellung</a:t>
             </a:r>
-            <a:br>
-              <a:rPr lang="de-DE" dirty="0"/>
-            </a:br>
             <a:endParaRPr lang="de-DE" dirty="0"/>
           </a:p>
           <a:p>
             <a:pPr marL="457200" indent="-457200">
+              <a:lnSpc>
+                <a:spcPts val="2600"/>
+              </a:lnSpc>
               <a:buFont typeface="+mj-lt"/>
               <a:buAutoNum type="arabicPeriod"/>
             </a:pPr>
             <a:r>
               <a:rPr lang="de-DE" dirty="0"/>
-              <a:t>Bestehende Lösungsansätze</a:t>
-            </a:r>
-            <a:br>
-              <a:rPr lang="de-DE" dirty="0"/>
-            </a:br>
+              <a:t>Bestehende </a:t>
+            </a:r>
+            <a:r>
+              <a:rPr lang="de-DE" dirty="0" smtClean="0"/>
+              <a:t>Lösungsansätze</a:t>
+            </a:r>
             <a:endParaRPr lang="de-DE" dirty="0"/>
           </a:p>
           <a:p>
             <a:pPr marL="457200" indent="-457200">
+              <a:lnSpc>
+                <a:spcPts val="2600"/>
+              </a:lnSpc>
               <a:buFont typeface="+mj-lt"/>
               <a:buAutoNum type="arabicPeriod"/>
             </a:pPr>
@@ -7514,18 +10243,42 @@
           </a:p>
           <a:p>
             <a:pPr marL="619125" lvl="1" indent="-457200">
-              <a:buFont typeface="Arial" charset="0"/>
-              <a:buChar char="•"/>
+              <a:lnSpc>
+                <a:spcPts val="2600"/>
+              </a:lnSpc>
+              <a:buFont typeface="Wingdings" charset="2"/>
+              <a:buChar char="§"/>
             </a:pPr>
             <a:r>
               <a:rPr lang="de-DE" sz="1600" dirty="0"/>
-              <a:t>Vorteile des Editors</a:t>
+              <a:t>Vorteile des </a:t>
+            </a:r>
+            <a:r>
+              <a:rPr lang="de-DE" sz="1600" dirty="0" smtClean="0"/>
+              <a:t>Editors</a:t>
             </a:r>
           </a:p>
           <a:p>
             <a:pPr marL="619125" lvl="1" indent="-457200">
-              <a:buFont typeface="Arial" charset="0"/>
-              <a:buChar char="•"/>
+              <a:lnSpc>
+                <a:spcPts val="2600"/>
+              </a:lnSpc>
+              <a:buFont typeface="Wingdings" charset="2"/>
+              <a:buChar char="§"/>
+            </a:pPr>
+            <a:r>
+              <a:rPr lang="de-DE" sz="1600" dirty="0" smtClean="0"/>
+              <a:t>Eingesetzte Werkzeuge für die Entwicklung</a:t>
+            </a:r>
+            <a:endParaRPr lang="de-DE" sz="1600" dirty="0"/>
+          </a:p>
+          <a:p>
+            <a:pPr marL="619125" lvl="1" indent="-457200">
+              <a:lnSpc>
+                <a:spcPts val="2600"/>
+              </a:lnSpc>
+              <a:buFont typeface="Wingdings" charset="2"/>
+              <a:buChar char="§"/>
             </a:pPr>
             <a:r>
               <a:rPr lang="de-DE" sz="1600" dirty="0"/>
@@ -7534,20 +10287,27 @@
           </a:p>
           <a:p>
             <a:pPr marL="619125" lvl="1" indent="-457200">
-              <a:buFont typeface="Arial" charset="0"/>
-              <a:buChar char="•"/>
+              <a:lnSpc>
+                <a:spcPts val="2600"/>
+              </a:lnSpc>
+              <a:buFont typeface="Wingdings" charset="2"/>
+              <a:buChar char="§"/>
             </a:pPr>
             <a:r>
               <a:rPr lang="de-DE" sz="1600" dirty="0"/>
-              <a:t>Struktur im Code, Wiederverwendbarkeit</a:t>
-            </a:r>
-            <a:br>
-              <a:rPr lang="de-DE" sz="1600" dirty="0"/>
-            </a:br>
+              <a:t>Struktur im Code, </a:t>
+            </a:r>
+            <a:r>
+              <a:rPr lang="de-DE" sz="1600" dirty="0" smtClean="0"/>
+              <a:t>Wiederverwendbarkeit</a:t>
+            </a:r>
             <a:endParaRPr lang="de-DE" sz="1600" dirty="0"/>
           </a:p>
           <a:p>
             <a:pPr marL="457200" indent="-457200">
+              <a:lnSpc>
+                <a:spcPts val="2600"/>
+              </a:lnSpc>
               <a:buFont typeface="+mj-lt"/>
               <a:buAutoNum type="arabicPeriod"/>
             </a:pPr>
@@ -8038,6 +10798,9 @@
           <a:lstStyle/>
           <a:p>
             <a:pPr marL="342900" indent="-342900">
+              <a:lnSpc>
+                <a:spcPts val="2600"/>
+              </a:lnSpc>
               <a:buFont typeface=".AppleSystemUIFont" charset="-120"/>
               <a:buChar char="-"/>
             </a:pPr>
@@ -8056,6 +10819,9 @@
           </a:p>
           <a:p>
             <a:pPr marL="631825" lvl="3" indent="-342900">
+              <a:lnSpc>
+                <a:spcPts val="2600"/>
+              </a:lnSpc>
               <a:buFont typeface="Wingdings" charset="2"/>
               <a:buChar char="§"/>
             </a:pPr>
@@ -8074,6 +10840,9 @@
           </a:p>
           <a:p>
             <a:pPr marL="631825" lvl="3" indent="-342900">
+              <a:lnSpc>
+                <a:spcPts val="2600"/>
+              </a:lnSpc>
               <a:buFont typeface="Wingdings" charset="2"/>
               <a:buChar char="§"/>
             </a:pPr>
@@ -8084,6 +10853,9 @@
           </a:p>
           <a:p>
             <a:pPr marL="631825" lvl="3" indent="-342900">
+              <a:lnSpc>
+                <a:spcPts val="2600"/>
+              </a:lnSpc>
               <a:buFont typeface="Wingdings" charset="2"/>
               <a:buChar char="§"/>
             </a:pPr>
@@ -8103,6 +10875,9 @@
           </a:p>
           <a:p>
             <a:pPr marL="631825" lvl="3" indent="-342900">
+              <a:lnSpc>
+                <a:spcPts val="2600"/>
+              </a:lnSpc>
               <a:buFont typeface="Wingdings" charset="2"/>
               <a:buChar char="§"/>
             </a:pPr>
@@ -8113,6 +10888,9 @@
           </a:p>
           <a:p>
             <a:pPr marL="631825" lvl="3" indent="-342900">
+              <a:lnSpc>
+                <a:spcPts val="2600"/>
+              </a:lnSpc>
               <a:buFont typeface="Wingdings" charset="2"/>
               <a:buChar char="§"/>
             </a:pPr>
@@ -8123,6 +10901,9 @@
           </a:p>
           <a:p>
             <a:pPr marL="342900" indent="-342900">
+              <a:lnSpc>
+                <a:spcPts val="2600"/>
+              </a:lnSpc>
               <a:buFont typeface=".AppleSystemUIFont" charset="-120"/>
               <a:buChar char="-"/>
             </a:pPr>
@@ -8133,6 +10914,9 @@
           </a:p>
           <a:p>
             <a:pPr marL="342900" indent="-342900">
+              <a:lnSpc>
+                <a:spcPts val="2600"/>
+              </a:lnSpc>
               <a:buFont typeface=".AppleSystemUIFont" charset="-120"/>
               <a:buChar char="-"/>
             </a:pPr>
@@ -8778,12 +11562,8 @@
               <a:buChar char="§"/>
             </a:pPr>
             <a:r>
-              <a:rPr lang="de-DE" dirty="0" err="1" smtClean="0"/>
-              <a:t>Mpletter</a:t>
-            </a:r>
-            <a:r>
               <a:rPr lang="de-DE" dirty="0" smtClean="0"/>
-              <a:t> Funktionsumfang von </a:t>
+              <a:t>Kompletter Funktionsumfang von </a:t>
             </a:r>
             <a:r>
               <a:rPr lang="de-DE" dirty="0" err="1" smtClean="0"/>
@@ -9063,12 +11843,8 @@
               <a:buChar char="§"/>
             </a:pPr>
             <a:r>
-              <a:rPr lang="de-DE" dirty="0" err="1" smtClean="0"/>
-              <a:t>Mpletter</a:t>
-            </a:r>
-            <a:r>
               <a:rPr lang="de-DE" dirty="0" smtClean="0"/>
-              <a:t> Funktionsumfang von </a:t>
+              <a:t>Kompletter Funktionsumfang von </a:t>
             </a:r>
             <a:r>
               <a:rPr lang="de-DE" dirty="0" err="1" smtClean="0"/>

</xml_diff>

<commit_message>
beatify and ausblick ;)
</commit_message>
<xml_diff>
--- a/presentation.pptx
+++ b/presentation.pptx
@@ -5,10 +5,10 @@
     <p:sldMasterId id="2147483648" r:id="rId1"/>
   </p:sldMasterIdLst>
   <p:notesMasterIdLst>
-    <p:notesMasterId r:id="rId17"/>
+    <p:notesMasterId r:id="rId19"/>
   </p:notesMasterIdLst>
   <p:handoutMasterIdLst>
-    <p:handoutMasterId r:id="rId18"/>
+    <p:handoutMasterId r:id="rId20"/>
   </p:handoutMasterIdLst>
   <p:sldIdLst>
     <p:sldId id="259" r:id="rId2"/>
@@ -26,6 +26,8 @@
     <p:sldId id="271" r:id="rId14"/>
     <p:sldId id="272" r:id="rId15"/>
     <p:sldId id="273" r:id="rId16"/>
+    <p:sldId id="275" r:id="rId17"/>
+    <p:sldId id="274" r:id="rId18"/>
   </p:sldIdLst>
   <p:sldSz cx="9144000" cy="6858000" type="screen4x3"/>
   <p:notesSz cx="6858000" cy="9144000"/>
@@ -1836,6 +1838,104 @@
 </p:notes>
 </file>
 
+<file path=ppt/notesSlides/notesSlide12.xml><?xml version="1.0" encoding="utf-8"?>
+<p:notes xmlns:a="http://schemas.openxmlformats.org/drawingml/2006/main" xmlns:r="http://schemas.openxmlformats.org/officeDocument/2006/relationships" xmlns:p="http://schemas.openxmlformats.org/presentationml/2006/main">
+  <p:cSld>
+    <p:spTree>
+      <p:nvGrpSpPr>
+        <p:cNvPr id="1" name=""/>
+        <p:cNvGrpSpPr/>
+        <p:nvPr/>
+      </p:nvGrpSpPr>
+      <p:grpSpPr>
+        <a:xfrm>
+          <a:off x="0" y="0"/>
+          <a:ext cx="0" cy="0"/>
+          <a:chOff x="0" y="0"/>
+          <a:chExt cx="0" cy="0"/>
+        </a:xfrm>
+      </p:grpSpPr>
+      <p:sp>
+        <p:nvSpPr>
+          <p:cNvPr id="2" name="Folienbildplatzhalter 1"/>
+          <p:cNvSpPr>
+            <a:spLocks noGrp="1" noRot="1" noChangeAspect="1"/>
+          </p:cNvSpPr>
+          <p:nvPr>
+            <p:ph type="sldImg"/>
+          </p:nvPr>
+        </p:nvSpPr>
+        <p:spPr/>
+      </p:sp>
+      <p:sp>
+        <p:nvSpPr>
+          <p:cNvPr id="3" name="Notizenplatzhalter 2"/>
+          <p:cNvSpPr>
+            <a:spLocks noGrp="1"/>
+          </p:cNvSpPr>
+          <p:nvPr>
+            <p:ph type="body" idx="1"/>
+          </p:nvPr>
+        </p:nvSpPr>
+        <p:spPr/>
+        <p:txBody>
+          <a:bodyPr/>
+          <a:lstStyle/>
+          <a:p>
+            <a:r>
+              <a:rPr lang="de-DE" baseline="0" dirty="0"/>
+              <a:t>Live Preview:</a:t>
+            </a:r>
+          </a:p>
+          <a:p>
+            <a:r>
+              <a:rPr lang="de-DE" baseline="0" dirty="0"/>
+              <a:t>- Mehr </a:t>
+            </a:r>
+            <a:r>
+              <a:rPr lang="de-DE" baseline="0" dirty="0" err="1"/>
+              <a:t>wysiwyg</a:t>
+            </a:r>
+            <a:endParaRPr lang="de-DE" baseline="0" dirty="0"/>
+          </a:p>
+        </p:txBody>
+      </p:sp>
+      <p:sp>
+        <p:nvSpPr>
+          <p:cNvPr id="4" name="Foliennummernplatzhalter 3"/>
+          <p:cNvSpPr>
+            <a:spLocks noGrp="1"/>
+          </p:cNvSpPr>
+          <p:nvPr>
+            <p:ph type="sldNum" sz="quarter" idx="10"/>
+          </p:nvPr>
+        </p:nvSpPr>
+        <p:spPr/>
+        <p:txBody>
+          <a:bodyPr/>
+          <a:lstStyle/>
+          <a:p>
+            <a:fld id="{97667336-ABAD-4032-8A72-A57DA0F2B670}" type="slidenum">
+              <a:rPr lang="de-LU" smtClean="0"/>
+              <a:t>17</a:t>
+            </a:fld>
+            <a:endParaRPr lang="de-LU"/>
+          </a:p>
+        </p:txBody>
+      </p:sp>
+    </p:spTree>
+    <p:extLst>
+      <p:ext uri="{BB962C8B-B14F-4D97-AF65-F5344CB8AC3E}">
+        <p14:creationId xmlns:p14="http://schemas.microsoft.com/office/powerpoint/2010/main" val="2618046515"/>
+      </p:ext>
+    </p:extLst>
+  </p:cSld>
+  <p:clrMapOvr>
+    <a:masterClrMapping/>
+  </p:clrMapOvr>
+</p:notes>
+</file>
+
 <file path=ppt/notesSlides/notesSlide2.xml><?xml version="1.0" encoding="utf-8"?>
 <p:notes xmlns:a="http://schemas.openxmlformats.org/drawingml/2006/main" xmlns:r="http://schemas.openxmlformats.org/officeDocument/2006/relationships" xmlns:p="http://schemas.openxmlformats.org/presentationml/2006/main">
   <p:cSld>
@@ -3250,7 +3350,7 @@
           <a:p>
             <a:r>
               <a:rPr lang="de-DE" baseline="0" dirty="0"/>
-              <a:t>ATOM als DIE</a:t>
+              <a:t>ATOM als IDE</a:t>
             </a:r>
           </a:p>
           <a:p>
@@ -8599,7 +8699,7 @@
         </p:nvGrpSpPr>
         <p:grpSpPr>
           <a:xfrm>
-            <a:off x="1331640" y="3717032"/>
+            <a:off x="1547664" y="3861048"/>
             <a:ext cx="6120680" cy="2500414"/>
             <a:chOff x="1331640" y="3717032"/>
             <a:chExt cx="6120680" cy="2500414"/>
@@ -11305,6 +11405,491 @@
     <p:extLst>
       <p:ext uri="{BB962C8B-B14F-4D97-AF65-F5344CB8AC3E}">
         <p14:creationId xmlns:p14="http://schemas.microsoft.com/office/powerpoint/2010/main" val="679048016"/>
+      </p:ext>
+    </p:extLst>
+  </p:cSld>
+  <p:clrMapOvr>
+    <a:masterClrMapping/>
+  </p:clrMapOvr>
+  <p:transition spd="slow">
+    <p:push dir="u"/>
+  </p:transition>
+</p:sld>
+</file>
+
+<file path=ppt/slides/slide16.xml><?xml version="1.0" encoding="utf-8"?>
+<p:sld xmlns:a="http://schemas.openxmlformats.org/drawingml/2006/main" xmlns:r="http://schemas.openxmlformats.org/officeDocument/2006/relationships" xmlns:p="http://schemas.openxmlformats.org/presentationml/2006/main">
+  <p:cSld>
+    <p:spTree>
+      <p:nvGrpSpPr>
+        <p:cNvPr id="1" name=""/>
+        <p:cNvGrpSpPr/>
+        <p:nvPr/>
+      </p:nvGrpSpPr>
+      <p:grpSpPr>
+        <a:xfrm>
+          <a:off x="0" y="0"/>
+          <a:ext cx="0" cy="0"/>
+          <a:chOff x="0" y="0"/>
+          <a:chExt cx="0" cy="0"/>
+        </a:xfrm>
+      </p:grpSpPr>
+      <p:sp>
+        <p:nvSpPr>
+          <p:cNvPr id="2" name="Inhaltsplatzhalter 1"/>
+          <p:cNvSpPr>
+            <a:spLocks noGrp="1"/>
+          </p:cNvSpPr>
+          <p:nvPr>
+            <p:ph sz="quarter" idx="11"/>
+          </p:nvPr>
+        </p:nvSpPr>
+        <p:spPr>
+          <a:xfrm>
+            <a:off x="859632" y="4277677"/>
+            <a:ext cx="7832725" cy="360313"/>
+          </a:xfrm>
+        </p:spPr>
+        <p:txBody>
+          <a:bodyPr/>
+          <a:lstStyle/>
+          <a:p>
+            <a:pPr algn="r"/>
+            <a:r>
+              <a:rPr lang="de-DE" sz="1800" dirty="0"/>
+              <a:t>Was fehlt noch?</a:t>
+            </a:r>
+          </a:p>
+        </p:txBody>
+      </p:sp>
+      <p:sp>
+        <p:nvSpPr>
+          <p:cNvPr id="3" name="Inhaltsplatzhalter 2"/>
+          <p:cNvSpPr>
+            <a:spLocks noGrp="1"/>
+          </p:cNvSpPr>
+          <p:nvPr>
+            <p:ph sz="quarter" idx="19"/>
+          </p:nvPr>
+        </p:nvSpPr>
+        <p:spPr>
+          <a:xfrm>
+            <a:off x="858043" y="2324000"/>
+            <a:ext cx="7834314" cy="558801"/>
+          </a:xfrm>
+        </p:spPr>
+        <p:txBody>
+          <a:bodyPr/>
+          <a:lstStyle/>
+          <a:p>
+            <a:r>
+              <a:rPr lang="de-DE" sz="2800" dirty="0"/>
+              <a:t>4. 	Ausblick</a:t>
+            </a:r>
+          </a:p>
+        </p:txBody>
+      </p:sp>
+      <p:sp>
+        <p:nvSpPr>
+          <p:cNvPr id="4" name="Datumsplatzhalter 3"/>
+          <p:cNvSpPr>
+            <a:spLocks noGrp="1"/>
+          </p:cNvSpPr>
+          <p:nvPr>
+            <p:ph type="dt" sz="half" idx="20"/>
+          </p:nvPr>
+        </p:nvSpPr>
+        <p:spPr/>
+        <p:txBody>
+          <a:bodyPr/>
+          <a:lstStyle/>
+          <a:p>
+            <a:fld id="{852F18A7-60EF-DD48-8F37-BE93452F0A67}" type="datetime1">
+              <a:rPr lang="de-DE" smtClean="0"/>
+              <a:t>25.10.2016</a:t>
+            </a:fld>
+            <a:endParaRPr lang="de-DE" dirty="0"/>
+          </a:p>
+        </p:txBody>
+      </p:sp>
+      <p:sp>
+        <p:nvSpPr>
+          <p:cNvPr id="6" name="Foliennummernplatzhalter 5"/>
+          <p:cNvSpPr>
+            <a:spLocks noGrp="1"/>
+          </p:cNvSpPr>
+          <p:nvPr>
+            <p:ph type="sldNum" sz="quarter" idx="22"/>
+          </p:nvPr>
+        </p:nvSpPr>
+        <p:spPr/>
+        <p:txBody>
+          <a:bodyPr/>
+          <a:lstStyle/>
+          <a:p>
+            <a:r>
+              <a:rPr lang="de-DE"/>
+              <a:t>Folie </a:t>
+            </a:r>
+            <a:fld id="{20336FBE-96EF-1B43-9998-83765DDB0397}" type="slidenum">
+              <a:rPr lang="de-DE" smtClean="0"/>
+              <a:pPr/>
+              <a:t>16</a:t>
+            </a:fld>
+            <a:r>
+              <a:rPr lang="de-DE"/>
+              <a:t> von XYZ</a:t>
+            </a:r>
+            <a:endParaRPr lang="de-DE" dirty="0"/>
+          </a:p>
+        </p:txBody>
+      </p:sp>
+    </p:spTree>
+    <p:extLst>
+      <p:ext uri="{BB962C8B-B14F-4D97-AF65-F5344CB8AC3E}">
+        <p14:creationId xmlns:p14="http://schemas.microsoft.com/office/powerpoint/2010/main" val="746873612"/>
+      </p:ext>
+    </p:extLst>
+  </p:cSld>
+  <p:clrMapOvr>
+    <a:masterClrMapping/>
+  </p:clrMapOvr>
+  <p:transition spd="slow">
+    <p:push dir="u"/>
+  </p:transition>
+</p:sld>
+</file>
+
+<file path=ppt/slides/slide17.xml><?xml version="1.0" encoding="utf-8"?>
+<p:sld xmlns:a="http://schemas.openxmlformats.org/drawingml/2006/main" xmlns:r="http://schemas.openxmlformats.org/officeDocument/2006/relationships" xmlns:p="http://schemas.openxmlformats.org/presentationml/2006/main">
+  <p:cSld>
+    <p:spTree>
+      <p:nvGrpSpPr>
+        <p:cNvPr id="1" name=""/>
+        <p:cNvGrpSpPr/>
+        <p:nvPr/>
+      </p:nvGrpSpPr>
+      <p:grpSpPr>
+        <a:xfrm>
+          <a:off x="0" y="0"/>
+          <a:ext cx="0" cy="0"/>
+          <a:chOff x="0" y="0"/>
+          <a:chExt cx="0" cy="0"/>
+        </a:xfrm>
+      </p:grpSpPr>
+      <p:sp>
+        <p:nvSpPr>
+          <p:cNvPr id="3" name="Inhaltsplatzhalter 2"/>
+          <p:cNvSpPr>
+            <a:spLocks noGrp="1"/>
+          </p:cNvSpPr>
+          <p:nvPr>
+            <p:ph sz="quarter" idx="19"/>
+          </p:nvPr>
+        </p:nvSpPr>
+        <p:spPr>
+          <a:xfrm>
+            <a:off x="0" y="764704"/>
+            <a:ext cx="9144000" cy="288032"/>
+          </a:xfrm>
+        </p:spPr>
+        <p:txBody>
+          <a:bodyPr anchor="ctr"/>
+          <a:lstStyle/>
+          <a:p>
+            <a:pPr algn="ctr"/>
+            <a:r>
+              <a:rPr lang="de-DE" sz="1200" b="0" dirty="0"/>
+              <a:t>1. Zielstellung &gt; 2. Bestehende Lösungsansätze &gt; </a:t>
+            </a:r>
+            <a:r>
+              <a:rPr lang="de-DE" sz="1200" b="0" dirty="0">
+                <a:solidFill>
+                  <a:schemeClr val="tx1"/>
+                </a:solidFill>
+              </a:rPr>
+              <a:t>3. Entwicklung einer neuen Erweiterung für ATOM</a:t>
+            </a:r>
+            <a:r>
+              <a:rPr lang="de-DE" sz="1200" b="0" dirty="0"/>
+              <a:t> &gt; 4. Ausblick</a:t>
+            </a:r>
+          </a:p>
+        </p:txBody>
+      </p:sp>
+      <p:sp>
+        <p:nvSpPr>
+          <p:cNvPr id="4" name="Datumsplatzhalter 3"/>
+          <p:cNvSpPr>
+            <a:spLocks noGrp="1"/>
+          </p:cNvSpPr>
+          <p:nvPr>
+            <p:ph type="dt" sz="half" idx="20"/>
+          </p:nvPr>
+        </p:nvSpPr>
+        <p:spPr/>
+        <p:txBody>
+          <a:bodyPr/>
+          <a:lstStyle/>
+          <a:p>
+            <a:fld id="{852F18A7-60EF-DD48-8F37-BE93452F0A67}" type="datetime1">
+              <a:rPr lang="de-DE" smtClean="0"/>
+              <a:t>25.10.2016</a:t>
+            </a:fld>
+            <a:endParaRPr lang="de-DE" dirty="0"/>
+          </a:p>
+        </p:txBody>
+      </p:sp>
+      <p:sp>
+        <p:nvSpPr>
+          <p:cNvPr id="6" name="Foliennummernplatzhalter 5"/>
+          <p:cNvSpPr>
+            <a:spLocks noGrp="1"/>
+          </p:cNvSpPr>
+          <p:nvPr>
+            <p:ph type="sldNum" sz="quarter" idx="22"/>
+          </p:nvPr>
+        </p:nvSpPr>
+        <p:spPr/>
+        <p:txBody>
+          <a:bodyPr/>
+          <a:lstStyle/>
+          <a:p>
+            <a:r>
+              <a:rPr lang="de-DE"/>
+              <a:t>Folie </a:t>
+            </a:r>
+            <a:fld id="{20336FBE-96EF-1B43-9998-83765DDB0397}" type="slidenum">
+              <a:rPr lang="de-DE" smtClean="0"/>
+              <a:pPr/>
+              <a:t>17</a:t>
+            </a:fld>
+            <a:r>
+              <a:rPr lang="de-DE"/>
+              <a:t> von XYZ</a:t>
+            </a:r>
+            <a:endParaRPr lang="de-DE" dirty="0"/>
+          </a:p>
+        </p:txBody>
+      </p:sp>
+      <p:sp>
+        <p:nvSpPr>
+          <p:cNvPr id="8" name="Inhaltsplatzhalter 1"/>
+          <p:cNvSpPr txBox="1">
+            <a:spLocks/>
+          </p:cNvSpPr>
+          <p:nvPr/>
+        </p:nvSpPr>
+        <p:spPr>
+          <a:xfrm>
+            <a:off x="655638" y="1556792"/>
+            <a:ext cx="7804794" cy="4608041"/>
+          </a:xfrm>
+          <a:prstGeom prst="rect">
+            <a:avLst/>
+          </a:prstGeom>
+        </p:spPr>
+        <p:txBody>
+          <a:bodyPr lIns="0" tIns="0" rIns="0" bIns="0"/>
+          <a:lstStyle>
+            <a:lvl1pPr marL="0" marR="0" indent="0" algn="l" defTabSz="914368" rtl="0" eaLnBrk="1" fontAlgn="t" latinLnBrk="0" hangingPunct="1">
+              <a:lnSpc>
+                <a:spcPct val="100000"/>
+              </a:lnSpc>
+              <a:spcBef>
+                <a:spcPts val="0"/>
+              </a:spcBef>
+              <a:spcAft>
+                <a:spcPts val="600"/>
+              </a:spcAft>
+              <a:buClrTx/>
+              <a:buSzTx/>
+              <a:buFontTx/>
+              <a:buNone/>
+              <a:tabLst/>
+              <a:defRPr sz="2000" kern="1200" baseline="0">
+                <a:solidFill>
+                  <a:srgbClr val="0B2A51"/>
+                </a:solidFill>
+                <a:latin typeface="Verdana" pitchFamily="34" charset="0"/>
+                <a:ea typeface="+mn-ea"/>
+                <a:cs typeface="+mn-cs"/>
+              </a:defRPr>
+            </a:lvl1pPr>
+            <a:lvl2pPr marL="161925" indent="-161925" algn="l" defTabSz="914368" rtl="0" eaLnBrk="1" fontAlgn="t" latinLnBrk="0" hangingPunct="1">
+              <a:spcBef>
+                <a:spcPts val="300"/>
+              </a:spcBef>
+              <a:spcAft>
+                <a:spcPts val="600"/>
+              </a:spcAft>
+              <a:buClr>
+                <a:schemeClr val="tx1"/>
+              </a:buClr>
+              <a:buSzPct val="120000"/>
+              <a:buFont typeface="LucidaGrande" charset="0"/>
+              <a:buChar char="_"/>
+              <a:tabLst/>
+              <a:defRPr sz="2000" kern="1200" baseline="0">
+                <a:solidFill>
+                  <a:srgbClr val="0B2A51"/>
+                </a:solidFill>
+                <a:latin typeface="Verdana" pitchFamily="34" charset="0"/>
+                <a:ea typeface="+mn-ea"/>
+                <a:cs typeface="+mn-cs"/>
+              </a:defRPr>
+            </a:lvl2pPr>
+            <a:lvl3pPr marL="0" indent="0" algn="l" defTabSz="914368" rtl="0" eaLnBrk="1" fontAlgn="t" latinLnBrk="0" hangingPunct="1">
+              <a:spcBef>
+                <a:spcPts val="0"/>
+              </a:spcBef>
+              <a:spcAft>
+                <a:spcPts val="600"/>
+              </a:spcAft>
+              <a:buSzPct val="100000"/>
+              <a:buFont typeface="Symbol" charset="2"/>
+              <a:buNone/>
+              <a:tabLst/>
+              <a:defRPr sz="1600" kern="1200" baseline="0">
+                <a:solidFill>
+                  <a:srgbClr val="0B2A51"/>
+                </a:solidFill>
+                <a:latin typeface="Verdana" pitchFamily="34" charset="0"/>
+                <a:ea typeface="+mn-ea"/>
+                <a:cs typeface="+mn-cs"/>
+              </a:defRPr>
+            </a:lvl3pPr>
+            <a:lvl4pPr marL="288925" indent="-127000" algn="l" defTabSz="914368" rtl="0" eaLnBrk="1" latinLnBrk="0" hangingPunct="1">
+              <a:spcBef>
+                <a:spcPts val="0"/>
+              </a:spcBef>
+              <a:spcAft>
+                <a:spcPts val="600"/>
+              </a:spcAft>
+              <a:buClr>
+                <a:schemeClr val="tx1"/>
+              </a:buClr>
+              <a:buSzPct val="100000"/>
+              <a:buFont typeface="LucidaGrande" charset="0"/>
+              <a:buChar char="_"/>
+              <a:tabLst/>
+              <a:defRPr sz="1600" kern="1200" baseline="0">
+                <a:solidFill>
+                  <a:srgbClr val="0B2A51"/>
+                </a:solidFill>
+                <a:latin typeface="Verdana" pitchFamily="34" charset="0"/>
+                <a:ea typeface="+mn-ea"/>
+                <a:cs typeface="+mn-cs"/>
+              </a:defRPr>
+            </a:lvl4pPr>
+            <a:lvl5pPr marL="415925" indent="-127000" algn="l" defTabSz="914368" rtl="0" eaLnBrk="1" latinLnBrk="0" hangingPunct="1">
+              <a:spcBef>
+                <a:spcPts val="0"/>
+              </a:spcBef>
+              <a:spcAft>
+                <a:spcPts val="600"/>
+              </a:spcAft>
+              <a:buSzPct val="170000"/>
+              <a:buFont typeface="AppleSymbols" charset="0"/>
+              <a:buChar char="⌞"/>
+              <a:tabLst/>
+              <a:defRPr sz="1600" kern="1200" baseline="0">
+                <a:solidFill>
+                  <a:srgbClr val="0B2A51"/>
+                </a:solidFill>
+                <a:latin typeface="Verdana" pitchFamily="34" charset="0"/>
+                <a:ea typeface="+mn-ea"/>
+                <a:cs typeface="+mn-cs"/>
+              </a:defRPr>
+            </a:lvl5pPr>
+            <a:lvl6pPr marL="2514512" indent="-228592" algn="l" defTabSz="914368" rtl="0" eaLnBrk="1" latinLnBrk="0" hangingPunct="1">
+              <a:spcBef>
+                <a:spcPct val="20000"/>
+              </a:spcBef>
+              <a:buFont typeface="Arial" pitchFamily="34" charset="0"/>
+              <a:buChar char="•"/>
+              <a:defRPr sz="2000" kern="1200">
+                <a:solidFill>
+                  <a:schemeClr val="tx1"/>
+                </a:solidFill>
+                <a:latin typeface="+mn-lt"/>
+                <a:ea typeface="+mn-ea"/>
+                <a:cs typeface="+mn-cs"/>
+              </a:defRPr>
+            </a:lvl6pPr>
+            <a:lvl7pPr marL="2971696" indent="-228592" algn="l" defTabSz="914368" rtl="0" eaLnBrk="1" latinLnBrk="0" hangingPunct="1">
+              <a:spcBef>
+                <a:spcPct val="20000"/>
+              </a:spcBef>
+              <a:buFont typeface="Arial" pitchFamily="34" charset="0"/>
+              <a:buChar char="•"/>
+              <a:defRPr sz="2000" kern="1200">
+                <a:solidFill>
+                  <a:schemeClr val="tx1"/>
+                </a:solidFill>
+                <a:latin typeface="+mn-lt"/>
+                <a:ea typeface="+mn-ea"/>
+                <a:cs typeface="+mn-cs"/>
+              </a:defRPr>
+            </a:lvl7pPr>
+            <a:lvl8pPr marL="3428880" indent="-228592" algn="l" defTabSz="914368" rtl="0" eaLnBrk="1" latinLnBrk="0" hangingPunct="1">
+              <a:spcBef>
+                <a:spcPct val="20000"/>
+              </a:spcBef>
+              <a:buFont typeface="Arial" pitchFamily="34" charset="0"/>
+              <a:buChar char="•"/>
+              <a:defRPr sz="2000" kern="1200">
+                <a:solidFill>
+                  <a:schemeClr val="tx1"/>
+                </a:solidFill>
+                <a:latin typeface="+mn-lt"/>
+                <a:ea typeface="+mn-ea"/>
+                <a:cs typeface="+mn-cs"/>
+              </a:defRPr>
+            </a:lvl8pPr>
+            <a:lvl9pPr marL="3886064" indent="-228592" algn="l" defTabSz="914368" rtl="0" eaLnBrk="1" latinLnBrk="0" hangingPunct="1">
+              <a:spcBef>
+                <a:spcPct val="20000"/>
+              </a:spcBef>
+              <a:buFont typeface="Arial" pitchFamily="34" charset="0"/>
+              <a:buChar char="•"/>
+              <a:defRPr sz="2000" kern="1200">
+                <a:solidFill>
+                  <a:schemeClr val="tx1"/>
+                </a:solidFill>
+                <a:latin typeface="+mn-lt"/>
+                <a:ea typeface="+mn-ea"/>
+                <a:cs typeface="+mn-cs"/>
+              </a:defRPr>
+            </a:lvl9pPr>
+          </a:lstStyle>
+          <a:p>
+            <a:pPr marL="342900" indent="-342900">
+              <a:buFont typeface=".AppleSystemUIFont" charset="-120"/>
+              <a:buChar char="-"/>
+            </a:pPr>
+            <a:r>
+              <a:rPr lang="de-DE" dirty="0"/>
+              <a:t>Anpassung der Live Preview</a:t>
+            </a:r>
+          </a:p>
+          <a:p>
+            <a:pPr marL="342900" indent="-342900">
+              <a:buFont typeface=".AppleSystemUIFont" charset="-120"/>
+              <a:buChar char="-"/>
+            </a:pPr>
+            <a:r>
+              <a:rPr lang="de-DE"/>
+              <a:t>Usability Tests</a:t>
+            </a:r>
+            <a:endParaRPr lang="de-DE" dirty="0"/>
+          </a:p>
+        </p:txBody>
+      </p:sp>
+    </p:spTree>
+    <p:extLst>
+      <p:ext uri="{BB962C8B-B14F-4D97-AF65-F5344CB8AC3E}">
+        <p14:creationId xmlns:p14="http://schemas.microsoft.com/office/powerpoint/2010/main" val="629531849"/>
       </p:ext>
     </p:extLst>
   </p:cSld>

</xml_diff>

<commit_message>
fixed: little stuff in presentation
</commit_message>
<xml_diff>
--- a/presentation.pptx
+++ b/presentation.pptx
@@ -2068,15 +2068,39 @@
             </a:r>
           </a:p>
           <a:p>
+            <a:pPr marL="171450" indent="-171450">
+              <a:buFontTx/>
+              <a:buChar char="-"/>
+            </a:pPr>
             <a:r>
               <a:rPr lang="de-DE" baseline="0" dirty="0"/>
-              <a:t>- Mehr </a:t>
+              <a:t>Mehr </a:t>
             </a:r>
             <a:r>
               <a:rPr lang="de-DE" baseline="0" dirty="0" err="1"/>
               <a:t>wysiwyg</a:t>
             </a:r>
             <a:endParaRPr lang="de-DE" baseline="0" dirty="0"/>
+          </a:p>
+          <a:p>
+            <a:pPr marL="0" indent="0">
+              <a:buFontTx/>
+              <a:buNone/>
+            </a:pPr>
+            <a:r>
+              <a:rPr lang="de-DE" baseline="0" dirty="0"/>
+              <a:t>Import:</a:t>
+            </a:r>
+          </a:p>
+          <a:p>
+            <a:pPr marL="0" indent="0">
+              <a:buFontTx/>
+              <a:buNone/>
+            </a:pPr>
+            <a:r>
+              <a:rPr lang="de-DE" baseline="0" dirty="0"/>
+              <a:t>- Aus dem Internet und aus anderen Ordnern in den Kapitelordner</a:t>
+            </a:r>
           </a:p>
           <a:p>
             <a:endParaRPr lang="de-DE" dirty="0"/>
@@ -4116,7 +4140,7 @@
           <a:lstStyle/>
           <a:p>
             <a:r>
-              <a:rPr lang="de-DE"/>
+              <a:rPr lang="de-DE" dirty="0"/>
               <a:t>Folie </a:t>
             </a:r>
             <a:fld id="{20336FBE-96EF-1B43-9998-83765DDB0397}" type="slidenum">
@@ -4125,10 +4149,9 @@
               <a:t>‹Nr.›</a:t>
             </a:fld>
             <a:r>
-              <a:rPr lang="de-DE"/>
-              <a:t> von XYZ</a:t>
-            </a:r>
-            <a:endParaRPr lang="de-DE" dirty="0"/>
+              <a:rPr lang="de-DE" dirty="0"/>
+              <a:t> von 19</a:t>
+            </a:r>
           </a:p>
         </p:txBody>
       </p:sp>
@@ -4696,7 +4719,7 @@
             </a:fld>
             <a:r>
               <a:rPr lang="de-DE" dirty="0"/>
-              <a:t> von XYZ</a:t>
+              <a:t> von 19</a:t>
             </a:r>
           </a:p>
         </p:txBody>
@@ -5005,7 +5028,7 @@
             </a:fld>
             <a:r>
               <a:rPr lang="de-DE" dirty="0"/>
-              <a:t> von XYZ</a:t>
+              <a:t> von 19</a:t>
             </a:r>
           </a:p>
         </p:txBody>
@@ -5507,7 +5530,7 @@
             </a:fld>
             <a:r>
               <a:rPr lang="de-DE" dirty="0"/>
-              <a:t> von XYZ</a:t>
+              <a:t> von 19</a:t>
             </a:r>
           </a:p>
         </p:txBody>
@@ -6021,7 +6044,7 @@
             </a:fld>
             <a:r>
               <a:rPr lang="de-DE" dirty="0"/>
-              <a:t> von XYZ</a:t>
+              <a:t> von 19</a:t>
             </a:r>
           </a:p>
         </p:txBody>
@@ -6535,7 +6558,7 @@
             </a:fld>
             <a:r>
               <a:rPr lang="de-DE" dirty="0"/>
-              <a:t> von XYZ</a:t>
+              <a:t> von 19</a:t>
             </a:r>
           </a:p>
         </p:txBody>
@@ -6961,7 +6984,7 @@
             </a:fld>
             <a:r>
               <a:rPr lang="de-DE" dirty="0"/>
-              <a:t> von XYZ</a:t>
+              <a:t> von 19</a:t>
             </a:r>
           </a:p>
         </p:txBody>
@@ -7523,7 +7546,7 @@
           <a:lstStyle/>
           <a:p>
             <a:r>
-              <a:rPr lang="de-DE"/>
+              <a:rPr lang="de-DE" dirty="0"/>
               <a:t>Folie </a:t>
             </a:r>
             <a:fld id="{20336FBE-96EF-1B43-9998-83765DDB0397}" type="slidenum">
@@ -7532,10 +7555,9 @@
               <a:t>10</a:t>
             </a:fld>
             <a:r>
-              <a:rPr lang="de-DE"/>
-              <a:t> von XYZ</a:t>
-            </a:r>
-            <a:endParaRPr lang="de-DE" dirty="0"/>
+              <a:rPr lang="de-DE" dirty="0"/>
+              <a:t> von 19</a:t>
+            </a:r>
           </a:p>
         </p:txBody>
       </p:sp>
@@ -7592,11 +7614,7 @@
           <a:p>
             <a:r>
               <a:rPr lang="de-DE" dirty="0"/>
-              <a:t>3.	</a:t>
-            </a:r>
-            <a:r>
-              <a:rPr lang="de-DE" dirty="0"/>
-              <a:t>Entwicklung des neuen ATOM-</a:t>
+              <a:t>3.	Entwicklung des neuen ATOM-</a:t>
             </a:r>
             <a:r>
               <a:rPr lang="de-DE" dirty="0" err="1"/>
@@ -7700,7 +7718,7 @@
           <a:lstStyle/>
           <a:p>
             <a:r>
-              <a:rPr lang="de-DE"/>
+              <a:rPr lang="de-DE" dirty="0"/>
               <a:t>Folie </a:t>
             </a:r>
             <a:fld id="{20336FBE-96EF-1B43-9998-83765DDB0397}" type="slidenum">
@@ -7709,10 +7727,9 @@
               <a:t>11</a:t>
             </a:fld>
             <a:r>
-              <a:rPr lang="de-DE"/>
-              <a:t> von XYZ</a:t>
-            </a:r>
-            <a:endParaRPr lang="de-DE" dirty="0"/>
+              <a:rPr lang="de-DE" dirty="0"/>
+              <a:t> von 19</a:t>
+            </a:r>
           </a:p>
         </p:txBody>
       </p:sp>
@@ -8028,7 +8045,7 @@
           <a:lstStyle/>
           <a:p>
             <a:r>
-              <a:rPr lang="de-DE"/>
+              <a:rPr lang="de-DE" dirty="0"/>
               <a:t>Folie </a:t>
             </a:r>
             <a:fld id="{20336FBE-96EF-1B43-9998-83765DDB0397}" type="slidenum">
@@ -8037,10 +8054,9 @@
               <a:t>12</a:t>
             </a:fld>
             <a:r>
-              <a:rPr lang="de-DE"/>
-              <a:t> von XYZ</a:t>
-            </a:r>
-            <a:endParaRPr lang="de-DE" dirty="0"/>
+              <a:rPr lang="de-DE" dirty="0"/>
+              <a:t> von 19</a:t>
+            </a:r>
           </a:p>
         </p:txBody>
       </p:sp>
@@ -8931,7 +8947,7 @@
           <a:lstStyle/>
           <a:p>
             <a:r>
-              <a:rPr lang="de-DE"/>
+              <a:rPr lang="de-DE" dirty="0"/>
               <a:t>Folie </a:t>
             </a:r>
             <a:fld id="{20336FBE-96EF-1B43-9998-83765DDB0397}" type="slidenum">
@@ -8940,10 +8956,9 @@
               <a:t>13</a:t>
             </a:fld>
             <a:r>
-              <a:rPr lang="de-DE"/>
-              <a:t> von XYZ</a:t>
-            </a:r>
-            <a:endParaRPr lang="de-DE" dirty="0"/>
+              <a:rPr lang="de-DE" dirty="0"/>
+              <a:t> von 19</a:t>
+            </a:r>
           </a:p>
         </p:txBody>
       </p:sp>
@@ -9242,7 +9257,7 @@
           <a:lstStyle/>
           <a:p>
             <a:r>
-              <a:rPr lang="de-DE"/>
+              <a:rPr lang="de-DE" dirty="0"/>
               <a:t>Folie </a:t>
             </a:r>
             <a:fld id="{20336FBE-96EF-1B43-9998-83765DDB0397}" type="slidenum">
@@ -9251,10 +9266,9 @@
               <a:t>14</a:t>
             </a:fld>
             <a:r>
-              <a:rPr lang="de-DE"/>
-              <a:t> von XYZ</a:t>
-            </a:r>
-            <a:endParaRPr lang="de-DE" dirty="0"/>
+              <a:rPr lang="de-DE" dirty="0"/>
+              <a:t> von 19</a:t>
+            </a:r>
           </a:p>
         </p:txBody>
       </p:sp>
@@ -9468,7 +9482,7 @@
           <a:lstStyle/>
           <a:p>
             <a:r>
-              <a:rPr lang="de-DE"/>
+              <a:rPr lang="de-DE" dirty="0"/>
               <a:t>Folie </a:t>
             </a:r>
             <a:fld id="{20336FBE-96EF-1B43-9998-83765DDB0397}" type="slidenum">
@@ -9477,10 +9491,9 @@
               <a:t>15</a:t>
             </a:fld>
             <a:r>
-              <a:rPr lang="de-DE"/>
-              <a:t> von XYZ</a:t>
-            </a:r>
-            <a:endParaRPr lang="de-DE" dirty="0"/>
+              <a:rPr lang="de-DE" dirty="0"/>
+              <a:t> von 19</a:t>
+            </a:r>
           </a:p>
         </p:txBody>
       </p:sp>
@@ -9685,7 +9698,7 @@
           <a:lstStyle/>
           <a:p>
             <a:r>
-              <a:rPr lang="de-DE"/>
+              <a:rPr lang="de-DE" dirty="0"/>
               <a:t>Folie </a:t>
             </a:r>
             <a:fld id="{20336FBE-96EF-1B43-9998-83765DDB0397}" type="slidenum">
@@ -9694,10 +9707,9 @@
               <a:t>16</a:t>
             </a:fld>
             <a:r>
-              <a:rPr lang="de-DE"/>
-              <a:t> von XYZ</a:t>
-            </a:r>
-            <a:endParaRPr lang="de-DE" dirty="0"/>
+              <a:rPr lang="de-DE" dirty="0"/>
+              <a:t> von 19</a:t>
+            </a:r>
           </a:p>
         </p:txBody>
       </p:sp>
@@ -10183,7 +10195,7 @@
           <a:lstStyle/>
           <a:p>
             <a:r>
-              <a:rPr lang="de-DE"/>
+              <a:rPr lang="de-DE" dirty="0"/>
               <a:t>Folie </a:t>
             </a:r>
             <a:fld id="{20336FBE-96EF-1B43-9998-83765DDB0397}" type="slidenum">
@@ -10192,10 +10204,9 @@
               <a:t>17</a:t>
             </a:fld>
             <a:r>
-              <a:rPr lang="de-DE"/>
-              <a:t> von XYZ</a:t>
-            </a:r>
-            <a:endParaRPr lang="de-DE" dirty="0"/>
+              <a:rPr lang="de-DE" dirty="0"/>
+              <a:t> von 19</a:t>
+            </a:r>
           </a:p>
         </p:txBody>
       </p:sp>
@@ -10272,7 +10283,7 @@
           <a:lstStyle/>
           <a:p>
             <a:r>
-              <a:rPr lang="de-DE"/>
+              <a:rPr lang="de-DE" dirty="0"/>
               <a:t>Folie </a:t>
             </a:r>
             <a:fld id="{20336FBE-96EF-1B43-9998-83765DDB0397}" type="slidenum">
@@ -10281,10 +10292,9 @@
               <a:t>18</a:t>
             </a:fld>
             <a:r>
-              <a:rPr lang="de-DE"/>
-              <a:t> von XYZ</a:t>
-            </a:r>
-            <a:endParaRPr lang="de-DE" dirty="0"/>
+              <a:rPr lang="de-DE" dirty="0"/>
+              <a:t> von 19</a:t>
+            </a:r>
           </a:p>
         </p:txBody>
       </p:sp>
@@ -10403,8 +10413,73 @@
             </a:pPr>
             <a:r>
               <a:rPr lang="de-DE" dirty="0"/>
+              <a:t>Import von Bildern</a:t>
+            </a:r>
+          </a:p>
+          <a:p>
+            <a:pPr marL="342900" indent="-342900">
+              <a:lnSpc>
+                <a:spcPts val="2600"/>
+              </a:lnSpc>
+              <a:buFont typeface=".AppleSystemUIFont" charset="-120"/>
+              <a:buChar char="-"/>
+            </a:pPr>
+            <a:r>
+              <a:rPr lang="de-DE" dirty="0"/>
+              <a:t>Import von Tabellen</a:t>
+            </a:r>
+          </a:p>
+          <a:p>
+            <a:pPr marL="342900" indent="-342900">
+              <a:lnSpc>
+                <a:spcPts val="2600"/>
+              </a:lnSpc>
+              <a:buFont typeface=".AppleSystemUIFont" charset="-120"/>
+              <a:buChar char="-"/>
+            </a:pPr>
+            <a:r>
+              <a:rPr lang="de-DE" dirty="0"/>
+              <a:t>Go </a:t>
+            </a:r>
+            <a:r>
+              <a:rPr lang="de-DE" dirty="0" err="1"/>
+              <a:t>to</a:t>
+            </a:r>
+            <a:r>
+              <a:rPr lang="de-DE" dirty="0"/>
+              <a:t> </a:t>
+            </a:r>
+            <a:r>
+              <a:rPr lang="de-DE" dirty="0" err="1"/>
+              <a:t>line</a:t>
+            </a:r>
+            <a:r>
+              <a:rPr lang="de-DE" dirty="0"/>
+              <a:t> Funktion bei Klick auf Fehlermeldung</a:t>
+            </a:r>
+          </a:p>
+          <a:p>
+            <a:pPr marL="342900" indent="-342900">
+              <a:lnSpc>
+                <a:spcPts val="2600"/>
+              </a:lnSpc>
+              <a:buFont typeface=".AppleSystemUIFont" charset="-120"/>
+              <a:buChar char="-"/>
+            </a:pPr>
+            <a:r>
+              <a:rPr lang="de-DE" dirty="0"/>
               <a:t>Usability Tests</a:t>
             </a:r>
+          </a:p>
+          <a:p>
+            <a:pPr marL="342900" indent="-342900">
+              <a:lnSpc>
+                <a:spcPts val="2600"/>
+              </a:lnSpc>
+              <a:buFont typeface=".AppleSystemUIFont" charset="-120"/>
+              <a:buChar char="-"/>
+            </a:pPr>
+            <a:endParaRPr lang="de-DE" dirty="0"/>
           </a:p>
           <a:p>
             <a:endParaRPr lang="de-DE" dirty="0"/>
@@ -10469,7 +10544,7 @@
           <a:lstStyle/>
           <a:p>
             <a:r>
-              <a:rPr lang="de-DE"/>
+              <a:rPr lang="de-DE" dirty="0"/>
               <a:t>Folie </a:t>
             </a:r>
             <a:fld id="{20336FBE-96EF-1B43-9998-83765DDB0397}" type="slidenum">
@@ -10478,10 +10553,9 @@
               <a:t>19</a:t>
             </a:fld>
             <a:r>
-              <a:rPr lang="de-DE"/>
-              <a:t> von XYZ</a:t>
-            </a:r>
-            <a:endParaRPr lang="de-DE" dirty="0"/>
+              <a:rPr lang="de-DE" dirty="0"/>
+              <a:t> von 19</a:t>
+            </a:r>
           </a:p>
         </p:txBody>
       </p:sp>
@@ -10702,7 +10776,7 @@
           <a:lstStyle/>
           <a:p>
             <a:r>
-              <a:rPr lang="de-DE"/>
+              <a:rPr lang="de-DE" dirty="0"/>
               <a:t>Folie </a:t>
             </a:r>
             <a:fld id="{20336FBE-96EF-1B43-9998-83765DDB0397}" type="slidenum">
@@ -10711,10 +10785,9 @@
               <a:t>2</a:t>
             </a:fld>
             <a:r>
-              <a:rPr lang="de-DE"/>
-              <a:t> von XYZ</a:t>
-            </a:r>
-            <a:endParaRPr lang="de-DE" dirty="0"/>
+              <a:rPr lang="de-DE" dirty="0"/>
+              <a:t> von 19</a:t>
+            </a:r>
           </a:p>
         </p:txBody>
       </p:sp>
@@ -10791,7 +10864,7 @@
           <a:lstStyle/>
           <a:p>
             <a:r>
-              <a:rPr lang="de-DE"/>
+              <a:rPr lang="de-DE" dirty="0"/>
               <a:t>Folie </a:t>
             </a:r>
             <a:fld id="{20336FBE-96EF-1B43-9998-83765DDB0397}" type="slidenum">
@@ -10800,10 +10873,9 @@
               <a:t>3</a:t>
             </a:fld>
             <a:r>
-              <a:rPr lang="de-DE"/>
-              <a:t> von XYZ</a:t>
-            </a:r>
-            <a:endParaRPr lang="de-DE" dirty="0"/>
+              <a:rPr lang="de-DE" dirty="0"/>
+              <a:t> von 19</a:t>
+            </a:r>
           </a:p>
         </p:txBody>
       </p:sp>
@@ -10847,13 +10919,8 @@
           <a:p>
             <a:r>
               <a:rPr lang="de-DE" dirty="0"/>
-              <a:t>1.	</a:t>
-            </a:r>
-            <a:r>
-              <a:rPr lang="de-DE" dirty="0"/>
-              <a:t> ZIELSTELLUNG</a:t>
-            </a:r>
-            <a:endParaRPr lang="de-DE" dirty="0"/>
+              <a:t>1.	 ZIELSTELLUNG</a:t>
+            </a:r>
           </a:p>
         </p:txBody>
       </p:sp>
@@ -11093,7 +11160,7 @@
           <a:lstStyle/>
           <a:p>
             <a:r>
-              <a:rPr lang="de-DE"/>
+              <a:rPr lang="de-DE" dirty="0"/>
               <a:t>Folie </a:t>
             </a:r>
             <a:fld id="{20336FBE-96EF-1B43-9998-83765DDB0397}" type="slidenum">
@@ -11102,10 +11169,9 @@
               <a:t>4</a:t>
             </a:fld>
             <a:r>
-              <a:rPr lang="de-DE"/>
-              <a:t> von XYZ</a:t>
-            </a:r>
-            <a:endParaRPr lang="de-DE" dirty="0"/>
+              <a:rPr lang="de-DE" dirty="0"/>
+              <a:t> von 19</a:t>
+            </a:r>
           </a:p>
         </p:txBody>
       </p:sp>
@@ -11182,7 +11248,7 @@
           <a:lstStyle/>
           <a:p>
             <a:r>
-              <a:rPr lang="de-DE"/>
+              <a:rPr lang="de-DE" dirty="0"/>
               <a:t>Folie </a:t>
             </a:r>
             <a:fld id="{20336FBE-96EF-1B43-9998-83765DDB0397}" type="slidenum">
@@ -11191,10 +11257,9 @@
               <a:t>5</a:t>
             </a:fld>
             <a:r>
-              <a:rPr lang="de-DE"/>
-              <a:t> von XYZ</a:t>
-            </a:r>
-            <a:endParaRPr lang="de-DE" dirty="0"/>
+              <a:rPr lang="de-DE" dirty="0"/>
+              <a:t> von 19</a:t>
+            </a:r>
           </a:p>
         </p:txBody>
       </p:sp>
@@ -11238,13 +11303,8 @@
           <a:p>
             <a:r>
               <a:rPr lang="de-DE" dirty="0"/>
-              <a:t>2.	</a:t>
-            </a:r>
-            <a:r>
-              <a:rPr lang="de-DE" dirty="0"/>
-              <a:t> BESTEHENDE LÖSUNGSANSÄTZE</a:t>
-            </a:r>
-            <a:endParaRPr lang="de-DE" dirty="0"/>
+              <a:t>2.	 BESTEHENDE LÖSUNGSANSÄTZE</a:t>
+            </a:r>
           </a:p>
         </p:txBody>
       </p:sp>
@@ -11493,7 +11553,7 @@
           <a:lstStyle/>
           <a:p>
             <a:r>
-              <a:rPr lang="de-DE"/>
+              <a:rPr lang="de-DE" dirty="0"/>
               <a:t>Folie </a:t>
             </a:r>
             <a:fld id="{20336FBE-96EF-1B43-9998-83765DDB0397}" type="slidenum">
@@ -11502,10 +11562,9 @@
               <a:t>6</a:t>
             </a:fld>
             <a:r>
-              <a:rPr lang="de-DE"/>
-              <a:t> von XYZ</a:t>
-            </a:r>
-            <a:endParaRPr lang="de-DE" dirty="0"/>
+              <a:rPr lang="de-DE" dirty="0"/>
+              <a:t> von 19</a:t>
+            </a:r>
           </a:p>
         </p:txBody>
       </p:sp>
@@ -11732,7 +11791,7 @@
           <a:lstStyle/>
           <a:p>
             <a:r>
-              <a:rPr lang="de-DE"/>
+              <a:rPr lang="de-DE" dirty="0"/>
               <a:t>Folie </a:t>
             </a:r>
             <a:fld id="{20336FBE-96EF-1B43-9998-83765DDB0397}" type="slidenum">
@@ -11741,10 +11800,9 @@
               <a:t>7</a:t>
             </a:fld>
             <a:r>
-              <a:rPr lang="de-DE"/>
-              <a:t> von XYZ</a:t>
-            </a:r>
-            <a:endParaRPr lang="de-DE" dirty="0"/>
+              <a:rPr lang="de-DE" dirty="0"/>
+              <a:t> von 19</a:t>
+            </a:r>
           </a:p>
         </p:txBody>
       </p:sp>
@@ -11971,7 +12029,7 @@
           <a:lstStyle/>
           <a:p>
             <a:r>
-              <a:rPr lang="de-DE"/>
+              <a:rPr lang="de-DE" dirty="0"/>
               <a:t>Folie </a:t>
             </a:r>
             <a:fld id="{20336FBE-96EF-1B43-9998-83765DDB0397}" type="slidenum">
@@ -11980,10 +12038,9 @@
               <a:t>8</a:t>
             </a:fld>
             <a:r>
-              <a:rPr lang="de-DE"/>
-              <a:t> von XYZ</a:t>
-            </a:r>
-            <a:endParaRPr lang="de-DE" dirty="0"/>
+              <a:rPr lang="de-DE" dirty="0"/>
+              <a:t> von 19</a:t>
+            </a:r>
           </a:p>
         </p:txBody>
       </p:sp>
@@ -12240,7 +12297,7 @@
           <a:lstStyle/>
           <a:p>
             <a:r>
-              <a:rPr lang="de-DE"/>
+              <a:rPr lang="de-DE" dirty="0"/>
               <a:t>Folie </a:t>
             </a:r>
             <a:fld id="{20336FBE-96EF-1B43-9998-83765DDB0397}" type="slidenum">
@@ -12249,10 +12306,9 @@
               <a:t>9</a:t>
             </a:fld>
             <a:r>
-              <a:rPr lang="de-DE"/>
-              <a:t> von XYZ</a:t>
-            </a:r>
-            <a:endParaRPr lang="de-DE" dirty="0"/>
+              <a:rPr lang="de-DE" dirty="0"/>
+              <a:t> von 19</a:t>
+            </a:r>
           </a:p>
         </p:txBody>
       </p:sp>
@@ -12296,9 +12352,14 @@
   <p:clrMapOvr>
     <a:masterClrMapping/>
   </p:clrMapOvr>
-  <p:transition spd="slow">
-    <p:push dir="u"/>
-  </p:transition>
+  <mc:AlternateContent xmlns:mc="http://schemas.openxmlformats.org/markup-compatibility/2006">
+    <mc:Choice xmlns:p14="http://schemas.microsoft.com/office/powerpoint/2010/main" Requires="p14">
+      <p:transition p14:dur="0"/>
+    </mc:Choice>
+    <mc:Fallback>
+      <p:transition/>
+    </mc:Fallback>
+  </mc:AlternateContent>
 </p:sld>
 </file>
 

</xml_diff>